<commit_message>
chore(user-guide): update variable docs
related to 2890
</commit_message>
<xml_diff>
--- a/develop/drawings/variables.pptx
+++ b/develop/drawings/variables.pptx
@@ -260,7 +260,7 @@
           <a:p>
             <a:fld id="{75770F93-8E11-4B56-97AE-D1DC0AE59729}" type="datetimeFigureOut">
               <a:rPr lang="de-DE" smtClean="0"/>
-              <a:t>05.09.2014</a:t>
+              <a:t>10.11.2014</a:t>
             </a:fld>
             <a:endParaRPr lang="de-DE"/>
           </a:p>
@@ -430,7 +430,7 @@
           <a:p>
             <a:fld id="{75770F93-8E11-4B56-97AE-D1DC0AE59729}" type="datetimeFigureOut">
               <a:rPr lang="de-DE" smtClean="0"/>
-              <a:t>05.09.2014</a:t>
+              <a:t>10.11.2014</a:t>
             </a:fld>
             <a:endParaRPr lang="de-DE"/>
           </a:p>
@@ -610,7 +610,7 @@
           <a:p>
             <a:fld id="{75770F93-8E11-4B56-97AE-D1DC0AE59729}" type="datetimeFigureOut">
               <a:rPr lang="de-DE" smtClean="0"/>
-              <a:t>05.09.2014</a:t>
+              <a:t>10.11.2014</a:t>
             </a:fld>
             <a:endParaRPr lang="de-DE"/>
           </a:p>
@@ -780,7 +780,7 @@
           <a:p>
             <a:fld id="{75770F93-8E11-4B56-97AE-D1DC0AE59729}" type="datetimeFigureOut">
               <a:rPr lang="de-DE" smtClean="0"/>
-              <a:t>05.09.2014</a:t>
+              <a:t>10.11.2014</a:t>
             </a:fld>
             <a:endParaRPr lang="de-DE"/>
           </a:p>
@@ -1026,7 +1026,7 @@
           <a:p>
             <a:fld id="{75770F93-8E11-4B56-97AE-D1DC0AE59729}" type="datetimeFigureOut">
               <a:rPr lang="de-DE" smtClean="0"/>
-              <a:t>05.09.2014</a:t>
+              <a:t>10.11.2014</a:t>
             </a:fld>
             <a:endParaRPr lang="de-DE"/>
           </a:p>
@@ -1258,7 +1258,7 @@
           <a:p>
             <a:fld id="{75770F93-8E11-4B56-97AE-D1DC0AE59729}" type="datetimeFigureOut">
               <a:rPr lang="de-DE" smtClean="0"/>
-              <a:t>05.09.2014</a:t>
+              <a:t>10.11.2014</a:t>
             </a:fld>
             <a:endParaRPr lang="de-DE"/>
           </a:p>
@@ -1625,7 +1625,7 @@
           <a:p>
             <a:fld id="{75770F93-8E11-4B56-97AE-D1DC0AE59729}" type="datetimeFigureOut">
               <a:rPr lang="de-DE" smtClean="0"/>
-              <a:t>05.09.2014</a:t>
+              <a:t>10.11.2014</a:t>
             </a:fld>
             <a:endParaRPr lang="de-DE"/>
           </a:p>
@@ -1743,7 +1743,7 @@
           <a:p>
             <a:fld id="{75770F93-8E11-4B56-97AE-D1DC0AE59729}" type="datetimeFigureOut">
               <a:rPr lang="de-DE" smtClean="0"/>
-              <a:t>05.09.2014</a:t>
+              <a:t>10.11.2014</a:t>
             </a:fld>
             <a:endParaRPr lang="de-DE"/>
           </a:p>
@@ -1838,7 +1838,7 @@
           <a:p>
             <a:fld id="{75770F93-8E11-4B56-97AE-D1DC0AE59729}" type="datetimeFigureOut">
               <a:rPr lang="de-DE" smtClean="0"/>
-              <a:t>05.09.2014</a:t>
+              <a:t>10.11.2014</a:t>
             </a:fld>
             <a:endParaRPr lang="de-DE"/>
           </a:p>
@@ -2115,7 +2115,7 @@
           <a:p>
             <a:fld id="{75770F93-8E11-4B56-97AE-D1DC0AE59729}" type="datetimeFigureOut">
               <a:rPr lang="de-DE" smtClean="0"/>
-              <a:t>05.09.2014</a:t>
+              <a:t>10.11.2014</a:t>
             </a:fld>
             <a:endParaRPr lang="de-DE"/>
           </a:p>
@@ -2368,7 +2368,7 @@
           <a:p>
             <a:fld id="{75770F93-8E11-4B56-97AE-D1DC0AE59729}" type="datetimeFigureOut">
               <a:rPr lang="de-DE" smtClean="0"/>
-              <a:t>05.09.2014</a:t>
+              <a:t>10.11.2014</a:t>
             </a:fld>
             <a:endParaRPr lang="de-DE"/>
           </a:p>
@@ -2581,7 +2581,7 @@
           <a:p>
             <a:fld id="{75770F93-8E11-4B56-97AE-D1DC0AE59729}" type="datetimeFigureOut">
               <a:rPr lang="de-DE" smtClean="0"/>
-              <a:t>05.09.2014</a:t>
+              <a:t>10.11.2014</a:t>
             </a:fld>
             <a:endParaRPr lang="de-DE"/>
           </a:p>
@@ -3075,7 +3075,6 @@
               <a:rPr lang="de-DE" sz="1100" dirty="0" smtClean="0"/>
               <a:t> Instance)</a:t>
             </a:r>
-            <a:endParaRPr lang="de-DE" sz="1100" dirty="0" smtClean="0"/>
           </a:p>
         </p:txBody>
       </p:sp>
@@ -3565,7 +3564,6 @@
               <a:rPr lang="de-DE" sz="1100" dirty="0" smtClean="0"/>
               <a:t> Instance)</a:t>
             </a:r>
-            <a:endParaRPr lang="de-DE" sz="1100" dirty="0" smtClean="0"/>
           </a:p>
         </p:txBody>
       </p:sp>
@@ -4001,11 +3999,7 @@
               </a:r>
               <a:r>
                 <a:rPr lang="de-DE" sz="1100" dirty="0" smtClean="0"/>
-                <a:t>: </a:t>
-              </a:r>
-              <a:r>
-                <a:rPr lang="de-DE" sz="1100" dirty="0" smtClean="0"/>
-                <a:t>„</a:t>
+                <a:t>: „</a:t>
               </a:r>
               <a:r>
                 <a:rPr lang="de-DE" sz="1100" dirty="0" err="1" smtClean="0"/>
@@ -4060,11 +4054,7 @@
               </a:r>
               <a:r>
                 <a:rPr lang="de-DE" sz="1100" dirty="0" smtClean="0"/>
-                <a:t>: </a:t>
-              </a:r>
-              <a:r>
-                <a:rPr lang="de-DE" sz="1100" dirty="0" smtClean="0"/>
-                <a:t>„</a:t>
+                <a:t>: „</a:t>
               </a:r>
               <a:r>
                 <a:rPr lang="de-DE" sz="1100" dirty="0" err="1" smtClean="0"/>
@@ -4185,11 +4175,7 @@
               </a:r>
               <a:r>
                 <a:rPr lang="de-DE" sz="1100" dirty="0" smtClean="0"/>
-                <a:t>: </a:t>
-              </a:r>
-              <a:r>
-                <a:rPr lang="de-DE" sz="1100" dirty="0" smtClean="0"/>
-                <a:t>„</a:t>
+                <a:t>: „</a:t>
               </a:r>
               <a:r>
                 <a:rPr lang="de-DE" sz="1100" dirty="0" err="1" smtClean="0"/>
@@ -4244,11 +4230,7 @@
               </a:r>
               <a:r>
                 <a:rPr lang="de-DE" sz="1100" dirty="0" smtClean="0"/>
-                <a:t>: </a:t>
-              </a:r>
-              <a:r>
-                <a:rPr lang="de-DE" sz="1100" dirty="0" smtClean="0"/>
-                <a:t>„</a:t>
+                <a:t>: „</a:t>
               </a:r>
               <a:r>
                 <a:rPr lang="de-DE" sz="1100" dirty="0" err="1" smtClean="0"/>
@@ -4443,11 +4425,7 @@
               </a:r>
               <a:r>
                 <a:rPr lang="de-DE" sz="1100" dirty="0" smtClean="0"/>
-                <a:t>: </a:t>
-              </a:r>
-              <a:r>
-                <a:rPr lang="de-DE" sz="1100" dirty="0" smtClean="0"/>
-                <a:t>„</a:t>
+                <a:t>: „</a:t>
               </a:r>
               <a:r>
                 <a:rPr lang="de-DE" sz="1100" dirty="0" err="1" smtClean="0"/>
@@ -4502,11 +4480,7 @@
               </a:r>
               <a:r>
                 <a:rPr lang="de-DE" sz="1100" dirty="0" smtClean="0"/>
-                <a:t>: </a:t>
-              </a:r>
-              <a:r>
-                <a:rPr lang="de-DE" sz="1100" dirty="0" smtClean="0"/>
-                <a:t>„</a:t>
+                <a:t>: „</a:t>
               </a:r>
               <a:r>
                 <a:rPr lang="de-DE" sz="1100" dirty="0" err="1" smtClean="0"/>
@@ -4654,7 +4628,6 @@
               <a:rPr lang="de-DE" sz="1100" dirty="0" smtClean="0"/>
               <a:t> Instance)</a:t>
             </a:r>
-            <a:endParaRPr lang="de-DE" sz="1100" dirty="0" smtClean="0"/>
           </a:p>
         </p:txBody>
       </p:sp>
@@ -5090,11 +5063,7 @@
               </a:r>
               <a:r>
                 <a:rPr lang="de-DE" sz="1100" dirty="0" smtClean="0"/>
-                <a:t>: </a:t>
-              </a:r>
-              <a:r>
-                <a:rPr lang="de-DE" sz="1100" dirty="0" smtClean="0"/>
-                <a:t>„</a:t>
+                <a:t>: „</a:t>
               </a:r>
               <a:r>
                 <a:rPr lang="de-DE" sz="1100" dirty="0" err="1" smtClean="0"/>
@@ -5149,11 +5118,7 @@
               </a:r>
               <a:r>
                 <a:rPr lang="de-DE" sz="1100" dirty="0" smtClean="0"/>
-                <a:t>: </a:t>
-              </a:r>
-              <a:r>
-                <a:rPr lang="de-DE" sz="1100" dirty="0" smtClean="0"/>
-                <a:t>„</a:t>
+                <a:t>: „</a:t>
               </a:r>
               <a:r>
                 <a:rPr lang="de-DE" sz="1100" dirty="0" err="1" smtClean="0"/>
@@ -5274,11 +5239,7 @@
               </a:r>
               <a:r>
                 <a:rPr lang="de-DE" sz="1100" dirty="0" smtClean="0"/>
-                <a:t>: </a:t>
-              </a:r>
-              <a:r>
-                <a:rPr lang="de-DE" sz="1100" dirty="0" smtClean="0"/>
-                <a:t>„</a:t>
+                <a:t>: „</a:t>
               </a:r>
               <a:r>
                 <a:rPr lang="de-DE" sz="1100" dirty="0" err="1" smtClean="0"/>
@@ -5333,11 +5294,7 @@
               </a:r>
               <a:r>
                 <a:rPr lang="de-DE" sz="1100" dirty="0" smtClean="0"/>
-                <a:t>: </a:t>
-              </a:r>
-              <a:r>
-                <a:rPr lang="de-DE" sz="1100" dirty="0" smtClean="0"/>
-                <a:t>„</a:t>
+                <a:t>: „</a:t>
               </a:r>
               <a:r>
                 <a:rPr lang="de-DE" sz="1100" dirty="0" err="1" smtClean="0"/>
@@ -5532,11 +5489,7 @@
               </a:r>
               <a:r>
                 <a:rPr lang="de-DE" sz="1100" dirty="0" smtClean="0"/>
-                <a:t>: </a:t>
-              </a:r>
-              <a:r>
-                <a:rPr lang="de-DE" sz="1100" dirty="0" smtClean="0"/>
-                <a:t>„</a:t>
+                <a:t>: „</a:t>
               </a:r>
               <a:r>
                 <a:rPr lang="de-DE" sz="1100" dirty="0" err="1" smtClean="0"/>
@@ -5591,11 +5544,7 @@
               </a:r>
               <a:r>
                 <a:rPr lang="de-DE" sz="1100" dirty="0" smtClean="0"/>
-                <a:t>: </a:t>
-              </a:r>
-              <a:r>
-                <a:rPr lang="de-DE" sz="1100" dirty="0" smtClean="0"/>
-                <a:t>„</a:t>
+                <a:t>: „</a:t>
               </a:r>
               <a:r>
                 <a:rPr lang="de-DE" sz="1100" dirty="0" err="1" smtClean="0"/>
@@ -5753,11 +5702,7 @@
               </a:r>
               <a:r>
                 <a:rPr lang="de-DE" sz="1100" dirty="0" smtClean="0"/>
-                <a:t>: </a:t>
-              </a:r>
-              <a:r>
-                <a:rPr lang="de-DE" sz="1100" dirty="0" smtClean="0"/>
-                <a:t>„</a:t>
+                <a:t>: „</a:t>
               </a:r>
               <a:r>
                 <a:rPr lang="de-DE" sz="1100" dirty="0" err="1" smtClean="0"/>
@@ -5812,11 +5757,7 @@
               </a:r>
               <a:r>
                 <a:rPr lang="de-DE" sz="1100" dirty="0" smtClean="0"/>
-                <a:t>: </a:t>
-              </a:r>
-              <a:r>
-                <a:rPr lang="de-DE" sz="1100" dirty="0" smtClean="0"/>
-                <a:t>„Hugo“</a:t>
+                <a:t>: „Hugo“</a:t>
               </a:r>
               <a:endParaRPr lang="de-DE" sz="1100" dirty="0"/>
             </a:p>
@@ -6650,11 +6591,7 @@
               </a:r>
               <a:r>
                 <a:rPr lang="de-DE" sz="1200" dirty="0" smtClean="0"/>
-                <a:t> </a:t>
-              </a:r>
-              <a:r>
-                <a:rPr lang="de-DE" sz="1200" dirty="0" smtClean="0"/>
-                <a:t>Instance</a:t>
+                <a:t> Instance</a:t>
               </a:r>
             </a:p>
             <a:p>
@@ -7198,7 +7135,7 @@
             <a:pPr algn="ctr"/>
             <a:r>
               <a:rPr lang="de-DE" sz="1100" dirty="0" err="1" smtClean="0"/>
-              <a:t>serializable</a:t>
+              <a:t>object</a:t>
             </a:r>
             <a:endParaRPr lang="de-DE" sz="1100" dirty="0"/>
           </a:p>
@@ -7206,30 +7143,249 @@
       </p:sp>
       <p:sp>
         <p:nvSpPr>
-          <p:cNvPr id="29" name="Rechteck 28"/>
-          <p:cNvSpPr/>
+          <p:cNvPr id="38" name="Textfeld 37"/>
+          <p:cNvSpPr txBox="1"/>
           <p:nvPr/>
         </p:nvSpPr>
         <p:spPr>
           <a:xfrm>
-            <a:off x="4944952" y="4658568"/>
-            <a:ext cx="1206600" cy="270128"/>
+            <a:off x="4944952" y="227524"/>
+            <a:ext cx="1302276" cy="307777"/>
           </a:xfrm>
           <a:prstGeom prst="rect">
             <a:avLst/>
           </a:prstGeom>
-          <a:solidFill>
-            <a:schemeClr val="accent4">
-              <a:lumMod val="75000"/>
-            </a:schemeClr>
-          </a:solidFill>
-          <a:ln>
-            <a:solidFill>
-              <a:schemeClr val="accent4">
-                <a:lumMod val="50000"/>
-              </a:schemeClr>
-            </a:solidFill>
-          </a:ln>
+          <a:noFill/>
+        </p:spPr>
+        <p:txBody>
+          <a:bodyPr wrap="square" rtlCol="0">
+            <a:spAutoFit/>
+          </a:bodyPr>
+          <a:lstStyle/>
+          <a:p>
+            <a:r>
+              <a:rPr lang="de-DE" sz="1400" dirty="0" smtClean="0"/>
+              <a:t>Value </a:t>
+            </a:r>
+            <a:r>
+              <a:rPr lang="de-DE" sz="1400" dirty="0" err="1" smtClean="0"/>
+              <a:t>Types</a:t>
+            </a:r>
+            <a:endParaRPr lang="de-DE" sz="1400" dirty="0"/>
+          </a:p>
+        </p:txBody>
+      </p:sp>
+      <p:sp>
+        <p:nvSpPr>
+          <p:cNvPr id="44" name="Geschweifte Klammer rechts 43"/>
+          <p:cNvSpPr/>
+          <p:nvPr/>
+        </p:nvSpPr>
+        <p:spPr>
+          <a:xfrm>
+            <a:off x="6357398" y="653049"/>
+            <a:ext cx="350818" cy="3318682"/>
+          </a:xfrm>
+          <a:prstGeom prst="rightBrace">
+            <a:avLst>
+              <a:gd name="adj1" fmla="val 73666"/>
+              <a:gd name="adj2" fmla="val 50560"/>
+            </a:avLst>
+          </a:prstGeom>
+          <a:ln w="28575"/>
+        </p:spPr>
+        <p:style>
+          <a:lnRef idx="3">
+            <a:schemeClr val="dk1"/>
+          </a:lnRef>
+          <a:fillRef idx="0">
+            <a:schemeClr val="dk1"/>
+          </a:fillRef>
+          <a:effectRef idx="2">
+            <a:schemeClr val="dk1"/>
+          </a:effectRef>
+          <a:fontRef idx="minor">
+            <a:schemeClr val="tx1"/>
+          </a:fontRef>
+        </p:style>
+        <p:txBody>
+          <a:bodyPr rtlCol="0" anchor="ctr"/>
+          <a:lstStyle/>
+          <a:p>
+            <a:pPr algn="ctr"/>
+            <a:endParaRPr lang="de-DE" sz="1100"/>
+          </a:p>
+        </p:txBody>
+      </p:sp>
+      <p:sp>
+        <p:nvSpPr>
+          <p:cNvPr id="45" name="Geschweifte Klammer rechts 44"/>
+          <p:cNvSpPr/>
+          <p:nvPr/>
+        </p:nvSpPr>
+        <p:spPr>
+          <a:xfrm>
+            <a:off x="6357398" y="4284360"/>
+            <a:ext cx="350818" cy="270128"/>
+          </a:xfrm>
+          <a:prstGeom prst="rightBrace">
+            <a:avLst>
+              <a:gd name="adj1" fmla="val 73666"/>
+              <a:gd name="adj2" fmla="val 50560"/>
+            </a:avLst>
+          </a:prstGeom>
+          <a:ln w="28575"/>
+        </p:spPr>
+        <p:style>
+          <a:lnRef idx="3">
+            <a:schemeClr val="dk1"/>
+          </a:lnRef>
+          <a:fillRef idx="0">
+            <a:schemeClr val="dk1"/>
+          </a:fillRef>
+          <a:effectRef idx="2">
+            <a:schemeClr val="dk1"/>
+          </a:effectRef>
+          <a:fontRef idx="minor">
+            <a:schemeClr val="tx1"/>
+          </a:fontRef>
+        </p:style>
+        <p:txBody>
+          <a:bodyPr rtlCol="0" anchor="ctr"/>
+          <a:lstStyle/>
+          <a:p>
+            <a:pPr algn="ctr"/>
+            <a:endParaRPr lang="de-DE" sz="1100"/>
+          </a:p>
+        </p:txBody>
+      </p:sp>
+      <p:sp>
+        <p:nvSpPr>
+          <p:cNvPr id="46" name="Textfeld 45"/>
+          <p:cNvSpPr txBox="1"/>
+          <p:nvPr/>
+        </p:nvSpPr>
+        <p:spPr>
+          <a:xfrm>
+            <a:off x="6851423" y="2049917"/>
+            <a:ext cx="855116" cy="523220"/>
+          </a:xfrm>
+          <a:prstGeom prst="rect">
+            <a:avLst/>
+          </a:prstGeom>
+          <a:noFill/>
+        </p:spPr>
+        <p:txBody>
+          <a:bodyPr wrap="square" rtlCol="0">
+            <a:spAutoFit/>
+          </a:bodyPr>
+          <a:lstStyle/>
+          <a:p>
+            <a:r>
+              <a:rPr lang="de-DE" sz="1400" dirty="0" smtClean="0"/>
+              <a:t>Primitive </a:t>
+            </a:r>
+            <a:r>
+              <a:rPr lang="de-DE" sz="1400" dirty="0" err="1" smtClean="0"/>
+              <a:t>Types</a:t>
+            </a:r>
+            <a:endParaRPr lang="de-DE" sz="1400" dirty="0"/>
+          </a:p>
+        </p:txBody>
+      </p:sp>
+      <p:sp>
+        <p:nvSpPr>
+          <p:cNvPr id="47" name="Textfeld 46"/>
+          <p:cNvSpPr txBox="1"/>
+          <p:nvPr/>
+        </p:nvSpPr>
+        <p:spPr>
+          <a:xfrm>
+            <a:off x="6914062" y="4129473"/>
+            <a:ext cx="1035840" cy="738664"/>
+          </a:xfrm>
+          <a:prstGeom prst="rect">
+            <a:avLst/>
+          </a:prstGeom>
+          <a:noFill/>
+        </p:spPr>
+        <p:txBody>
+          <a:bodyPr wrap="square" rtlCol="0">
+            <a:spAutoFit/>
+          </a:bodyPr>
+          <a:lstStyle/>
+          <a:p>
+            <a:r>
+              <a:rPr lang="de-DE" sz="1400" dirty="0" smtClean="0"/>
+              <a:t>Custom </a:t>
+            </a:r>
+            <a:r>
+              <a:rPr lang="de-DE" sz="1400" dirty="0" err="1" smtClean="0"/>
+              <a:t>Object</a:t>
+            </a:r>
+            <a:r>
+              <a:rPr lang="de-DE" sz="1400" dirty="0" smtClean="0"/>
+              <a:t> </a:t>
+            </a:r>
+            <a:r>
+              <a:rPr lang="de-DE" sz="1400" dirty="0" smtClean="0"/>
+              <a:t>Type</a:t>
+            </a:r>
+            <a:endParaRPr lang="de-DE" sz="1400" dirty="0"/>
+          </a:p>
+        </p:txBody>
+      </p:sp>
+    </p:spTree>
+    <p:extLst>
+      <p:ext uri="{BB962C8B-B14F-4D97-AF65-F5344CB8AC3E}">
+        <p14:creationId xmlns:p14="http://schemas.microsoft.com/office/powerpoint/2010/main" val="3110557700"/>
+      </p:ext>
+    </p:extLst>
+  </p:cSld>
+  <p:clrMapOvr>
+    <a:masterClrMapping/>
+  </p:clrMapOvr>
+  <p:timing>
+    <p:tnLst>
+      <p:par>
+        <p:cTn id="1" dur="indefinite" restart="never" nodeType="tmRoot"/>
+      </p:par>
+    </p:tnLst>
+  </p:timing>
+</p:sld>
+</file>
+
+<file path=ppt/slides/slide6.xml><?xml version="1.0" encoding="utf-8"?>
+<p:sld xmlns:a="http://schemas.openxmlformats.org/drawingml/2006/main" xmlns:r="http://schemas.openxmlformats.org/officeDocument/2006/relationships" xmlns:p="http://schemas.openxmlformats.org/presentationml/2006/main">
+  <p:cSld>
+    <p:spTree>
+      <p:nvGrpSpPr>
+        <p:cNvPr id="1" name=""/>
+        <p:cNvGrpSpPr/>
+        <p:nvPr/>
+      </p:nvGrpSpPr>
+      <p:grpSpPr>
+        <a:xfrm>
+          <a:off x="0" y="0"/>
+          <a:ext cx="0" cy="0"/>
+          <a:chOff x="0" y="0"/>
+          <a:chExt cx="0" cy="0"/>
+        </a:xfrm>
+      </p:grpSpPr>
+      <p:sp>
+        <p:nvSpPr>
+          <p:cNvPr id="19" name="Rechteck 18"/>
+          <p:cNvSpPr/>
+          <p:nvPr/>
+        </p:nvSpPr>
+        <p:spPr>
+          <a:xfrm>
+            <a:off x="5585033" y="651323"/>
+            <a:ext cx="1206598" cy="270128"/>
+          </a:xfrm>
+          <a:prstGeom prst="rect">
+            <a:avLst/>
+          </a:prstGeom>
         </p:spPr>
         <p:style>
           <a:lnRef idx="2">
@@ -7254,6 +7410,470 @@
             <a:pPr algn="ctr"/>
             <a:r>
               <a:rPr lang="de-DE" sz="1100" dirty="0" err="1" smtClean="0"/>
+              <a:t>boolean</a:t>
+            </a:r>
+            <a:endParaRPr lang="de-DE" sz="1100" dirty="0"/>
+          </a:p>
+        </p:txBody>
+      </p:sp>
+      <p:sp>
+        <p:nvSpPr>
+          <p:cNvPr id="20" name="Rechteck 19"/>
+          <p:cNvSpPr/>
+          <p:nvPr/>
+        </p:nvSpPr>
+        <p:spPr>
+          <a:xfrm>
+            <a:off x="5585033" y="1032608"/>
+            <a:ext cx="1206598" cy="270128"/>
+          </a:xfrm>
+          <a:prstGeom prst="rect">
+            <a:avLst/>
+          </a:prstGeom>
+        </p:spPr>
+        <p:style>
+          <a:lnRef idx="2">
+            <a:schemeClr val="accent6">
+              <a:shade val="50000"/>
+            </a:schemeClr>
+          </a:lnRef>
+          <a:fillRef idx="1">
+            <a:schemeClr val="accent6"/>
+          </a:fillRef>
+          <a:effectRef idx="0">
+            <a:schemeClr val="accent6"/>
+          </a:effectRef>
+          <a:fontRef idx="minor">
+            <a:schemeClr val="lt1"/>
+          </a:fontRef>
+        </p:style>
+        <p:txBody>
+          <a:bodyPr rtlCol="0" anchor="ctr"/>
+          <a:lstStyle/>
+          <a:p>
+            <a:pPr algn="ctr"/>
+            <a:r>
+              <a:rPr lang="de-DE" sz="1100" dirty="0" err="1" smtClean="0"/>
+              <a:t>bytes</a:t>
+            </a:r>
+            <a:endParaRPr lang="de-DE" sz="1100" dirty="0"/>
+          </a:p>
+        </p:txBody>
+      </p:sp>
+      <p:sp>
+        <p:nvSpPr>
+          <p:cNvPr id="21" name="Rechteck 20"/>
+          <p:cNvSpPr/>
+          <p:nvPr/>
+        </p:nvSpPr>
+        <p:spPr>
+          <a:xfrm>
+            <a:off x="5585033" y="1413893"/>
+            <a:ext cx="1206598" cy="270128"/>
+          </a:xfrm>
+          <a:prstGeom prst="rect">
+            <a:avLst/>
+          </a:prstGeom>
+        </p:spPr>
+        <p:style>
+          <a:lnRef idx="2">
+            <a:schemeClr val="accent6">
+              <a:shade val="50000"/>
+            </a:schemeClr>
+          </a:lnRef>
+          <a:fillRef idx="1">
+            <a:schemeClr val="accent6"/>
+          </a:fillRef>
+          <a:effectRef idx="0">
+            <a:schemeClr val="accent6"/>
+          </a:effectRef>
+          <a:fontRef idx="minor">
+            <a:schemeClr val="lt1"/>
+          </a:fontRef>
+        </p:style>
+        <p:txBody>
+          <a:bodyPr rtlCol="0" anchor="ctr"/>
+          <a:lstStyle/>
+          <a:p>
+            <a:pPr algn="ctr"/>
+            <a:r>
+              <a:rPr lang="de-DE" sz="1100" dirty="0" err="1" smtClean="0"/>
+              <a:t>short</a:t>
+            </a:r>
+            <a:endParaRPr lang="de-DE" sz="1100" dirty="0"/>
+          </a:p>
+        </p:txBody>
+      </p:sp>
+      <p:sp>
+        <p:nvSpPr>
+          <p:cNvPr id="22" name="Rechteck 21"/>
+          <p:cNvSpPr/>
+          <p:nvPr/>
+        </p:nvSpPr>
+        <p:spPr>
+          <a:xfrm>
+            <a:off x="5585033" y="1795178"/>
+            <a:ext cx="1206598" cy="270128"/>
+          </a:xfrm>
+          <a:prstGeom prst="rect">
+            <a:avLst/>
+          </a:prstGeom>
+        </p:spPr>
+        <p:style>
+          <a:lnRef idx="2">
+            <a:schemeClr val="accent6">
+              <a:shade val="50000"/>
+            </a:schemeClr>
+          </a:lnRef>
+          <a:fillRef idx="1">
+            <a:schemeClr val="accent6"/>
+          </a:fillRef>
+          <a:effectRef idx="0">
+            <a:schemeClr val="accent6"/>
+          </a:effectRef>
+          <a:fontRef idx="minor">
+            <a:schemeClr val="lt1"/>
+          </a:fontRef>
+        </p:style>
+        <p:txBody>
+          <a:bodyPr rtlCol="0" anchor="ctr"/>
+          <a:lstStyle/>
+          <a:p>
+            <a:pPr algn="ctr"/>
+            <a:r>
+              <a:rPr lang="de-DE" sz="1100" dirty="0" smtClean="0"/>
+              <a:t>integer</a:t>
+            </a:r>
+            <a:endParaRPr lang="de-DE" sz="1100" dirty="0"/>
+          </a:p>
+        </p:txBody>
+      </p:sp>
+      <p:sp>
+        <p:nvSpPr>
+          <p:cNvPr id="23" name="Rechteck 22"/>
+          <p:cNvSpPr/>
+          <p:nvPr/>
+        </p:nvSpPr>
+        <p:spPr>
+          <a:xfrm>
+            <a:off x="5585033" y="2176463"/>
+            <a:ext cx="1206598" cy="270128"/>
+          </a:xfrm>
+          <a:prstGeom prst="rect">
+            <a:avLst/>
+          </a:prstGeom>
+        </p:spPr>
+        <p:style>
+          <a:lnRef idx="2">
+            <a:schemeClr val="accent6">
+              <a:shade val="50000"/>
+            </a:schemeClr>
+          </a:lnRef>
+          <a:fillRef idx="1">
+            <a:schemeClr val="accent6"/>
+          </a:fillRef>
+          <a:effectRef idx="0">
+            <a:schemeClr val="accent6"/>
+          </a:effectRef>
+          <a:fontRef idx="minor">
+            <a:schemeClr val="lt1"/>
+          </a:fontRef>
+        </p:style>
+        <p:txBody>
+          <a:bodyPr rtlCol="0" anchor="ctr"/>
+          <a:lstStyle/>
+          <a:p>
+            <a:pPr algn="ctr"/>
+            <a:r>
+              <a:rPr lang="de-DE" sz="1100" dirty="0" err="1" smtClean="0"/>
+              <a:t>long</a:t>
+            </a:r>
+            <a:endParaRPr lang="de-DE" sz="1100" dirty="0"/>
+          </a:p>
+        </p:txBody>
+      </p:sp>
+      <p:sp>
+        <p:nvSpPr>
+          <p:cNvPr id="24" name="Rechteck 23"/>
+          <p:cNvSpPr/>
+          <p:nvPr/>
+        </p:nvSpPr>
+        <p:spPr>
+          <a:xfrm>
+            <a:off x="5585032" y="2557748"/>
+            <a:ext cx="1206598" cy="270128"/>
+          </a:xfrm>
+          <a:prstGeom prst="rect">
+            <a:avLst/>
+          </a:prstGeom>
+        </p:spPr>
+        <p:style>
+          <a:lnRef idx="2">
+            <a:schemeClr val="accent6">
+              <a:shade val="50000"/>
+            </a:schemeClr>
+          </a:lnRef>
+          <a:fillRef idx="1">
+            <a:schemeClr val="accent6"/>
+          </a:fillRef>
+          <a:effectRef idx="0">
+            <a:schemeClr val="accent6"/>
+          </a:effectRef>
+          <a:fontRef idx="minor">
+            <a:schemeClr val="lt1"/>
+          </a:fontRef>
+        </p:style>
+        <p:txBody>
+          <a:bodyPr rtlCol="0" anchor="ctr"/>
+          <a:lstStyle/>
+          <a:p>
+            <a:pPr algn="ctr"/>
+            <a:r>
+              <a:rPr lang="de-DE" sz="1100" dirty="0" smtClean="0"/>
+              <a:t>double</a:t>
+            </a:r>
+            <a:endParaRPr lang="de-DE" sz="1100" dirty="0"/>
+          </a:p>
+        </p:txBody>
+      </p:sp>
+      <p:sp>
+        <p:nvSpPr>
+          <p:cNvPr id="25" name="Rechteck 24"/>
+          <p:cNvSpPr/>
+          <p:nvPr/>
+        </p:nvSpPr>
+        <p:spPr>
+          <a:xfrm>
+            <a:off x="5585032" y="2939033"/>
+            <a:ext cx="1206598" cy="270128"/>
+          </a:xfrm>
+          <a:prstGeom prst="rect">
+            <a:avLst/>
+          </a:prstGeom>
+        </p:spPr>
+        <p:style>
+          <a:lnRef idx="2">
+            <a:schemeClr val="accent6">
+              <a:shade val="50000"/>
+            </a:schemeClr>
+          </a:lnRef>
+          <a:fillRef idx="1">
+            <a:schemeClr val="accent6"/>
+          </a:fillRef>
+          <a:effectRef idx="0">
+            <a:schemeClr val="accent6"/>
+          </a:effectRef>
+          <a:fontRef idx="minor">
+            <a:schemeClr val="lt1"/>
+          </a:fontRef>
+        </p:style>
+        <p:txBody>
+          <a:bodyPr rtlCol="0" anchor="ctr"/>
+          <a:lstStyle/>
+          <a:p>
+            <a:pPr algn="ctr"/>
+            <a:r>
+              <a:rPr lang="de-DE" sz="1100" dirty="0" err="1" smtClean="0"/>
+              <a:t>date</a:t>
+            </a:r>
+            <a:endParaRPr lang="de-DE" sz="1100" dirty="0"/>
+          </a:p>
+        </p:txBody>
+      </p:sp>
+      <p:sp>
+        <p:nvSpPr>
+          <p:cNvPr id="26" name="Rechteck 25"/>
+          <p:cNvSpPr/>
+          <p:nvPr/>
+        </p:nvSpPr>
+        <p:spPr>
+          <a:xfrm>
+            <a:off x="5585032" y="3320318"/>
+            <a:ext cx="1206598" cy="270128"/>
+          </a:xfrm>
+          <a:prstGeom prst="rect">
+            <a:avLst/>
+          </a:prstGeom>
+        </p:spPr>
+        <p:style>
+          <a:lnRef idx="2">
+            <a:schemeClr val="accent6">
+              <a:shade val="50000"/>
+            </a:schemeClr>
+          </a:lnRef>
+          <a:fillRef idx="1">
+            <a:schemeClr val="accent6"/>
+          </a:fillRef>
+          <a:effectRef idx="0">
+            <a:schemeClr val="accent6"/>
+          </a:effectRef>
+          <a:fontRef idx="minor">
+            <a:schemeClr val="lt1"/>
+          </a:fontRef>
+        </p:style>
+        <p:txBody>
+          <a:bodyPr rtlCol="0" anchor="ctr"/>
+          <a:lstStyle/>
+          <a:p>
+            <a:pPr algn="ctr"/>
+            <a:r>
+              <a:rPr lang="de-DE" sz="1100" dirty="0" err="1" smtClean="0"/>
+              <a:t>string</a:t>
+            </a:r>
+            <a:endParaRPr lang="de-DE" sz="1100" dirty="0"/>
+          </a:p>
+        </p:txBody>
+      </p:sp>
+      <p:sp>
+        <p:nvSpPr>
+          <p:cNvPr id="27" name="Rechteck 26"/>
+          <p:cNvSpPr/>
+          <p:nvPr/>
+        </p:nvSpPr>
+        <p:spPr>
+          <a:xfrm>
+            <a:off x="5585032" y="3701603"/>
+            <a:ext cx="1206598" cy="270128"/>
+          </a:xfrm>
+          <a:prstGeom prst="rect">
+            <a:avLst/>
+          </a:prstGeom>
+        </p:spPr>
+        <p:style>
+          <a:lnRef idx="2">
+            <a:schemeClr val="accent6">
+              <a:shade val="50000"/>
+            </a:schemeClr>
+          </a:lnRef>
+          <a:fillRef idx="1">
+            <a:schemeClr val="accent6"/>
+          </a:fillRef>
+          <a:effectRef idx="0">
+            <a:schemeClr val="accent6"/>
+          </a:effectRef>
+          <a:fontRef idx="minor">
+            <a:schemeClr val="lt1"/>
+          </a:fontRef>
+        </p:style>
+        <p:txBody>
+          <a:bodyPr rtlCol="0" anchor="ctr"/>
+          <a:lstStyle/>
+          <a:p>
+            <a:pPr algn="ctr"/>
+            <a:r>
+              <a:rPr lang="de-DE" sz="1100" dirty="0" smtClean="0"/>
+              <a:t>null</a:t>
+            </a:r>
+            <a:endParaRPr lang="de-DE" sz="1100" dirty="0"/>
+          </a:p>
+        </p:txBody>
+      </p:sp>
+      <p:sp>
+        <p:nvSpPr>
+          <p:cNvPr id="28" name="Rechteck 27"/>
+          <p:cNvSpPr/>
+          <p:nvPr/>
+        </p:nvSpPr>
+        <p:spPr>
+          <a:xfrm>
+            <a:off x="5585032" y="4284359"/>
+            <a:ext cx="1206598" cy="270128"/>
+          </a:xfrm>
+          <a:prstGeom prst="rect">
+            <a:avLst/>
+          </a:prstGeom>
+          <a:solidFill>
+            <a:schemeClr val="accent4">
+              <a:lumMod val="75000"/>
+            </a:schemeClr>
+          </a:solidFill>
+          <a:ln>
+            <a:solidFill>
+              <a:schemeClr val="accent4">
+                <a:lumMod val="50000"/>
+              </a:schemeClr>
+            </a:solidFill>
+          </a:ln>
+        </p:spPr>
+        <p:style>
+          <a:lnRef idx="2">
+            <a:schemeClr val="accent6">
+              <a:shade val="50000"/>
+            </a:schemeClr>
+          </a:lnRef>
+          <a:fillRef idx="1">
+            <a:schemeClr val="accent6"/>
+          </a:fillRef>
+          <a:effectRef idx="0">
+            <a:schemeClr val="accent6"/>
+          </a:effectRef>
+          <a:fontRef idx="minor">
+            <a:schemeClr val="lt1"/>
+          </a:fontRef>
+        </p:style>
+        <p:txBody>
+          <a:bodyPr rtlCol="0" anchor="ctr"/>
+          <a:lstStyle/>
+          <a:p>
+            <a:pPr algn="ctr"/>
+            <a:r>
+              <a:rPr lang="de-DE" sz="1100" dirty="0" err="1" smtClean="0"/>
+              <a:t>serializable</a:t>
+            </a:r>
+            <a:endParaRPr lang="de-DE" sz="1100" dirty="0"/>
+          </a:p>
+        </p:txBody>
+      </p:sp>
+      <p:sp>
+        <p:nvSpPr>
+          <p:cNvPr id="29" name="Rechteck 28"/>
+          <p:cNvSpPr/>
+          <p:nvPr/>
+        </p:nvSpPr>
+        <p:spPr>
+          <a:xfrm>
+            <a:off x="5585032" y="4658568"/>
+            <a:ext cx="1206600" cy="270128"/>
+          </a:xfrm>
+          <a:prstGeom prst="rect">
+            <a:avLst/>
+          </a:prstGeom>
+          <a:solidFill>
+            <a:schemeClr val="accent4">
+              <a:lumMod val="75000"/>
+            </a:schemeClr>
+          </a:solidFill>
+          <a:ln>
+            <a:solidFill>
+              <a:schemeClr val="accent4">
+                <a:lumMod val="50000"/>
+              </a:schemeClr>
+            </a:solidFill>
+          </a:ln>
+        </p:spPr>
+        <p:style>
+          <a:lnRef idx="2">
+            <a:schemeClr val="accent6">
+              <a:shade val="50000"/>
+            </a:schemeClr>
+          </a:lnRef>
+          <a:fillRef idx="1">
+            <a:schemeClr val="accent6"/>
+          </a:fillRef>
+          <a:effectRef idx="0">
+            <a:schemeClr val="accent6"/>
+          </a:effectRef>
+          <a:fontRef idx="minor">
+            <a:schemeClr val="lt1"/>
+          </a:fontRef>
+        </p:style>
+        <p:txBody>
+          <a:bodyPr rtlCol="0" anchor="ctr"/>
+          <a:lstStyle/>
+          <a:p>
+            <a:pPr algn="ctr"/>
+            <a:r>
+              <a:rPr lang="de-DE" sz="1100" dirty="0" err="1" smtClean="0"/>
               <a:t>spin-serialization</a:t>
             </a:r>
             <a:endParaRPr lang="de-DE" sz="1100" dirty="0"/>
@@ -7268,7 +7888,7 @@
         </p:nvSpPr>
         <p:spPr>
           <a:xfrm>
-            <a:off x="4849275" y="102046"/>
+            <a:off x="5537193" y="129374"/>
             <a:ext cx="1302276" cy="307777"/>
           </a:xfrm>
           <a:prstGeom prst="rect">
@@ -7306,7 +7926,7 @@
         <p:spPr>
           <a:xfrm flipH="1" flipV="1">
             <a:off x="3648668" y="3068290"/>
-            <a:ext cx="1296284" cy="1351133"/>
+            <a:ext cx="1936364" cy="1351133"/>
           </a:xfrm>
           <a:prstGeom prst="line">
             <a:avLst/>
@@ -7340,7 +7960,7 @@
         <p:spPr>
           <a:xfrm flipH="1">
             <a:off x="3648668" y="786387"/>
-            <a:ext cx="1296285" cy="290971"/>
+            <a:ext cx="1936365" cy="290971"/>
           </a:xfrm>
           <a:prstGeom prst="line">
             <a:avLst/>
@@ -7374,7 +7994,7 @@
         <p:spPr>
           <a:xfrm flipH="1" flipV="1">
             <a:off x="3648668" y="2072824"/>
-            <a:ext cx="1296284" cy="1382558"/>
+            <a:ext cx="1936364" cy="1382558"/>
           </a:xfrm>
           <a:prstGeom prst="line">
             <a:avLst/>
@@ -7396,181 +8016,6 @@
           </a:fontRef>
         </p:style>
       </p:cxnSp>
-      <p:sp>
-        <p:nvSpPr>
-          <p:cNvPr id="44" name="Geschweifte Klammer rechts 43"/>
-          <p:cNvSpPr/>
-          <p:nvPr/>
-        </p:nvSpPr>
-        <p:spPr>
-          <a:xfrm>
-            <a:off x="6357398" y="653049"/>
-            <a:ext cx="350818" cy="3318682"/>
-          </a:xfrm>
-          <a:prstGeom prst="rightBrace">
-            <a:avLst>
-              <a:gd name="adj1" fmla="val 73666"/>
-              <a:gd name="adj2" fmla="val 50560"/>
-            </a:avLst>
-          </a:prstGeom>
-          <a:ln w="28575"/>
-        </p:spPr>
-        <p:style>
-          <a:lnRef idx="3">
-            <a:schemeClr val="dk1"/>
-          </a:lnRef>
-          <a:fillRef idx="0">
-            <a:schemeClr val="dk1"/>
-          </a:fillRef>
-          <a:effectRef idx="2">
-            <a:schemeClr val="dk1"/>
-          </a:effectRef>
-          <a:fontRef idx="minor">
-            <a:schemeClr val="tx1"/>
-          </a:fontRef>
-        </p:style>
-        <p:txBody>
-          <a:bodyPr rtlCol="0" anchor="ctr"/>
-          <a:lstStyle/>
-          <a:p>
-            <a:pPr algn="ctr"/>
-            <a:endParaRPr lang="de-DE" sz="1100"/>
-          </a:p>
-        </p:txBody>
-      </p:sp>
-      <p:sp>
-        <p:nvSpPr>
-          <p:cNvPr id="45" name="Geschweifte Klammer rechts 44"/>
-          <p:cNvSpPr/>
-          <p:nvPr/>
-        </p:nvSpPr>
-        <p:spPr>
-          <a:xfrm>
-            <a:off x="6357398" y="4284359"/>
-            <a:ext cx="350818" cy="644337"/>
-          </a:xfrm>
-          <a:prstGeom prst="rightBrace">
-            <a:avLst>
-              <a:gd name="adj1" fmla="val 73666"/>
-              <a:gd name="adj2" fmla="val 50560"/>
-            </a:avLst>
-          </a:prstGeom>
-          <a:ln w="28575"/>
-        </p:spPr>
-        <p:style>
-          <a:lnRef idx="3">
-            <a:schemeClr val="dk1"/>
-          </a:lnRef>
-          <a:fillRef idx="0">
-            <a:schemeClr val="dk1"/>
-          </a:fillRef>
-          <a:effectRef idx="2">
-            <a:schemeClr val="dk1"/>
-          </a:effectRef>
-          <a:fontRef idx="minor">
-            <a:schemeClr val="tx1"/>
-          </a:fontRef>
-        </p:style>
-        <p:txBody>
-          <a:bodyPr rtlCol="0" anchor="ctr"/>
-          <a:lstStyle/>
-          <a:p>
-            <a:pPr algn="ctr"/>
-            <a:endParaRPr lang="de-DE" sz="1100"/>
-          </a:p>
-        </p:txBody>
-      </p:sp>
-      <p:sp>
-        <p:nvSpPr>
-          <p:cNvPr id="46" name="Textfeld 45"/>
-          <p:cNvSpPr txBox="1"/>
-          <p:nvPr/>
-        </p:nvSpPr>
-        <p:spPr>
-          <a:xfrm>
-            <a:off x="6851423" y="2049917"/>
-            <a:ext cx="855116" cy="523220"/>
-          </a:xfrm>
-          <a:prstGeom prst="rect">
-            <a:avLst/>
-          </a:prstGeom>
-          <a:noFill/>
-        </p:spPr>
-        <p:txBody>
-          <a:bodyPr wrap="square" rtlCol="0">
-            <a:spAutoFit/>
-          </a:bodyPr>
-          <a:lstStyle/>
-          <a:p>
-            <a:r>
-              <a:rPr lang="de-DE" sz="1400" dirty="0" smtClean="0"/>
-              <a:t>Primitive </a:t>
-            </a:r>
-            <a:r>
-              <a:rPr lang="de-DE" sz="1400" dirty="0" err="1" smtClean="0"/>
-              <a:t>Types</a:t>
-            </a:r>
-            <a:endParaRPr lang="de-DE" sz="1400" dirty="0"/>
-          </a:p>
-        </p:txBody>
-      </p:sp>
-      <p:sp>
-        <p:nvSpPr>
-          <p:cNvPr id="47" name="Textfeld 46"/>
-          <p:cNvSpPr txBox="1"/>
-          <p:nvPr/>
-        </p:nvSpPr>
-        <p:spPr>
-          <a:xfrm>
-            <a:off x="6914062" y="4129473"/>
-            <a:ext cx="1035840" cy="954107"/>
-          </a:xfrm>
-          <a:prstGeom prst="rect">
-            <a:avLst/>
-          </a:prstGeom>
-          <a:noFill/>
-        </p:spPr>
-        <p:txBody>
-          <a:bodyPr wrap="square" rtlCol="0">
-            <a:spAutoFit/>
-          </a:bodyPr>
-          <a:lstStyle/>
-          <a:p>
-            <a:r>
-              <a:rPr lang="de-DE" sz="1400" dirty="0" smtClean="0"/>
-              <a:t>Custom </a:t>
-            </a:r>
-            <a:r>
-              <a:rPr lang="de-DE" sz="1400" dirty="0" err="1" smtClean="0"/>
-              <a:t>Object</a:t>
-            </a:r>
-            <a:r>
-              <a:rPr lang="de-DE" sz="1400" dirty="0" smtClean="0"/>
-              <a:t> </a:t>
-            </a:r>
-            <a:r>
-              <a:rPr lang="de-DE" sz="1400" dirty="0" err="1" smtClean="0"/>
-              <a:t>Types</a:t>
-            </a:r>
-            <a:endParaRPr lang="de-DE" sz="1400" dirty="0" smtClean="0"/>
-          </a:p>
-          <a:p>
-            <a:r>
-              <a:rPr lang="de-DE" sz="1400" dirty="0" smtClean="0"/>
-              <a:t>(</a:t>
-            </a:r>
-            <a:r>
-              <a:rPr lang="de-DE" sz="1400" dirty="0" err="1" smtClean="0"/>
-              <a:t>exclusive</a:t>
-            </a:r>
-            <a:r>
-              <a:rPr lang="de-DE" sz="1400" dirty="0" smtClean="0"/>
-              <a:t>)</a:t>
-            </a:r>
-            <a:endParaRPr lang="de-DE" sz="1400" dirty="0"/>
-          </a:p>
-        </p:txBody>
-      </p:sp>
       <p:sp>
         <p:nvSpPr>
           <p:cNvPr id="34" name="Textfeld 33"/>
@@ -8132,1248 +8577,6 @@
           </p:sp>
         </p:grpSp>
       </p:grpSp>
-    </p:spTree>
-    <p:extLst>
-      <p:ext uri="{BB962C8B-B14F-4D97-AF65-F5344CB8AC3E}">
-        <p14:creationId xmlns:p14="http://schemas.microsoft.com/office/powerpoint/2010/main" val="3110557700"/>
-      </p:ext>
-    </p:extLst>
-  </p:cSld>
-  <p:clrMapOvr>
-    <a:masterClrMapping/>
-  </p:clrMapOvr>
-  <p:timing>
-    <p:tnLst>
-      <p:par>
-        <p:cTn id="1" dur="indefinite" restart="never" nodeType="tmRoot"/>
-      </p:par>
-    </p:tnLst>
-  </p:timing>
-</p:sld>
-</file>
-
-<file path=ppt/slides/slide6.xml><?xml version="1.0" encoding="utf-8"?>
-<p:sld xmlns:a="http://schemas.openxmlformats.org/drawingml/2006/main" xmlns:r="http://schemas.openxmlformats.org/officeDocument/2006/relationships" xmlns:p="http://schemas.openxmlformats.org/presentationml/2006/main">
-  <p:cSld>
-    <p:spTree>
-      <p:nvGrpSpPr>
-        <p:cNvPr id="1" name=""/>
-        <p:cNvGrpSpPr/>
-        <p:nvPr/>
-      </p:nvGrpSpPr>
-      <p:grpSpPr>
-        <a:xfrm>
-          <a:off x="0" y="0"/>
-          <a:ext cx="0" cy="0"/>
-          <a:chOff x="0" y="0"/>
-          <a:chExt cx="0" cy="0"/>
-        </a:xfrm>
-      </p:grpSpPr>
-      <p:sp>
-        <p:nvSpPr>
-          <p:cNvPr id="19" name="Rechteck 18"/>
-          <p:cNvSpPr/>
-          <p:nvPr/>
-        </p:nvSpPr>
-        <p:spPr>
-          <a:xfrm>
-            <a:off x="5585033" y="651323"/>
-            <a:ext cx="1206598" cy="270128"/>
-          </a:xfrm>
-          <a:prstGeom prst="rect">
-            <a:avLst/>
-          </a:prstGeom>
-        </p:spPr>
-        <p:style>
-          <a:lnRef idx="2">
-            <a:schemeClr val="accent6">
-              <a:shade val="50000"/>
-            </a:schemeClr>
-          </a:lnRef>
-          <a:fillRef idx="1">
-            <a:schemeClr val="accent6"/>
-          </a:fillRef>
-          <a:effectRef idx="0">
-            <a:schemeClr val="accent6"/>
-          </a:effectRef>
-          <a:fontRef idx="minor">
-            <a:schemeClr val="lt1"/>
-          </a:fontRef>
-        </p:style>
-        <p:txBody>
-          <a:bodyPr rtlCol="0" anchor="ctr"/>
-          <a:lstStyle/>
-          <a:p>
-            <a:pPr algn="ctr"/>
-            <a:r>
-              <a:rPr lang="de-DE" sz="1100" dirty="0" err="1" smtClean="0"/>
-              <a:t>boolean</a:t>
-            </a:r>
-            <a:endParaRPr lang="de-DE" sz="1100" dirty="0"/>
-          </a:p>
-        </p:txBody>
-      </p:sp>
-      <p:sp>
-        <p:nvSpPr>
-          <p:cNvPr id="20" name="Rechteck 19"/>
-          <p:cNvSpPr/>
-          <p:nvPr/>
-        </p:nvSpPr>
-        <p:spPr>
-          <a:xfrm>
-            <a:off x="5585033" y="1032608"/>
-            <a:ext cx="1206598" cy="270128"/>
-          </a:xfrm>
-          <a:prstGeom prst="rect">
-            <a:avLst/>
-          </a:prstGeom>
-        </p:spPr>
-        <p:style>
-          <a:lnRef idx="2">
-            <a:schemeClr val="accent6">
-              <a:shade val="50000"/>
-            </a:schemeClr>
-          </a:lnRef>
-          <a:fillRef idx="1">
-            <a:schemeClr val="accent6"/>
-          </a:fillRef>
-          <a:effectRef idx="0">
-            <a:schemeClr val="accent6"/>
-          </a:effectRef>
-          <a:fontRef idx="minor">
-            <a:schemeClr val="lt1"/>
-          </a:fontRef>
-        </p:style>
-        <p:txBody>
-          <a:bodyPr rtlCol="0" anchor="ctr"/>
-          <a:lstStyle/>
-          <a:p>
-            <a:pPr algn="ctr"/>
-            <a:r>
-              <a:rPr lang="de-DE" sz="1100" dirty="0" err="1" smtClean="0"/>
-              <a:t>bytes</a:t>
-            </a:r>
-            <a:endParaRPr lang="de-DE" sz="1100" dirty="0"/>
-          </a:p>
-        </p:txBody>
-      </p:sp>
-      <p:sp>
-        <p:nvSpPr>
-          <p:cNvPr id="21" name="Rechteck 20"/>
-          <p:cNvSpPr/>
-          <p:nvPr/>
-        </p:nvSpPr>
-        <p:spPr>
-          <a:xfrm>
-            <a:off x="5585033" y="1413893"/>
-            <a:ext cx="1206598" cy="270128"/>
-          </a:xfrm>
-          <a:prstGeom prst="rect">
-            <a:avLst/>
-          </a:prstGeom>
-        </p:spPr>
-        <p:style>
-          <a:lnRef idx="2">
-            <a:schemeClr val="accent6">
-              <a:shade val="50000"/>
-            </a:schemeClr>
-          </a:lnRef>
-          <a:fillRef idx="1">
-            <a:schemeClr val="accent6"/>
-          </a:fillRef>
-          <a:effectRef idx="0">
-            <a:schemeClr val="accent6"/>
-          </a:effectRef>
-          <a:fontRef idx="minor">
-            <a:schemeClr val="lt1"/>
-          </a:fontRef>
-        </p:style>
-        <p:txBody>
-          <a:bodyPr rtlCol="0" anchor="ctr"/>
-          <a:lstStyle/>
-          <a:p>
-            <a:pPr algn="ctr"/>
-            <a:r>
-              <a:rPr lang="de-DE" sz="1100" dirty="0" err="1" smtClean="0"/>
-              <a:t>short</a:t>
-            </a:r>
-            <a:endParaRPr lang="de-DE" sz="1100" dirty="0"/>
-          </a:p>
-        </p:txBody>
-      </p:sp>
-      <p:sp>
-        <p:nvSpPr>
-          <p:cNvPr id="22" name="Rechteck 21"/>
-          <p:cNvSpPr/>
-          <p:nvPr/>
-        </p:nvSpPr>
-        <p:spPr>
-          <a:xfrm>
-            <a:off x="5585033" y="1795178"/>
-            <a:ext cx="1206598" cy="270128"/>
-          </a:xfrm>
-          <a:prstGeom prst="rect">
-            <a:avLst/>
-          </a:prstGeom>
-        </p:spPr>
-        <p:style>
-          <a:lnRef idx="2">
-            <a:schemeClr val="accent6">
-              <a:shade val="50000"/>
-            </a:schemeClr>
-          </a:lnRef>
-          <a:fillRef idx="1">
-            <a:schemeClr val="accent6"/>
-          </a:fillRef>
-          <a:effectRef idx="0">
-            <a:schemeClr val="accent6"/>
-          </a:effectRef>
-          <a:fontRef idx="minor">
-            <a:schemeClr val="lt1"/>
-          </a:fontRef>
-        </p:style>
-        <p:txBody>
-          <a:bodyPr rtlCol="0" anchor="ctr"/>
-          <a:lstStyle/>
-          <a:p>
-            <a:pPr algn="ctr"/>
-            <a:r>
-              <a:rPr lang="de-DE" sz="1100" dirty="0" smtClean="0"/>
-              <a:t>integer</a:t>
-            </a:r>
-            <a:endParaRPr lang="de-DE" sz="1100" dirty="0"/>
-          </a:p>
-        </p:txBody>
-      </p:sp>
-      <p:sp>
-        <p:nvSpPr>
-          <p:cNvPr id="23" name="Rechteck 22"/>
-          <p:cNvSpPr/>
-          <p:nvPr/>
-        </p:nvSpPr>
-        <p:spPr>
-          <a:xfrm>
-            <a:off x="5585033" y="2176463"/>
-            <a:ext cx="1206598" cy="270128"/>
-          </a:xfrm>
-          <a:prstGeom prst="rect">
-            <a:avLst/>
-          </a:prstGeom>
-        </p:spPr>
-        <p:style>
-          <a:lnRef idx="2">
-            <a:schemeClr val="accent6">
-              <a:shade val="50000"/>
-            </a:schemeClr>
-          </a:lnRef>
-          <a:fillRef idx="1">
-            <a:schemeClr val="accent6"/>
-          </a:fillRef>
-          <a:effectRef idx="0">
-            <a:schemeClr val="accent6"/>
-          </a:effectRef>
-          <a:fontRef idx="minor">
-            <a:schemeClr val="lt1"/>
-          </a:fontRef>
-        </p:style>
-        <p:txBody>
-          <a:bodyPr rtlCol="0" anchor="ctr"/>
-          <a:lstStyle/>
-          <a:p>
-            <a:pPr algn="ctr"/>
-            <a:r>
-              <a:rPr lang="de-DE" sz="1100" dirty="0" err="1" smtClean="0"/>
-              <a:t>long</a:t>
-            </a:r>
-            <a:endParaRPr lang="de-DE" sz="1100" dirty="0"/>
-          </a:p>
-        </p:txBody>
-      </p:sp>
-      <p:sp>
-        <p:nvSpPr>
-          <p:cNvPr id="24" name="Rechteck 23"/>
-          <p:cNvSpPr/>
-          <p:nvPr/>
-        </p:nvSpPr>
-        <p:spPr>
-          <a:xfrm>
-            <a:off x="5585032" y="2557748"/>
-            <a:ext cx="1206598" cy="270128"/>
-          </a:xfrm>
-          <a:prstGeom prst="rect">
-            <a:avLst/>
-          </a:prstGeom>
-        </p:spPr>
-        <p:style>
-          <a:lnRef idx="2">
-            <a:schemeClr val="accent6">
-              <a:shade val="50000"/>
-            </a:schemeClr>
-          </a:lnRef>
-          <a:fillRef idx="1">
-            <a:schemeClr val="accent6"/>
-          </a:fillRef>
-          <a:effectRef idx="0">
-            <a:schemeClr val="accent6"/>
-          </a:effectRef>
-          <a:fontRef idx="minor">
-            <a:schemeClr val="lt1"/>
-          </a:fontRef>
-        </p:style>
-        <p:txBody>
-          <a:bodyPr rtlCol="0" anchor="ctr"/>
-          <a:lstStyle/>
-          <a:p>
-            <a:pPr algn="ctr"/>
-            <a:r>
-              <a:rPr lang="de-DE" sz="1100" dirty="0" smtClean="0"/>
-              <a:t>double</a:t>
-            </a:r>
-            <a:endParaRPr lang="de-DE" sz="1100" dirty="0"/>
-          </a:p>
-        </p:txBody>
-      </p:sp>
-      <p:sp>
-        <p:nvSpPr>
-          <p:cNvPr id="25" name="Rechteck 24"/>
-          <p:cNvSpPr/>
-          <p:nvPr/>
-        </p:nvSpPr>
-        <p:spPr>
-          <a:xfrm>
-            <a:off x="5585032" y="2939033"/>
-            <a:ext cx="1206598" cy="270128"/>
-          </a:xfrm>
-          <a:prstGeom prst="rect">
-            <a:avLst/>
-          </a:prstGeom>
-        </p:spPr>
-        <p:style>
-          <a:lnRef idx="2">
-            <a:schemeClr val="accent6">
-              <a:shade val="50000"/>
-            </a:schemeClr>
-          </a:lnRef>
-          <a:fillRef idx="1">
-            <a:schemeClr val="accent6"/>
-          </a:fillRef>
-          <a:effectRef idx="0">
-            <a:schemeClr val="accent6"/>
-          </a:effectRef>
-          <a:fontRef idx="minor">
-            <a:schemeClr val="lt1"/>
-          </a:fontRef>
-        </p:style>
-        <p:txBody>
-          <a:bodyPr rtlCol="0" anchor="ctr"/>
-          <a:lstStyle/>
-          <a:p>
-            <a:pPr algn="ctr"/>
-            <a:r>
-              <a:rPr lang="de-DE" sz="1100" dirty="0" err="1" smtClean="0"/>
-              <a:t>date</a:t>
-            </a:r>
-            <a:endParaRPr lang="de-DE" sz="1100" dirty="0"/>
-          </a:p>
-        </p:txBody>
-      </p:sp>
-      <p:sp>
-        <p:nvSpPr>
-          <p:cNvPr id="26" name="Rechteck 25"/>
-          <p:cNvSpPr/>
-          <p:nvPr/>
-        </p:nvSpPr>
-        <p:spPr>
-          <a:xfrm>
-            <a:off x="5585032" y="3320318"/>
-            <a:ext cx="1206598" cy="270128"/>
-          </a:xfrm>
-          <a:prstGeom prst="rect">
-            <a:avLst/>
-          </a:prstGeom>
-        </p:spPr>
-        <p:style>
-          <a:lnRef idx="2">
-            <a:schemeClr val="accent6">
-              <a:shade val="50000"/>
-            </a:schemeClr>
-          </a:lnRef>
-          <a:fillRef idx="1">
-            <a:schemeClr val="accent6"/>
-          </a:fillRef>
-          <a:effectRef idx="0">
-            <a:schemeClr val="accent6"/>
-          </a:effectRef>
-          <a:fontRef idx="minor">
-            <a:schemeClr val="lt1"/>
-          </a:fontRef>
-        </p:style>
-        <p:txBody>
-          <a:bodyPr rtlCol="0" anchor="ctr"/>
-          <a:lstStyle/>
-          <a:p>
-            <a:pPr algn="ctr"/>
-            <a:r>
-              <a:rPr lang="de-DE" sz="1100" dirty="0" err="1" smtClean="0"/>
-              <a:t>string</a:t>
-            </a:r>
-            <a:endParaRPr lang="de-DE" sz="1100" dirty="0"/>
-          </a:p>
-        </p:txBody>
-      </p:sp>
-      <p:sp>
-        <p:nvSpPr>
-          <p:cNvPr id="27" name="Rechteck 26"/>
-          <p:cNvSpPr/>
-          <p:nvPr/>
-        </p:nvSpPr>
-        <p:spPr>
-          <a:xfrm>
-            <a:off x="5585032" y="3701603"/>
-            <a:ext cx="1206598" cy="270128"/>
-          </a:xfrm>
-          <a:prstGeom prst="rect">
-            <a:avLst/>
-          </a:prstGeom>
-        </p:spPr>
-        <p:style>
-          <a:lnRef idx="2">
-            <a:schemeClr val="accent6">
-              <a:shade val="50000"/>
-            </a:schemeClr>
-          </a:lnRef>
-          <a:fillRef idx="1">
-            <a:schemeClr val="accent6"/>
-          </a:fillRef>
-          <a:effectRef idx="0">
-            <a:schemeClr val="accent6"/>
-          </a:effectRef>
-          <a:fontRef idx="minor">
-            <a:schemeClr val="lt1"/>
-          </a:fontRef>
-        </p:style>
-        <p:txBody>
-          <a:bodyPr rtlCol="0" anchor="ctr"/>
-          <a:lstStyle/>
-          <a:p>
-            <a:pPr algn="ctr"/>
-            <a:r>
-              <a:rPr lang="de-DE" sz="1100" dirty="0" smtClean="0"/>
-              <a:t>null</a:t>
-            </a:r>
-            <a:endParaRPr lang="de-DE" sz="1100" dirty="0"/>
-          </a:p>
-        </p:txBody>
-      </p:sp>
-      <p:sp>
-        <p:nvSpPr>
-          <p:cNvPr id="28" name="Rechteck 27"/>
-          <p:cNvSpPr/>
-          <p:nvPr/>
-        </p:nvSpPr>
-        <p:spPr>
-          <a:xfrm>
-            <a:off x="5585032" y="4284359"/>
-            <a:ext cx="1206598" cy="270128"/>
-          </a:xfrm>
-          <a:prstGeom prst="rect">
-            <a:avLst/>
-          </a:prstGeom>
-          <a:solidFill>
-            <a:schemeClr val="accent4">
-              <a:lumMod val="75000"/>
-            </a:schemeClr>
-          </a:solidFill>
-          <a:ln>
-            <a:solidFill>
-              <a:schemeClr val="accent4">
-                <a:lumMod val="50000"/>
-              </a:schemeClr>
-            </a:solidFill>
-          </a:ln>
-        </p:spPr>
-        <p:style>
-          <a:lnRef idx="2">
-            <a:schemeClr val="accent6">
-              <a:shade val="50000"/>
-            </a:schemeClr>
-          </a:lnRef>
-          <a:fillRef idx="1">
-            <a:schemeClr val="accent6"/>
-          </a:fillRef>
-          <a:effectRef idx="0">
-            <a:schemeClr val="accent6"/>
-          </a:effectRef>
-          <a:fontRef idx="minor">
-            <a:schemeClr val="lt1"/>
-          </a:fontRef>
-        </p:style>
-        <p:txBody>
-          <a:bodyPr rtlCol="0" anchor="ctr"/>
-          <a:lstStyle/>
-          <a:p>
-            <a:pPr algn="ctr"/>
-            <a:r>
-              <a:rPr lang="de-DE" sz="1100" dirty="0" err="1" smtClean="0"/>
-              <a:t>serializable</a:t>
-            </a:r>
-            <a:endParaRPr lang="de-DE" sz="1100" dirty="0"/>
-          </a:p>
-        </p:txBody>
-      </p:sp>
-      <p:sp>
-        <p:nvSpPr>
-          <p:cNvPr id="29" name="Rechteck 28"/>
-          <p:cNvSpPr/>
-          <p:nvPr/>
-        </p:nvSpPr>
-        <p:spPr>
-          <a:xfrm>
-            <a:off x="5585032" y="4658568"/>
-            <a:ext cx="1206600" cy="270128"/>
-          </a:xfrm>
-          <a:prstGeom prst="rect">
-            <a:avLst/>
-          </a:prstGeom>
-          <a:solidFill>
-            <a:schemeClr val="accent4">
-              <a:lumMod val="75000"/>
-            </a:schemeClr>
-          </a:solidFill>
-          <a:ln>
-            <a:solidFill>
-              <a:schemeClr val="accent4">
-                <a:lumMod val="50000"/>
-              </a:schemeClr>
-            </a:solidFill>
-          </a:ln>
-        </p:spPr>
-        <p:style>
-          <a:lnRef idx="2">
-            <a:schemeClr val="accent6">
-              <a:shade val="50000"/>
-            </a:schemeClr>
-          </a:lnRef>
-          <a:fillRef idx="1">
-            <a:schemeClr val="accent6"/>
-          </a:fillRef>
-          <a:effectRef idx="0">
-            <a:schemeClr val="accent6"/>
-          </a:effectRef>
-          <a:fontRef idx="minor">
-            <a:schemeClr val="lt1"/>
-          </a:fontRef>
-        </p:style>
-        <p:txBody>
-          <a:bodyPr rtlCol="0" anchor="ctr"/>
-          <a:lstStyle/>
-          <a:p>
-            <a:pPr algn="ctr"/>
-            <a:r>
-              <a:rPr lang="de-DE" sz="1100" dirty="0" err="1" smtClean="0"/>
-              <a:t>spin-serialization</a:t>
-            </a:r>
-            <a:endParaRPr lang="de-DE" sz="1100" dirty="0"/>
-          </a:p>
-        </p:txBody>
-      </p:sp>
-      <p:sp>
-        <p:nvSpPr>
-          <p:cNvPr id="38" name="Textfeld 37"/>
-          <p:cNvSpPr txBox="1"/>
-          <p:nvPr/>
-        </p:nvSpPr>
-        <p:spPr>
-          <a:xfrm>
-            <a:off x="5537193" y="129374"/>
-            <a:ext cx="1302276" cy="307777"/>
-          </a:xfrm>
-          <a:prstGeom prst="rect">
-            <a:avLst/>
-          </a:prstGeom>
-          <a:noFill/>
-        </p:spPr>
-        <p:txBody>
-          <a:bodyPr wrap="square" rtlCol="0">
-            <a:spAutoFit/>
-          </a:bodyPr>
-          <a:lstStyle/>
-          <a:p>
-            <a:r>
-              <a:rPr lang="de-DE" sz="1400" dirty="0" smtClean="0"/>
-              <a:t>Variable </a:t>
-            </a:r>
-            <a:r>
-              <a:rPr lang="de-DE" sz="1400" dirty="0" err="1" smtClean="0"/>
-              <a:t>Types</a:t>
-            </a:r>
-            <a:endParaRPr lang="de-DE" sz="1400" dirty="0"/>
-          </a:p>
-        </p:txBody>
-      </p:sp>
-      <p:cxnSp>
-        <p:nvCxnSpPr>
-          <p:cNvPr id="33" name="Gerader Verbinder 32"/>
-          <p:cNvCxnSpPr>
-            <a:stCxn id="28" idx="1"/>
-            <a:endCxn id="50" idx="3"/>
-          </p:cNvCxnSpPr>
-          <p:nvPr/>
-        </p:nvCxnSpPr>
-        <p:spPr>
-          <a:xfrm flipH="1" flipV="1">
-            <a:off x="3648668" y="3068290"/>
-            <a:ext cx="1936364" cy="1351133"/>
-          </a:xfrm>
-          <a:prstGeom prst="line">
-            <a:avLst/>
-          </a:prstGeom>
-          <a:ln w="28575"/>
-        </p:spPr>
-        <p:style>
-          <a:lnRef idx="3">
-            <a:schemeClr val="dk1"/>
-          </a:lnRef>
-          <a:fillRef idx="0">
-            <a:schemeClr val="dk1"/>
-          </a:fillRef>
-          <a:effectRef idx="2">
-            <a:schemeClr val="dk1"/>
-          </a:effectRef>
-          <a:fontRef idx="minor">
-            <a:schemeClr val="tx1"/>
-          </a:fontRef>
-        </p:style>
-      </p:cxnSp>
-      <p:cxnSp>
-        <p:nvCxnSpPr>
-          <p:cNvPr id="36" name="Gerader Verbinder 35"/>
-          <p:cNvCxnSpPr>
-            <a:stCxn id="19" idx="1"/>
-            <a:endCxn id="53" idx="3"/>
-          </p:cNvCxnSpPr>
-          <p:nvPr/>
-        </p:nvCxnSpPr>
-        <p:spPr>
-          <a:xfrm flipH="1">
-            <a:off x="3648668" y="786387"/>
-            <a:ext cx="1936365" cy="290971"/>
-          </a:xfrm>
-          <a:prstGeom prst="line">
-            <a:avLst/>
-          </a:prstGeom>
-          <a:ln w="28575"/>
-        </p:spPr>
-        <p:style>
-          <a:lnRef idx="3">
-            <a:schemeClr val="dk1"/>
-          </a:lnRef>
-          <a:fillRef idx="0">
-            <a:schemeClr val="dk1"/>
-          </a:fillRef>
-          <a:effectRef idx="2">
-            <a:schemeClr val="dk1"/>
-          </a:effectRef>
-          <a:fontRef idx="minor">
-            <a:schemeClr val="tx1"/>
-          </a:fontRef>
-        </p:style>
-      </p:cxnSp>
-      <p:cxnSp>
-        <p:nvCxnSpPr>
-          <p:cNvPr id="42" name="Gerader Verbinder 41"/>
-          <p:cNvCxnSpPr>
-            <a:stCxn id="26" idx="1"/>
-            <a:endCxn id="56" idx="3"/>
-          </p:cNvCxnSpPr>
-          <p:nvPr/>
-        </p:nvCxnSpPr>
-        <p:spPr>
-          <a:xfrm flipH="1" flipV="1">
-            <a:off x="3648668" y="2072824"/>
-            <a:ext cx="1936364" cy="1382558"/>
-          </a:xfrm>
-          <a:prstGeom prst="line">
-            <a:avLst/>
-          </a:prstGeom>
-          <a:ln w="28575"/>
-        </p:spPr>
-        <p:style>
-          <a:lnRef idx="3">
-            <a:schemeClr val="dk1"/>
-          </a:lnRef>
-          <a:fillRef idx="0">
-            <a:schemeClr val="dk1"/>
-          </a:fillRef>
-          <a:effectRef idx="2">
-            <a:schemeClr val="dk1"/>
-          </a:effectRef>
-          <a:fontRef idx="minor">
-            <a:schemeClr val="tx1"/>
-          </a:fontRef>
-        </p:style>
-      </p:cxnSp>
-      <p:sp>
-        <p:nvSpPr>
-          <p:cNvPr id="34" name="Textfeld 33"/>
-          <p:cNvSpPr txBox="1"/>
-          <p:nvPr/>
-        </p:nvSpPr>
-        <p:spPr>
-          <a:xfrm>
-            <a:off x="2108273" y="129374"/>
-            <a:ext cx="924394" cy="307777"/>
-          </a:xfrm>
-          <a:prstGeom prst="rect">
-            <a:avLst/>
-          </a:prstGeom>
-          <a:noFill/>
-        </p:spPr>
-        <p:txBody>
-          <a:bodyPr wrap="square" rtlCol="0">
-            <a:spAutoFit/>
-          </a:bodyPr>
-          <a:lstStyle/>
-          <a:p>
-            <a:r>
-              <a:rPr lang="de-DE" sz="1400" dirty="0" smtClean="0"/>
-              <a:t>Variables</a:t>
-            </a:r>
-            <a:endParaRPr lang="de-DE" sz="1400" dirty="0"/>
-          </a:p>
-        </p:txBody>
-      </p:sp>
-      <p:grpSp>
-        <p:nvGrpSpPr>
-          <p:cNvPr id="35" name="Gruppieren 34"/>
-          <p:cNvGrpSpPr/>
-          <p:nvPr/>
-        </p:nvGrpSpPr>
-        <p:grpSpPr>
-          <a:xfrm>
-            <a:off x="1492272" y="655434"/>
-            <a:ext cx="2156396" cy="2834780"/>
-            <a:chOff x="2636553" y="913040"/>
-            <a:chExt cx="3461656" cy="3519754"/>
-          </a:xfrm>
-        </p:grpSpPr>
-        <p:grpSp>
-          <p:nvGrpSpPr>
-            <p:cNvPr id="43" name="Gruppieren 42"/>
-            <p:cNvGrpSpPr/>
-            <p:nvPr/>
-          </p:nvGrpSpPr>
-          <p:grpSpPr>
-            <a:xfrm>
-              <a:off x="2636553" y="2149043"/>
-              <a:ext cx="3461656" cy="1047749"/>
-              <a:chOff x="240849" y="3532415"/>
-              <a:chExt cx="2265587" cy="1047749"/>
-            </a:xfrm>
-          </p:grpSpPr>
-          <p:sp>
-            <p:nvSpPr>
-              <p:cNvPr id="56" name="Rechteck 55"/>
-              <p:cNvSpPr/>
-              <p:nvPr/>
-            </p:nvSpPr>
-            <p:spPr>
-              <a:xfrm>
-                <a:off x="240849" y="3532415"/>
-                <a:ext cx="2265587" cy="1047749"/>
-              </a:xfrm>
-              <a:prstGeom prst="rect">
-                <a:avLst/>
-              </a:prstGeom>
-              <a:solidFill>
-                <a:schemeClr val="bg2">
-                  <a:lumMod val="75000"/>
-                </a:schemeClr>
-              </a:solidFill>
-              <a:ln>
-                <a:solidFill>
-                  <a:schemeClr val="bg2">
-                    <a:lumMod val="50000"/>
-                  </a:schemeClr>
-                </a:solidFill>
-              </a:ln>
-            </p:spPr>
-            <p:style>
-              <a:lnRef idx="2">
-                <a:schemeClr val="accent1">
-                  <a:shade val="50000"/>
-                </a:schemeClr>
-              </a:lnRef>
-              <a:fillRef idx="1">
-                <a:schemeClr val="accent1"/>
-              </a:fillRef>
-              <a:effectRef idx="0">
-                <a:schemeClr val="accent1"/>
-              </a:effectRef>
-              <a:fontRef idx="minor">
-                <a:schemeClr val="lt1"/>
-              </a:fontRef>
-            </p:style>
-            <p:txBody>
-              <a:bodyPr rtlCol="0" anchor="ctr"/>
-              <a:lstStyle/>
-              <a:p>
-                <a:endParaRPr lang="de-DE" sz="1100" dirty="0"/>
-              </a:p>
-            </p:txBody>
-          </p:sp>
-          <p:sp>
-            <p:nvSpPr>
-              <p:cNvPr id="57" name="Abgerundetes Rechteck 56"/>
-              <p:cNvSpPr/>
-              <p:nvPr/>
-            </p:nvSpPr>
-            <p:spPr>
-              <a:xfrm>
-                <a:off x="302970" y="3614058"/>
-                <a:ext cx="2141346" cy="402771"/>
-              </a:xfrm>
-              <a:prstGeom prst="roundRect">
-                <a:avLst/>
-              </a:prstGeom>
-            </p:spPr>
-            <p:style>
-              <a:lnRef idx="2">
-                <a:schemeClr val="accent2">
-                  <a:shade val="50000"/>
-                </a:schemeClr>
-              </a:lnRef>
-              <a:fillRef idx="1">
-                <a:schemeClr val="accent2"/>
-              </a:fillRef>
-              <a:effectRef idx="0">
-                <a:schemeClr val="accent2"/>
-              </a:effectRef>
-              <a:fontRef idx="minor">
-                <a:schemeClr val="lt1"/>
-              </a:fontRef>
-            </p:style>
-            <p:txBody>
-              <a:bodyPr rtlCol="0" anchor="ctr"/>
-              <a:lstStyle/>
-              <a:p>
-                <a:r>
-                  <a:rPr lang="de-DE" sz="1100" dirty="0" err="1" smtClean="0"/>
-                  <a:t>name</a:t>
-                </a:r>
-                <a:r>
-                  <a:rPr lang="de-DE" sz="1100" dirty="0" smtClean="0"/>
-                  <a:t>: „</a:t>
-                </a:r>
-                <a:r>
-                  <a:rPr lang="de-DE" sz="1100" dirty="0" err="1" smtClean="0"/>
-                  <a:t>customer</a:t>
-                </a:r>
-                <a:r>
-                  <a:rPr lang="de-DE" sz="1100" dirty="0" smtClean="0"/>
-                  <a:t>“</a:t>
-                </a:r>
-                <a:endParaRPr lang="de-DE" sz="1100" dirty="0"/>
-              </a:p>
-            </p:txBody>
-          </p:sp>
-          <p:sp>
-            <p:nvSpPr>
-              <p:cNvPr id="58" name="Abgerundetes Rechteck 57"/>
-              <p:cNvSpPr/>
-              <p:nvPr/>
-            </p:nvSpPr>
-            <p:spPr>
-              <a:xfrm>
-                <a:off x="316368" y="4098472"/>
-                <a:ext cx="2114549" cy="402771"/>
-              </a:xfrm>
-              <a:prstGeom prst="roundRect">
-                <a:avLst/>
-              </a:prstGeom>
-            </p:spPr>
-            <p:style>
-              <a:lnRef idx="2">
-                <a:schemeClr val="accent2">
-                  <a:shade val="50000"/>
-                </a:schemeClr>
-              </a:lnRef>
-              <a:fillRef idx="1">
-                <a:schemeClr val="accent2"/>
-              </a:fillRef>
-              <a:effectRef idx="0">
-                <a:schemeClr val="accent2"/>
-              </a:effectRef>
-              <a:fontRef idx="minor">
-                <a:schemeClr val="lt1"/>
-              </a:fontRef>
-            </p:style>
-            <p:txBody>
-              <a:bodyPr rtlCol="0" anchor="ctr"/>
-              <a:lstStyle/>
-              <a:p>
-                <a:r>
-                  <a:rPr lang="de-DE" sz="1100" dirty="0" err="1" smtClean="0"/>
-                  <a:t>value</a:t>
-                </a:r>
-                <a:r>
-                  <a:rPr lang="de-DE" sz="1100" dirty="0" smtClean="0"/>
-                  <a:t>: „</a:t>
-                </a:r>
-                <a:r>
-                  <a:rPr lang="de-DE" sz="1100" dirty="0" err="1" smtClean="0"/>
-                  <a:t>Kermit</a:t>
-                </a:r>
-                <a:r>
-                  <a:rPr lang="de-DE" sz="1100" dirty="0" smtClean="0"/>
-                  <a:t>“</a:t>
-                </a:r>
-                <a:endParaRPr lang="de-DE" sz="1100" dirty="0"/>
-              </a:p>
-            </p:txBody>
-          </p:sp>
-        </p:grpSp>
-        <p:grpSp>
-          <p:nvGrpSpPr>
-            <p:cNvPr id="48" name="Gruppieren 47"/>
-            <p:cNvGrpSpPr/>
-            <p:nvPr/>
-          </p:nvGrpSpPr>
-          <p:grpSpPr>
-            <a:xfrm>
-              <a:off x="2636553" y="913040"/>
-              <a:ext cx="3461656" cy="1047749"/>
-              <a:chOff x="240849" y="3532415"/>
-              <a:chExt cx="2265587" cy="1047749"/>
-            </a:xfrm>
-          </p:grpSpPr>
-          <p:sp>
-            <p:nvSpPr>
-              <p:cNvPr id="53" name="Rechteck 52"/>
-              <p:cNvSpPr/>
-              <p:nvPr/>
-            </p:nvSpPr>
-            <p:spPr>
-              <a:xfrm>
-                <a:off x="240849" y="3532415"/>
-                <a:ext cx="2265587" cy="1047749"/>
-              </a:xfrm>
-              <a:prstGeom prst="rect">
-                <a:avLst/>
-              </a:prstGeom>
-              <a:solidFill>
-                <a:schemeClr val="bg2">
-                  <a:lumMod val="75000"/>
-                </a:schemeClr>
-              </a:solidFill>
-              <a:ln>
-                <a:solidFill>
-                  <a:schemeClr val="bg2">
-                    <a:lumMod val="50000"/>
-                  </a:schemeClr>
-                </a:solidFill>
-              </a:ln>
-            </p:spPr>
-            <p:style>
-              <a:lnRef idx="2">
-                <a:schemeClr val="accent1">
-                  <a:shade val="50000"/>
-                </a:schemeClr>
-              </a:lnRef>
-              <a:fillRef idx="1">
-                <a:schemeClr val="accent1"/>
-              </a:fillRef>
-              <a:effectRef idx="0">
-                <a:schemeClr val="accent1"/>
-              </a:effectRef>
-              <a:fontRef idx="minor">
-                <a:schemeClr val="lt1"/>
-              </a:fontRef>
-            </p:style>
-            <p:txBody>
-              <a:bodyPr rtlCol="0" anchor="ctr"/>
-              <a:lstStyle/>
-              <a:p>
-                <a:endParaRPr lang="de-DE" sz="1100" dirty="0"/>
-              </a:p>
-            </p:txBody>
-          </p:sp>
-          <p:sp>
-            <p:nvSpPr>
-              <p:cNvPr id="54" name="Abgerundetes Rechteck 53"/>
-              <p:cNvSpPr/>
-              <p:nvPr/>
-            </p:nvSpPr>
-            <p:spPr>
-              <a:xfrm>
-                <a:off x="302970" y="3614058"/>
-                <a:ext cx="2141346" cy="402771"/>
-              </a:xfrm>
-              <a:prstGeom prst="roundRect">
-                <a:avLst/>
-              </a:prstGeom>
-            </p:spPr>
-            <p:style>
-              <a:lnRef idx="2">
-                <a:schemeClr val="accent2">
-                  <a:shade val="50000"/>
-                </a:schemeClr>
-              </a:lnRef>
-              <a:fillRef idx="1">
-                <a:schemeClr val="accent2"/>
-              </a:fillRef>
-              <a:effectRef idx="0">
-                <a:schemeClr val="accent2"/>
-              </a:effectRef>
-              <a:fontRef idx="minor">
-                <a:schemeClr val="lt1"/>
-              </a:fontRef>
-            </p:style>
-            <p:txBody>
-              <a:bodyPr rtlCol="0" anchor="ctr"/>
-              <a:lstStyle/>
-              <a:p>
-                <a:r>
-                  <a:rPr lang="de-DE" sz="1100" dirty="0" err="1" smtClean="0"/>
-                  <a:t>name</a:t>
-                </a:r>
-                <a:r>
-                  <a:rPr lang="de-DE" sz="1100" dirty="0" smtClean="0"/>
-                  <a:t>: „</a:t>
-                </a:r>
-                <a:r>
-                  <a:rPr lang="de-DE" sz="1100" dirty="0" err="1" smtClean="0"/>
-                  <a:t>isAFrog</a:t>
-                </a:r>
-                <a:r>
-                  <a:rPr lang="de-DE" sz="1100" dirty="0" smtClean="0"/>
-                  <a:t>“</a:t>
-                </a:r>
-                <a:endParaRPr lang="de-DE" sz="1100" dirty="0"/>
-              </a:p>
-            </p:txBody>
-          </p:sp>
-          <p:sp>
-            <p:nvSpPr>
-              <p:cNvPr id="55" name="Abgerundetes Rechteck 54"/>
-              <p:cNvSpPr/>
-              <p:nvPr/>
-            </p:nvSpPr>
-            <p:spPr>
-              <a:xfrm>
-                <a:off x="316368" y="4098472"/>
-                <a:ext cx="2114549" cy="402771"/>
-              </a:xfrm>
-              <a:prstGeom prst="roundRect">
-                <a:avLst/>
-              </a:prstGeom>
-            </p:spPr>
-            <p:style>
-              <a:lnRef idx="2">
-                <a:schemeClr val="accent2">
-                  <a:shade val="50000"/>
-                </a:schemeClr>
-              </a:lnRef>
-              <a:fillRef idx="1">
-                <a:schemeClr val="accent2"/>
-              </a:fillRef>
-              <a:effectRef idx="0">
-                <a:schemeClr val="accent2"/>
-              </a:effectRef>
-              <a:fontRef idx="minor">
-                <a:schemeClr val="lt1"/>
-              </a:fontRef>
-            </p:style>
-            <p:txBody>
-              <a:bodyPr rtlCol="0" anchor="ctr"/>
-              <a:lstStyle/>
-              <a:p>
-                <a:r>
-                  <a:rPr lang="de-DE" sz="1100" dirty="0" err="1" smtClean="0"/>
-                  <a:t>value</a:t>
-                </a:r>
-                <a:r>
-                  <a:rPr lang="de-DE" sz="1100" dirty="0" smtClean="0"/>
-                  <a:t>: </a:t>
-                </a:r>
-                <a:r>
-                  <a:rPr lang="de-DE" sz="1100" dirty="0" err="1" smtClean="0"/>
-                  <a:t>true</a:t>
-                </a:r>
-                <a:endParaRPr lang="de-DE" sz="1100" dirty="0"/>
-              </a:p>
-            </p:txBody>
-          </p:sp>
-        </p:grpSp>
-        <p:grpSp>
-          <p:nvGrpSpPr>
-            <p:cNvPr id="49" name="Gruppieren 48"/>
-            <p:cNvGrpSpPr/>
-            <p:nvPr/>
-          </p:nvGrpSpPr>
-          <p:grpSpPr>
-            <a:xfrm>
-              <a:off x="2636553" y="3385045"/>
-              <a:ext cx="3461656" cy="1047749"/>
-              <a:chOff x="240849" y="3532415"/>
-              <a:chExt cx="2265587" cy="1047749"/>
-            </a:xfrm>
-          </p:grpSpPr>
-          <p:sp>
-            <p:nvSpPr>
-              <p:cNvPr id="50" name="Rechteck 49"/>
-              <p:cNvSpPr/>
-              <p:nvPr/>
-            </p:nvSpPr>
-            <p:spPr>
-              <a:xfrm>
-                <a:off x="240849" y="3532415"/>
-                <a:ext cx="2265587" cy="1047749"/>
-              </a:xfrm>
-              <a:prstGeom prst="rect">
-                <a:avLst/>
-              </a:prstGeom>
-              <a:solidFill>
-                <a:schemeClr val="bg2">
-                  <a:lumMod val="75000"/>
-                </a:schemeClr>
-              </a:solidFill>
-              <a:ln>
-                <a:solidFill>
-                  <a:schemeClr val="bg2">
-                    <a:lumMod val="50000"/>
-                  </a:schemeClr>
-                </a:solidFill>
-              </a:ln>
-            </p:spPr>
-            <p:style>
-              <a:lnRef idx="2">
-                <a:schemeClr val="accent1">
-                  <a:shade val="50000"/>
-                </a:schemeClr>
-              </a:lnRef>
-              <a:fillRef idx="1">
-                <a:schemeClr val="accent1"/>
-              </a:fillRef>
-              <a:effectRef idx="0">
-                <a:schemeClr val="accent1"/>
-              </a:effectRef>
-              <a:fontRef idx="minor">
-                <a:schemeClr val="lt1"/>
-              </a:fontRef>
-            </p:style>
-            <p:txBody>
-              <a:bodyPr rtlCol="0" anchor="ctr"/>
-              <a:lstStyle/>
-              <a:p>
-                <a:endParaRPr lang="de-DE" sz="1100" dirty="0"/>
-              </a:p>
-            </p:txBody>
-          </p:sp>
-          <p:sp>
-            <p:nvSpPr>
-              <p:cNvPr id="51" name="Abgerundetes Rechteck 50"/>
-              <p:cNvSpPr/>
-              <p:nvPr/>
-            </p:nvSpPr>
-            <p:spPr>
-              <a:xfrm>
-                <a:off x="302970" y="3614058"/>
-                <a:ext cx="2141346" cy="402771"/>
-              </a:xfrm>
-              <a:prstGeom prst="roundRect">
-                <a:avLst/>
-              </a:prstGeom>
-            </p:spPr>
-            <p:style>
-              <a:lnRef idx="2">
-                <a:schemeClr val="accent2">
-                  <a:shade val="50000"/>
-                </a:schemeClr>
-              </a:lnRef>
-              <a:fillRef idx="1">
-                <a:schemeClr val="accent2"/>
-              </a:fillRef>
-              <a:effectRef idx="0">
-                <a:schemeClr val="accent2"/>
-              </a:effectRef>
-              <a:fontRef idx="minor">
-                <a:schemeClr val="lt1"/>
-              </a:fontRef>
-            </p:style>
-            <p:txBody>
-              <a:bodyPr rtlCol="0" anchor="ctr"/>
-              <a:lstStyle/>
-              <a:p>
-                <a:r>
-                  <a:rPr lang="de-DE" sz="1100" dirty="0" err="1" smtClean="0"/>
-                  <a:t>name</a:t>
-                </a:r>
-                <a:r>
-                  <a:rPr lang="de-DE" sz="1100" dirty="0" smtClean="0"/>
-                  <a:t>: „</a:t>
-                </a:r>
-                <a:r>
-                  <a:rPr lang="de-DE" sz="1100" dirty="0" err="1" smtClean="0"/>
-                  <a:t>order</a:t>
-                </a:r>
-                <a:r>
-                  <a:rPr lang="de-DE" sz="1100" dirty="0" smtClean="0"/>
-                  <a:t>“</a:t>
-                </a:r>
-                <a:endParaRPr lang="de-DE" sz="1100" dirty="0"/>
-              </a:p>
-            </p:txBody>
-          </p:sp>
-          <p:sp>
-            <p:nvSpPr>
-              <p:cNvPr id="52" name="Abgerundetes Rechteck 51"/>
-              <p:cNvSpPr/>
-              <p:nvPr/>
-            </p:nvSpPr>
-            <p:spPr>
-              <a:xfrm>
-                <a:off x="316368" y="4098472"/>
-                <a:ext cx="2114549" cy="402771"/>
-              </a:xfrm>
-              <a:prstGeom prst="roundRect">
-                <a:avLst/>
-              </a:prstGeom>
-            </p:spPr>
-            <p:style>
-              <a:lnRef idx="2">
-                <a:schemeClr val="accent2">
-                  <a:shade val="50000"/>
-                </a:schemeClr>
-              </a:lnRef>
-              <a:fillRef idx="1">
-                <a:schemeClr val="accent2"/>
-              </a:fillRef>
-              <a:effectRef idx="0">
-                <a:schemeClr val="accent2"/>
-              </a:effectRef>
-              <a:fontRef idx="minor">
-                <a:schemeClr val="lt1"/>
-              </a:fontRef>
-            </p:style>
-            <p:txBody>
-              <a:bodyPr rtlCol="0" anchor="ctr"/>
-              <a:lstStyle/>
-              <a:p>
-                <a:r>
-                  <a:rPr lang="de-DE" sz="1100" dirty="0" err="1" smtClean="0"/>
-                  <a:t>value</a:t>
-                </a:r>
-                <a:r>
-                  <a:rPr lang="de-DE" sz="1100" dirty="0" smtClean="0"/>
-                  <a:t>: com.example.Order@1</a:t>
-                </a:r>
-                <a:endParaRPr lang="de-DE" sz="1100" dirty="0"/>
-              </a:p>
-            </p:txBody>
-          </p:sp>
-        </p:grpSp>
-      </p:grpSp>
       <p:sp>
         <p:nvSpPr>
           <p:cNvPr id="37" name="Abgerundetes Rechteck 36"/>

</xml_diff>

<commit_message>
chore(variables): add spin value types to types overview
related to CAM-3883
</commit_message>
<xml_diff>
--- a/develop/drawings/variables.pptx
+++ b/develop/drawings/variables.pptx
@@ -260,7 +260,7 @@
           <a:p>
             <a:fld id="{75770F93-8E11-4B56-97AE-D1DC0AE59729}" type="datetimeFigureOut">
               <a:rPr lang="de-DE" smtClean="0"/>
-              <a:t>10.11.2014</a:t>
+              <a:t>19.05.2015</a:t>
             </a:fld>
             <a:endParaRPr lang="de-DE"/>
           </a:p>
@@ -430,7 +430,7 @@
           <a:p>
             <a:fld id="{75770F93-8E11-4B56-97AE-D1DC0AE59729}" type="datetimeFigureOut">
               <a:rPr lang="de-DE" smtClean="0"/>
-              <a:t>10.11.2014</a:t>
+              <a:t>19.05.2015</a:t>
             </a:fld>
             <a:endParaRPr lang="de-DE"/>
           </a:p>
@@ -610,7 +610,7 @@
           <a:p>
             <a:fld id="{75770F93-8E11-4B56-97AE-D1DC0AE59729}" type="datetimeFigureOut">
               <a:rPr lang="de-DE" smtClean="0"/>
-              <a:t>10.11.2014</a:t>
+              <a:t>19.05.2015</a:t>
             </a:fld>
             <a:endParaRPr lang="de-DE"/>
           </a:p>
@@ -780,7 +780,7 @@
           <a:p>
             <a:fld id="{75770F93-8E11-4B56-97AE-D1DC0AE59729}" type="datetimeFigureOut">
               <a:rPr lang="de-DE" smtClean="0"/>
-              <a:t>10.11.2014</a:t>
+              <a:t>19.05.2015</a:t>
             </a:fld>
             <a:endParaRPr lang="de-DE"/>
           </a:p>
@@ -1026,7 +1026,7 @@
           <a:p>
             <a:fld id="{75770F93-8E11-4B56-97AE-D1DC0AE59729}" type="datetimeFigureOut">
               <a:rPr lang="de-DE" smtClean="0"/>
-              <a:t>10.11.2014</a:t>
+              <a:t>19.05.2015</a:t>
             </a:fld>
             <a:endParaRPr lang="de-DE"/>
           </a:p>
@@ -1258,7 +1258,7 @@
           <a:p>
             <a:fld id="{75770F93-8E11-4B56-97AE-D1DC0AE59729}" type="datetimeFigureOut">
               <a:rPr lang="de-DE" smtClean="0"/>
-              <a:t>10.11.2014</a:t>
+              <a:t>19.05.2015</a:t>
             </a:fld>
             <a:endParaRPr lang="de-DE"/>
           </a:p>
@@ -1625,7 +1625,7 @@
           <a:p>
             <a:fld id="{75770F93-8E11-4B56-97AE-D1DC0AE59729}" type="datetimeFigureOut">
               <a:rPr lang="de-DE" smtClean="0"/>
-              <a:t>10.11.2014</a:t>
+              <a:t>19.05.2015</a:t>
             </a:fld>
             <a:endParaRPr lang="de-DE"/>
           </a:p>
@@ -1743,7 +1743,7 @@
           <a:p>
             <a:fld id="{75770F93-8E11-4B56-97AE-D1DC0AE59729}" type="datetimeFigureOut">
               <a:rPr lang="de-DE" smtClean="0"/>
-              <a:t>10.11.2014</a:t>
+              <a:t>19.05.2015</a:t>
             </a:fld>
             <a:endParaRPr lang="de-DE"/>
           </a:p>
@@ -1838,7 +1838,7 @@
           <a:p>
             <a:fld id="{75770F93-8E11-4B56-97AE-D1DC0AE59729}" type="datetimeFigureOut">
               <a:rPr lang="de-DE" smtClean="0"/>
-              <a:t>10.11.2014</a:t>
+              <a:t>19.05.2015</a:t>
             </a:fld>
             <a:endParaRPr lang="de-DE"/>
           </a:p>
@@ -2115,7 +2115,7 @@
           <a:p>
             <a:fld id="{75770F93-8E11-4B56-97AE-D1DC0AE59729}" type="datetimeFigureOut">
               <a:rPr lang="de-DE" smtClean="0"/>
-              <a:t>10.11.2014</a:t>
+              <a:t>19.05.2015</a:t>
             </a:fld>
             <a:endParaRPr lang="de-DE"/>
           </a:p>
@@ -2368,7 +2368,7 @@
           <a:p>
             <a:fld id="{75770F93-8E11-4B56-97AE-D1DC0AE59729}" type="datetimeFigureOut">
               <a:rPr lang="de-DE" smtClean="0"/>
-              <a:t>10.11.2014</a:t>
+              <a:t>19.05.2015</a:t>
             </a:fld>
             <a:endParaRPr lang="de-DE"/>
           </a:p>
@@ -2581,7 +2581,7 @@
           <a:p>
             <a:fld id="{75770F93-8E11-4B56-97AE-D1DC0AE59729}" type="datetimeFigureOut">
               <a:rPr lang="de-DE" smtClean="0"/>
-              <a:t>10.11.2014</a:t>
+              <a:t>19.05.2015</a:t>
             </a:fld>
             <a:endParaRPr lang="de-DE"/>
           </a:p>
@@ -6726,7 +6726,7 @@
           <a:p>
             <a:pPr algn="ctr"/>
             <a:r>
-              <a:rPr lang="de-DE" sz="1100" dirty="0" err="1" smtClean="0"/>
+              <a:rPr lang="de-DE" sz="1100" dirty="0" smtClean="0"/>
               <a:t>boolean</a:t>
             </a:r>
             <a:endParaRPr lang="de-DE" sz="1100" dirty="0"/>
@@ -6770,7 +6770,7 @@
           <a:p>
             <a:pPr algn="ctr"/>
             <a:r>
-              <a:rPr lang="de-DE" sz="1100" dirty="0" err="1" smtClean="0"/>
+              <a:rPr lang="de-DE" sz="1100" dirty="0" smtClean="0"/>
               <a:t>bytes</a:t>
             </a:r>
             <a:endParaRPr lang="de-DE" sz="1100" dirty="0"/>
@@ -6814,7 +6814,7 @@
           <a:p>
             <a:pPr algn="ctr"/>
             <a:r>
-              <a:rPr lang="de-DE" sz="1100" dirty="0" err="1" smtClean="0"/>
+              <a:rPr lang="de-DE" sz="1100" dirty="0" smtClean="0"/>
               <a:t>short</a:t>
             </a:r>
             <a:endParaRPr lang="de-DE" sz="1100" dirty="0"/>
@@ -6902,7 +6902,7 @@
           <a:p>
             <a:pPr algn="ctr"/>
             <a:r>
-              <a:rPr lang="de-DE" sz="1100" dirty="0" err="1" smtClean="0"/>
+              <a:rPr lang="de-DE" sz="1100" dirty="0" smtClean="0"/>
               <a:t>long</a:t>
             </a:r>
             <a:endParaRPr lang="de-DE" sz="1100" dirty="0"/>
@@ -6990,7 +6990,7 @@
           <a:p>
             <a:pPr algn="ctr"/>
             <a:r>
-              <a:rPr lang="de-DE" sz="1100" dirty="0" err="1" smtClean="0"/>
+              <a:rPr lang="de-DE" sz="1100" dirty="0" smtClean="0"/>
               <a:t>date</a:t>
             </a:r>
             <a:endParaRPr lang="de-DE" sz="1100" dirty="0"/>
@@ -7034,7 +7034,7 @@
           <a:p>
             <a:pPr algn="ctr"/>
             <a:r>
-              <a:rPr lang="de-DE" sz="1100" dirty="0" err="1" smtClean="0"/>
+              <a:rPr lang="de-DE" sz="1100" dirty="0" smtClean="0"/>
               <a:t>string</a:t>
             </a:r>
             <a:endParaRPr lang="de-DE" sz="1100" dirty="0"/>
@@ -7134,7 +7134,7 @@
           <a:p>
             <a:pPr algn="ctr"/>
             <a:r>
-              <a:rPr lang="de-DE" sz="1100" dirty="0" err="1" smtClean="0"/>
+              <a:rPr lang="de-DE" sz="1100" dirty="0" smtClean="0"/>
               <a:t>object</a:t>
             </a:r>
             <a:endParaRPr lang="de-DE" sz="1100" dirty="0"/>
@@ -7165,11 +7165,7 @@
           <a:p>
             <a:r>
               <a:rPr lang="de-DE" sz="1400" dirty="0" smtClean="0"/>
-              <a:t>Value </a:t>
-            </a:r>
-            <a:r>
-              <a:rPr lang="de-DE" sz="1400" dirty="0" err="1" smtClean="0"/>
-              <a:t>Types</a:t>
+              <a:t>Value Types</a:t>
             </a:r>
             <a:endParaRPr lang="de-DE" sz="1400" dirty="0"/>
           </a:p>
@@ -7283,11 +7279,7 @@
           <a:p>
             <a:r>
               <a:rPr lang="de-DE" sz="1400" dirty="0" smtClean="0"/>
-              <a:t>Primitive </a:t>
-            </a:r>
-            <a:r>
-              <a:rPr lang="de-DE" sz="1400" dirty="0" err="1" smtClean="0"/>
-              <a:t>Types</a:t>
+              <a:t>Primitive Types</a:t>
             </a:r>
             <a:endParaRPr lang="de-DE" sz="1400" dirty="0"/>
           </a:p>
@@ -7317,19 +7309,187 @@
           <a:p>
             <a:r>
               <a:rPr lang="de-DE" sz="1400" dirty="0" smtClean="0"/>
-              <a:t>Custom </a:t>
-            </a:r>
-            <a:r>
-              <a:rPr lang="de-DE" sz="1400" dirty="0" err="1" smtClean="0"/>
-              <a:t>Object</a:t>
-            </a:r>
+              <a:t>Custom Object Type</a:t>
+            </a:r>
+            <a:endParaRPr lang="de-DE" sz="1400" dirty="0"/>
+          </a:p>
+        </p:txBody>
+      </p:sp>
+      <p:sp>
+        <p:nvSpPr>
+          <p:cNvPr id="17" name="Rechteck 16"/>
+          <p:cNvSpPr/>
+          <p:nvPr/>
+        </p:nvSpPr>
+        <p:spPr>
+          <a:xfrm>
+            <a:off x="4944952" y="5252155"/>
+            <a:ext cx="1206598" cy="270128"/>
+          </a:xfrm>
+          <a:prstGeom prst="rect">
+            <a:avLst/>
+          </a:prstGeom>
+          <a:solidFill>
+            <a:schemeClr val="accent1"/>
+          </a:solidFill>
+          <a:ln>
+            <a:solidFill>
+              <a:schemeClr val="accent1">
+                <a:lumMod val="50000"/>
+              </a:schemeClr>
+            </a:solidFill>
+          </a:ln>
+        </p:spPr>
+        <p:style>
+          <a:lnRef idx="2">
+            <a:schemeClr val="accent6">
+              <a:shade val="50000"/>
+            </a:schemeClr>
+          </a:lnRef>
+          <a:fillRef idx="1">
+            <a:schemeClr val="accent6"/>
+          </a:fillRef>
+          <a:effectRef idx="0">
+            <a:schemeClr val="accent6"/>
+          </a:effectRef>
+          <a:fontRef idx="minor">
+            <a:schemeClr val="lt1"/>
+          </a:fontRef>
+        </p:style>
+        <p:txBody>
+          <a:bodyPr rtlCol="0" anchor="ctr"/>
+          <a:lstStyle/>
+          <a:p>
+            <a:pPr algn="ctr"/>
+            <a:r>
+              <a:rPr lang="de-DE" sz="1100" dirty="0" smtClean="0"/>
+              <a:t>xml</a:t>
+            </a:r>
+            <a:endParaRPr lang="de-DE" sz="1100" dirty="0"/>
+          </a:p>
+        </p:txBody>
+      </p:sp>
+      <p:sp>
+        <p:nvSpPr>
+          <p:cNvPr id="18" name="Rechteck 17"/>
+          <p:cNvSpPr/>
+          <p:nvPr/>
+        </p:nvSpPr>
+        <p:spPr>
+          <a:xfrm>
+            <a:off x="4944952" y="4867115"/>
+            <a:ext cx="1206598" cy="270128"/>
+          </a:xfrm>
+          <a:prstGeom prst="rect">
+            <a:avLst/>
+          </a:prstGeom>
+          <a:solidFill>
+            <a:schemeClr val="accent1"/>
+          </a:solidFill>
+          <a:ln>
+            <a:solidFill>
+              <a:schemeClr val="accent1">
+                <a:lumMod val="50000"/>
+              </a:schemeClr>
+            </a:solidFill>
+          </a:ln>
+        </p:spPr>
+        <p:style>
+          <a:lnRef idx="2">
+            <a:schemeClr val="accent6">
+              <a:shade val="50000"/>
+            </a:schemeClr>
+          </a:lnRef>
+          <a:fillRef idx="1">
+            <a:schemeClr val="accent6"/>
+          </a:fillRef>
+          <a:effectRef idx="0">
+            <a:schemeClr val="accent6"/>
+          </a:effectRef>
+          <a:fontRef idx="minor">
+            <a:schemeClr val="lt1"/>
+          </a:fontRef>
+        </p:style>
+        <p:txBody>
+          <a:bodyPr rtlCol="0" anchor="ctr"/>
+          <a:lstStyle/>
+          <a:p>
+            <a:pPr algn="ctr"/>
+            <a:r>
+              <a:rPr lang="de-DE" sz="1100" dirty="0" smtClean="0"/>
+              <a:t>json</a:t>
+            </a:r>
+            <a:endParaRPr lang="de-DE" sz="1100" dirty="0"/>
+          </a:p>
+        </p:txBody>
+      </p:sp>
+      <p:sp>
+        <p:nvSpPr>
+          <p:cNvPr id="29" name="Geschweifte Klammer rechts 28"/>
+          <p:cNvSpPr/>
+          <p:nvPr/>
+        </p:nvSpPr>
+        <p:spPr>
+          <a:xfrm>
+            <a:off x="6357398" y="4867115"/>
+            <a:ext cx="350818" cy="655168"/>
+          </a:xfrm>
+          <a:prstGeom prst="rightBrace">
+            <a:avLst>
+              <a:gd name="adj1" fmla="val 73666"/>
+              <a:gd name="adj2" fmla="val 50560"/>
+            </a:avLst>
+          </a:prstGeom>
+          <a:ln w="28575"/>
+        </p:spPr>
+        <p:style>
+          <a:lnRef idx="3">
+            <a:schemeClr val="dk1"/>
+          </a:lnRef>
+          <a:fillRef idx="0">
+            <a:schemeClr val="dk1"/>
+          </a:fillRef>
+          <a:effectRef idx="2">
+            <a:schemeClr val="dk1"/>
+          </a:effectRef>
+          <a:fontRef idx="minor">
+            <a:schemeClr val="tx1"/>
+          </a:fontRef>
+        </p:style>
+        <p:txBody>
+          <a:bodyPr rtlCol="0" anchor="ctr"/>
+          <a:lstStyle/>
+          <a:p>
+            <a:pPr algn="ctr"/>
+            <a:endParaRPr lang="de-DE" sz="1100"/>
+          </a:p>
+        </p:txBody>
+      </p:sp>
+      <p:sp>
+        <p:nvSpPr>
+          <p:cNvPr id="30" name="Textfeld 29"/>
+          <p:cNvSpPr txBox="1"/>
+          <p:nvPr/>
+        </p:nvSpPr>
+        <p:spPr>
+          <a:xfrm>
+            <a:off x="6914062" y="4933089"/>
+            <a:ext cx="1035840" cy="523220"/>
+          </a:xfrm>
+          <a:prstGeom prst="rect">
+            <a:avLst/>
+          </a:prstGeom>
+          <a:noFill/>
+        </p:spPr>
+        <p:txBody>
+          <a:bodyPr wrap="square" rtlCol="0">
+            <a:spAutoFit/>
+          </a:bodyPr>
+          <a:lstStyle/>
+          <a:p>
             <a:r>
               <a:rPr lang="de-DE" sz="1400" dirty="0" smtClean="0"/>
-              <a:t> </a:t>
-            </a:r>
-            <a:r>
-              <a:rPr lang="de-DE" sz="1400" dirty="0" smtClean="0"/>
-              <a:t>Type</a:t>
+              <a:t>Spin Value Types</a:t>
             </a:r>
             <a:endParaRPr lang="de-DE" sz="1400" dirty="0"/>
           </a:p>
@@ -7409,7 +7569,7 @@
           <a:p>
             <a:pPr algn="ctr"/>
             <a:r>
-              <a:rPr lang="de-DE" sz="1100" dirty="0" err="1" smtClean="0"/>
+              <a:rPr lang="de-DE" sz="1100" dirty="0" smtClean="0"/>
               <a:t>boolean</a:t>
             </a:r>
             <a:endParaRPr lang="de-DE" sz="1100" dirty="0"/>
@@ -7453,7 +7613,7 @@
           <a:p>
             <a:pPr algn="ctr"/>
             <a:r>
-              <a:rPr lang="de-DE" sz="1100" dirty="0" err="1" smtClean="0"/>
+              <a:rPr lang="de-DE" sz="1100" dirty="0" smtClean="0"/>
               <a:t>bytes</a:t>
             </a:r>
             <a:endParaRPr lang="de-DE" sz="1100" dirty="0"/>
@@ -7497,7 +7657,7 @@
           <a:p>
             <a:pPr algn="ctr"/>
             <a:r>
-              <a:rPr lang="de-DE" sz="1100" dirty="0" err="1" smtClean="0"/>
+              <a:rPr lang="de-DE" sz="1100" dirty="0" smtClean="0"/>
               <a:t>short</a:t>
             </a:r>
             <a:endParaRPr lang="de-DE" sz="1100" dirty="0"/>
@@ -7585,7 +7745,7 @@
           <a:p>
             <a:pPr algn="ctr"/>
             <a:r>
-              <a:rPr lang="de-DE" sz="1100" dirty="0" err="1" smtClean="0"/>
+              <a:rPr lang="de-DE" sz="1100" dirty="0" smtClean="0"/>
               <a:t>long</a:t>
             </a:r>
             <a:endParaRPr lang="de-DE" sz="1100" dirty="0"/>
@@ -7673,7 +7833,7 @@
           <a:p>
             <a:pPr algn="ctr"/>
             <a:r>
-              <a:rPr lang="de-DE" sz="1100" dirty="0" err="1" smtClean="0"/>
+              <a:rPr lang="de-DE" sz="1100" dirty="0" smtClean="0"/>
               <a:t>date</a:t>
             </a:r>
             <a:endParaRPr lang="de-DE" sz="1100" dirty="0"/>
@@ -7717,7 +7877,7 @@
           <a:p>
             <a:pPr algn="ctr"/>
             <a:r>
-              <a:rPr lang="de-DE" sz="1100" dirty="0" err="1" smtClean="0"/>
+              <a:rPr lang="de-DE" sz="1100" dirty="0" smtClean="0"/>
               <a:t>string</a:t>
             </a:r>
             <a:endParaRPr lang="de-DE" sz="1100" dirty="0"/>
@@ -7904,11 +8064,7 @@
           <a:p>
             <a:r>
               <a:rPr lang="de-DE" sz="1400" dirty="0" smtClean="0"/>
-              <a:t>Variable </a:t>
-            </a:r>
-            <a:r>
-              <a:rPr lang="de-DE" sz="1400" dirty="0" err="1" smtClean="0"/>
-              <a:t>Types</a:t>
+              <a:t>Variable Types</a:t>
             </a:r>
             <a:endParaRPr lang="de-DE" sz="1400" dirty="0"/>
           </a:p>
@@ -8747,11 +8903,7 @@
             </a:r>
             <a:r>
               <a:rPr lang="de-DE" sz="1100" dirty="0" smtClean="0"/>
-              <a:t>: </a:t>
-            </a:r>
-            <a:r>
-              <a:rPr lang="de-DE" sz="1100" dirty="0" err="1" smtClean="0"/>
-              <a:t>boolean</a:t>
+              <a:t>: boolean</a:t>
             </a:r>
             <a:endParaRPr lang="de-DE" sz="1100" dirty="0"/>
           </a:p>

</xml_diff>

<commit_message>
improve(user-guide): correct/restructure docs on file/spin variables
</commit_message>
<xml_diff>
--- a/develop/drawings/variables.pptx
+++ b/develop/drawings/variables.pptx
@@ -1,24 +1,119 @@
 
 <file path=ppt/presentation.xml><?xml version="1.0" encoding="utf-8"?>
-<p:presentation xmlns:a="http://schemas.openxmlformats.org/drawingml/2006/main" xmlns:p="http://schemas.openxmlformats.org/presentationml/2006/main" xmlns:r="http://schemas.openxmlformats.org/officeDocument/2006/relationships">
+<p:presentation xmlns:a="http://schemas.openxmlformats.org/drawingml/2006/main" xmlns:r="http://schemas.openxmlformats.org/officeDocument/2006/relationships" xmlns:p="http://schemas.openxmlformats.org/presentationml/2006/main">
   <p:sldMasterIdLst>
-    <p:sldMasterId id="2147483648" r:id="rId2"/>
+    <p:sldMasterId id="2147483648" r:id="rId1"/>
   </p:sldMasterIdLst>
   <p:sldIdLst>
-    <p:sldId id="256" r:id="rId3"/>
-    <p:sldId id="257" r:id="rId4"/>
-    <p:sldId id="258" r:id="rId5"/>
-    <p:sldId id="259" r:id="rId6"/>
-    <p:sldId id="260" r:id="rId7"/>
-    <p:sldId id="261" r:id="rId8"/>
+    <p:sldId id="256" r:id="rId2"/>
+    <p:sldId id="257" r:id="rId3"/>
+    <p:sldId id="258" r:id="rId4"/>
+    <p:sldId id="259" r:id="rId5"/>
+    <p:sldId id="260" r:id="rId6"/>
+    <p:sldId id="261" r:id="rId7"/>
   </p:sldIdLst>
   <p:sldSz cx="12192000" cy="6858000"/>
-  <p:notesSz cx="7559675" cy="10691812"/>
+  <p:notesSz cx="7559675" cy="10691813"/>
+  <p:defaultTextStyle>
+    <a:defPPr>
+      <a:defRPr lang="de-DE"/>
+    </a:defPPr>
+    <a:lvl1pPr marL="0" algn="l" defTabSz="914400" rtl="0" eaLnBrk="1" latinLnBrk="0" hangingPunct="1">
+      <a:defRPr sz="1800" kern="1200">
+        <a:solidFill>
+          <a:schemeClr val="tx1"/>
+        </a:solidFill>
+        <a:latin typeface="+mn-lt"/>
+        <a:ea typeface="+mn-ea"/>
+        <a:cs typeface="+mn-cs"/>
+      </a:defRPr>
+    </a:lvl1pPr>
+    <a:lvl2pPr marL="457200" algn="l" defTabSz="914400" rtl="0" eaLnBrk="1" latinLnBrk="0" hangingPunct="1">
+      <a:defRPr sz="1800" kern="1200">
+        <a:solidFill>
+          <a:schemeClr val="tx1"/>
+        </a:solidFill>
+        <a:latin typeface="+mn-lt"/>
+        <a:ea typeface="+mn-ea"/>
+        <a:cs typeface="+mn-cs"/>
+      </a:defRPr>
+    </a:lvl2pPr>
+    <a:lvl3pPr marL="914400" algn="l" defTabSz="914400" rtl="0" eaLnBrk="1" latinLnBrk="0" hangingPunct="1">
+      <a:defRPr sz="1800" kern="1200">
+        <a:solidFill>
+          <a:schemeClr val="tx1"/>
+        </a:solidFill>
+        <a:latin typeface="+mn-lt"/>
+        <a:ea typeface="+mn-ea"/>
+        <a:cs typeface="+mn-cs"/>
+      </a:defRPr>
+    </a:lvl3pPr>
+    <a:lvl4pPr marL="1371600" algn="l" defTabSz="914400" rtl="0" eaLnBrk="1" latinLnBrk="0" hangingPunct="1">
+      <a:defRPr sz="1800" kern="1200">
+        <a:solidFill>
+          <a:schemeClr val="tx1"/>
+        </a:solidFill>
+        <a:latin typeface="+mn-lt"/>
+        <a:ea typeface="+mn-ea"/>
+        <a:cs typeface="+mn-cs"/>
+      </a:defRPr>
+    </a:lvl4pPr>
+    <a:lvl5pPr marL="1828800" algn="l" defTabSz="914400" rtl="0" eaLnBrk="1" latinLnBrk="0" hangingPunct="1">
+      <a:defRPr sz="1800" kern="1200">
+        <a:solidFill>
+          <a:schemeClr val="tx1"/>
+        </a:solidFill>
+        <a:latin typeface="+mn-lt"/>
+        <a:ea typeface="+mn-ea"/>
+        <a:cs typeface="+mn-cs"/>
+      </a:defRPr>
+    </a:lvl5pPr>
+    <a:lvl6pPr marL="2286000" algn="l" defTabSz="914400" rtl="0" eaLnBrk="1" latinLnBrk="0" hangingPunct="1">
+      <a:defRPr sz="1800" kern="1200">
+        <a:solidFill>
+          <a:schemeClr val="tx1"/>
+        </a:solidFill>
+        <a:latin typeface="+mn-lt"/>
+        <a:ea typeface="+mn-ea"/>
+        <a:cs typeface="+mn-cs"/>
+      </a:defRPr>
+    </a:lvl6pPr>
+    <a:lvl7pPr marL="2743200" algn="l" defTabSz="914400" rtl="0" eaLnBrk="1" latinLnBrk="0" hangingPunct="1">
+      <a:defRPr sz="1800" kern="1200">
+        <a:solidFill>
+          <a:schemeClr val="tx1"/>
+        </a:solidFill>
+        <a:latin typeface="+mn-lt"/>
+        <a:ea typeface="+mn-ea"/>
+        <a:cs typeface="+mn-cs"/>
+      </a:defRPr>
+    </a:lvl7pPr>
+    <a:lvl8pPr marL="3200400" algn="l" defTabSz="914400" rtl="0" eaLnBrk="1" latinLnBrk="0" hangingPunct="1">
+      <a:defRPr sz="1800" kern="1200">
+        <a:solidFill>
+          <a:schemeClr val="tx1"/>
+        </a:solidFill>
+        <a:latin typeface="+mn-lt"/>
+        <a:ea typeface="+mn-ea"/>
+        <a:cs typeface="+mn-cs"/>
+      </a:defRPr>
+    </a:lvl8pPr>
+    <a:lvl9pPr marL="3657600" algn="l" defTabSz="914400" rtl="0" eaLnBrk="1" latinLnBrk="0" hangingPunct="1">
+      <a:defRPr sz="1800" kern="1200">
+        <a:solidFill>
+          <a:schemeClr val="tx1"/>
+        </a:solidFill>
+        <a:latin typeface="+mn-lt"/>
+        <a:ea typeface="+mn-ea"/>
+        <a:cs typeface="+mn-cs"/>
+      </a:defRPr>
+    </a:lvl9pPr>
+  </p:defaultTextStyle>
 </p:presentation>
 </file>
 
 <file path=ppt/slideLayouts/slideLayout1.xml><?xml version="1.0" encoding="utf-8"?>
-<p:sldLayout xmlns:a="http://schemas.openxmlformats.org/drawingml/2006/main" xmlns:p="http://schemas.openxmlformats.org/presentationml/2006/main" xmlns:r="http://schemas.openxmlformats.org/officeDocument/2006/relationships" type="blank" preserve="1">
+<p:sldLayout xmlns:a="http://schemas.openxmlformats.org/drawingml/2006/main" xmlns:r="http://schemas.openxmlformats.org/officeDocument/2006/relationships" xmlns:p="http://schemas.openxmlformats.org/presentationml/2006/main" type="blank" preserve="1">
   <p:cSld name="Blank Slide">
     <p:spTree>
       <p:nvGrpSpPr>
@@ -36,11 +131,14 @@
       </p:grpSpPr>
     </p:spTree>
   </p:cSld>
+  <p:clrMapOvr>
+    <a:masterClrMapping/>
+  </p:clrMapOvr>
 </p:sldLayout>
 </file>
 
 <file path=ppt/slideLayouts/slideLayout10.xml><?xml version="1.0" encoding="utf-8"?>
-<p:sldLayout xmlns:a="http://schemas.openxmlformats.org/drawingml/2006/main" xmlns:p="http://schemas.openxmlformats.org/presentationml/2006/main" xmlns:r="http://schemas.openxmlformats.org/officeDocument/2006/relationships" type="objOverTx" preserve="1">
+<p:sldLayout xmlns:a="http://schemas.openxmlformats.org/drawingml/2006/main" xmlns:r="http://schemas.openxmlformats.org/officeDocument/2006/relationships" xmlns:p="http://schemas.openxmlformats.org/presentationml/2006/main" type="objOverTx" preserve="1">
   <p:cSld name="Title, Content over Content">
     <p:spTree>
       <p:nvGrpSpPr>
@@ -76,7 +174,8 @@
           </a:prstGeom>
         </p:spPr>
         <p:txBody>
-          <a:bodyPr lIns="0" rIns="0" tIns="0" bIns="0" anchor="ctr"/>
+          <a:bodyPr lIns="0" tIns="0" rIns="0" bIns="0" anchor="ctr"/>
+          <a:lstStyle/>
           <a:p>
             <a:endParaRPr/>
           </a:p>
@@ -102,7 +201,8 @@
           </a:prstGeom>
         </p:spPr>
         <p:txBody>
-          <a:bodyPr lIns="0" rIns="0" tIns="0" bIns="0"/>
+          <a:bodyPr lIns="0" tIns="0" rIns="0" bIns="0"/>
+          <a:lstStyle/>
           <a:p>
             <a:endParaRPr/>
           </a:p>
@@ -128,7 +228,8 @@
           </a:prstGeom>
         </p:spPr>
         <p:txBody>
-          <a:bodyPr lIns="0" rIns="0" tIns="0" bIns="0"/>
+          <a:bodyPr lIns="0" tIns="0" rIns="0" bIns="0"/>
+          <a:lstStyle/>
           <a:p>
             <a:endParaRPr/>
           </a:p>
@@ -136,11 +237,14 @@
       </p:sp>
     </p:spTree>
   </p:cSld>
+  <p:clrMapOvr>
+    <a:masterClrMapping/>
+  </p:clrMapOvr>
 </p:sldLayout>
 </file>
 
 <file path=ppt/slideLayouts/slideLayout11.xml><?xml version="1.0" encoding="utf-8"?>
-<p:sldLayout xmlns:a="http://schemas.openxmlformats.org/drawingml/2006/main" xmlns:p="http://schemas.openxmlformats.org/presentationml/2006/main" xmlns:r="http://schemas.openxmlformats.org/officeDocument/2006/relationships" type="fourObj" preserve="1">
+<p:sldLayout xmlns:a="http://schemas.openxmlformats.org/drawingml/2006/main" xmlns:r="http://schemas.openxmlformats.org/officeDocument/2006/relationships" xmlns:p="http://schemas.openxmlformats.org/presentationml/2006/main" type="fourObj" preserve="1">
   <p:cSld name="Title, 4 Content">
     <p:spTree>
       <p:nvGrpSpPr>
@@ -176,7 +280,8 @@
           </a:prstGeom>
         </p:spPr>
         <p:txBody>
-          <a:bodyPr lIns="0" rIns="0" tIns="0" bIns="0" anchor="ctr"/>
+          <a:bodyPr lIns="0" tIns="0" rIns="0" bIns="0" anchor="ctr"/>
+          <a:lstStyle/>
           <a:p>
             <a:endParaRPr/>
           </a:p>
@@ -202,7 +307,8 @@
           </a:prstGeom>
         </p:spPr>
         <p:txBody>
-          <a:bodyPr lIns="0" rIns="0" tIns="0" bIns="0"/>
+          <a:bodyPr lIns="0" tIns="0" rIns="0" bIns="0"/>
+          <a:lstStyle/>
           <a:p>
             <a:endParaRPr/>
           </a:p>
@@ -228,7 +334,8 @@
           </a:prstGeom>
         </p:spPr>
         <p:txBody>
-          <a:bodyPr lIns="0" rIns="0" tIns="0" bIns="0"/>
+          <a:bodyPr lIns="0" tIns="0" rIns="0" bIns="0"/>
+          <a:lstStyle/>
           <a:p>
             <a:endParaRPr/>
           </a:p>
@@ -254,7 +361,8 @@
           </a:prstGeom>
         </p:spPr>
         <p:txBody>
-          <a:bodyPr lIns="0" rIns="0" tIns="0" bIns="0"/>
+          <a:bodyPr lIns="0" tIns="0" rIns="0" bIns="0"/>
+          <a:lstStyle/>
           <a:p>
             <a:endParaRPr/>
           </a:p>
@@ -280,7 +388,8 @@
           </a:prstGeom>
         </p:spPr>
         <p:txBody>
-          <a:bodyPr lIns="0" rIns="0" tIns="0" bIns="0"/>
+          <a:bodyPr lIns="0" tIns="0" rIns="0" bIns="0"/>
+          <a:lstStyle/>
           <a:p>
             <a:endParaRPr/>
           </a:p>
@@ -288,11 +397,14 @@
       </p:sp>
     </p:spTree>
   </p:cSld>
+  <p:clrMapOvr>
+    <a:masterClrMapping/>
+  </p:clrMapOvr>
 </p:sldLayout>
 </file>
 
 <file path=ppt/slideLayouts/slideLayout12.xml><?xml version="1.0" encoding="utf-8"?>
-<p:sldLayout xmlns:a="http://schemas.openxmlformats.org/drawingml/2006/main" xmlns:p="http://schemas.openxmlformats.org/presentationml/2006/main" xmlns:r="http://schemas.openxmlformats.org/officeDocument/2006/relationships" type="blank" preserve="1">
+<p:sldLayout xmlns:a="http://schemas.openxmlformats.org/drawingml/2006/main" xmlns:r="http://schemas.openxmlformats.org/officeDocument/2006/relationships" xmlns:p="http://schemas.openxmlformats.org/presentationml/2006/main" type="blank" preserve="1">
   <p:cSld name="Title, 6 Content">
     <p:spTree>
       <p:nvGrpSpPr>
@@ -328,7 +440,8 @@
           </a:prstGeom>
         </p:spPr>
         <p:txBody>
-          <a:bodyPr lIns="0" rIns="0" tIns="0" bIns="0" anchor="ctr"/>
+          <a:bodyPr lIns="0" tIns="0" rIns="0" bIns="0" anchor="ctr"/>
+          <a:lstStyle/>
           <a:p>
             <a:endParaRPr/>
           </a:p>
@@ -354,7 +467,8 @@
           </a:prstGeom>
         </p:spPr>
         <p:txBody>
-          <a:bodyPr lIns="0" rIns="0" tIns="0" bIns="0"/>
+          <a:bodyPr lIns="0" tIns="0" rIns="0" bIns="0"/>
+          <a:lstStyle/>
           <a:p>
             <a:endParaRPr/>
           </a:p>
@@ -380,7 +494,8 @@
           </a:prstGeom>
         </p:spPr>
         <p:txBody>
-          <a:bodyPr lIns="0" rIns="0" tIns="0" bIns="0"/>
+          <a:bodyPr lIns="0" tIns="0" rIns="0" bIns="0"/>
+          <a:lstStyle/>
           <a:p>
             <a:endParaRPr/>
           </a:p>
@@ -388,7 +503,7 @@
       </p:sp>
       <p:pic>
         <p:nvPicPr>
-          <p:cNvPr id="37" name="" descr=""/>
+          <p:cNvPr id="37" name="Grafik 36"/>
           <p:cNvPicPr/>
           <p:nvPr/>
         </p:nvPicPr>
@@ -413,12 +528,12 @@
       </p:pic>
       <p:pic>
         <p:nvPicPr>
-          <p:cNvPr id="38" name="" descr=""/>
+          <p:cNvPr id="38" name="Grafik 37"/>
           <p:cNvPicPr/>
           <p:nvPr/>
         </p:nvPicPr>
         <p:blipFill>
-          <a:blip r:embed="rId3"/>
+          <a:blip r:embed="rId2"/>
           <a:stretch>
             <a:fillRect/>
           </a:stretch>
@@ -438,11 +553,14 @@
       </p:pic>
     </p:spTree>
   </p:cSld>
+  <p:clrMapOvr>
+    <a:masterClrMapping/>
+  </p:clrMapOvr>
 </p:sldLayout>
 </file>
 
 <file path=ppt/slideLayouts/slideLayout2.xml><?xml version="1.0" encoding="utf-8"?>
-<p:sldLayout xmlns:a="http://schemas.openxmlformats.org/drawingml/2006/main" xmlns:p="http://schemas.openxmlformats.org/presentationml/2006/main" xmlns:r="http://schemas.openxmlformats.org/officeDocument/2006/relationships" type="tx" preserve="1">
+<p:sldLayout xmlns:a="http://schemas.openxmlformats.org/drawingml/2006/main" xmlns:r="http://schemas.openxmlformats.org/officeDocument/2006/relationships" xmlns:p="http://schemas.openxmlformats.org/presentationml/2006/main" type="tx" preserve="1">
   <p:cSld name="Title Slide">
     <p:spTree>
       <p:nvGrpSpPr>
@@ -478,7 +596,8 @@
           </a:prstGeom>
         </p:spPr>
         <p:txBody>
-          <a:bodyPr lIns="0" rIns="0" tIns="0" bIns="0" anchor="ctr"/>
+          <a:bodyPr lIns="0" tIns="0" rIns="0" bIns="0" anchor="ctr"/>
+          <a:lstStyle/>
           <a:p>
             <a:endParaRPr/>
           </a:p>
@@ -504,7 +623,8 @@
           </a:prstGeom>
         </p:spPr>
         <p:txBody>
-          <a:bodyPr lIns="0" rIns="0" tIns="0" bIns="0" anchor="ctr"/>
+          <a:bodyPr lIns="0" tIns="0" rIns="0" bIns="0" anchor="ctr"/>
+          <a:lstStyle/>
           <a:p>
             <a:pPr algn="ctr"/>
             <a:endParaRPr/>
@@ -513,11 +633,14 @@
       </p:sp>
     </p:spTree>
   </p:cSld>
+  <p:clrMapOvr>
+    <a:masterClrMapping/>
+  </p:clrMapOvr>
 </p:sldLayout>
 </file>
 
 <file path=ppt/slideLayouts/slideLayout3.xml><?xml version="1.0" encoding="utf-8"?>
-<p:sldLayout xmlns:a="http://schemas.openxmlformats.org/drawingml/2006/main" xmlns:p="http://schemas.openxmlformats.org/presentationml/2006/main" xmlns:r="http://schemas.openxmlformats.org/officeDocument/2006/relationships" type="obj" preserve="1">
+<p:sldLayout xmlns:a="http://schemas.openxmlformats.org/drawingml/2006/main" xmlns:r="http://schemas.openxmlformats.org/officeDocument/2006/relationships" xmlns:p="http://schemas.openxmlformats.org/presentationml/2006/main" type="obj" preserve="1">
   <p:cSld name="Title, Content">
     <p:spTree>
       <p:nvGrpSpPr>
@@ -553,7 +676,8 @@
           </a:prstGeom>
         </p:spPr>
         <p:txBody>
-          <a:bodyPr lIns="0" rIns="0" tIns="0" bIns="0" anchor="ctr"/>
+          <a:bodyPr lIns="0" tIns="0" rIns="0" bIns="0" anchor="ctr"/>
+          <a:lstStyle/>
           <a:p>
             <a:endParaRPr/>
           </a:p>
@@ -579,7 +703,8 @@
           </a:prstGeom>
         </p:spPr>
         <p:txBody>
-          <a:bodyPr lIns="0" rIns="0" tIns="0" bIns="0"/>
+          <a:bodyPr lIns="0" tIns="0" rIns="0" bIns="0"/>
+          <a:lstStyle/>
           <a:p>
             <a:endParaRPr/>
           </a:p>
@@ -587,11 +712,14 @@
       </p:sp>
     </p:spTree>
   </p:cSld>
+  <p:clrMapOvr>
+    <a:masterClrMapping/>
+  </p:clrMapOvr>
 </p:sldLayout>
 </file>
 
 <file path=ppt/slideLayouts/slideLayout4.xml><?xml version="1.0" encoding="utf-8"?>
-<p:sldLayout xmlns:a="http://schemas.openxmlformats.org/drawingml/2006/main" xmlns:p="http://schemas.openxmlformats.org/presentationml/2006/main" xmlns:r="http://schemas.openxmlformats.org/officeDocument/2006/relationships" type="twoObj" preserve="1">
+<p:sldLayout xmlns:a="http://schemas.openxmlformats.org/drawingml/2006/main" xmlns:r="http://schemas.openxmlformats.org/officeDocument/2006/relationships" xmlns:p="http://schemas.openxmlformats.org/presentationml/2006/main" type="twoObj" preserve="1">
   <p:cSld name="Title, 2 Content">
     <p:spTree>
       <p:nvGrpSpPr>
@@ -627,7 +755,8 @@
           </a:prstGeom>
         </p:spPr>
         <p:txBody>
-          <a:bodyPr lIns="0" rIns="0" tIns="0" bIns="0" anchor="ctr"/>
+          <a:bodyPr lIns="0" tIns="0" rIns="0" bIns="0" anchor="ctr"/>
+          <a:lstStyle/>
           <a:p>
             <a:endParaRPr/>
           </a:p>
@@ -653,7 +782,8 @@
           </a:prstGeom>
         </p:spPr>
         <p:txBody>
-          <a:bodyPr lIns="0" rIns="0" tIns="0" bIns="0"/>
+          <a:bodyPr lIns="0" tIns="0" rIns="0" bIns="0"/>
+          <a:lstStyle/>
           <a:p>
             <a:endParaRPr/>
           </a:p>
@@ -679,7 +809,8 @@
           </a:prstGeom>
         </p:spPr>
         <p:txBody>
-          <a:bodyPr lIns="0" rIns="0" tIns="0" bIns="0"/>
+          <a:bodyPr lIns="0" tIns="0" rIns="0" bIns="0"/>
+          <a:lstStyle/>
           <a:p>
             <a:endParaRPr/>
           </a:p>
@@ -687,11 +818,14 @@
       </p:sp>
     </p:spTree>
   </p:cSld>
+  <p:clrMapOvr>
+    <a:masterClrMapping/>
+  </p:clrMapOvr>
 </p:sldLayout>
 </file>
 
 <file path=ppt/slideLayouts/slideLayout5.xml><?xml version="1.0" encoding="utf-8"?>
-<p:sldLayout xmlns:a="http://schemas.openxmlformats.org/drawingml/2006/main" xmlns:p="http://schemas.openxmlformats.org/presentationml/2006/main" xmlns:r="http://schemas.openxmlformats.org/officeDocument/2006/relationships" type="titleOnly" preserve="1">
+<p:sldLayout xmlns:a="http://schemas.openxmlformats.org/drawingml/2006/main" xmlns:r="http://schemas.openxmlformats.org/officeDocument/2006/relationships" xmlns:p="http://schemas.openxmlformats.org/presentationml/2006/main" type="titleOnly" preserve="1">
   <p:cSld name="Title Only">
     <p:spTree>
       <p:nvGrpSpPr>
@@ -727,7 +861,8 @@
           </a:prstGeom>
         </p:spPr>
         <p:txBody>
-          <a:bodyPr lIns="0" rIns="0" tIns="0" bIns="0" anchor="ctr"/>
+          <a:bodyPr lIns="0" tIns="0" rIns="0" bIns="0" anchor="ctr"/>
+          <a:lstStyle/>
           <a:p>
             <a:endParaRPr/>
           </a:p>
@@ -735,11 +870,14 @@
       </p:sp>
     </p:spTree>
   </p:cSld>
+  <p:clrMapOvr>
+    <a:masterClrMapping/>
+  </p:clrMapOvr>
 </p:sldLayout>
 </file>
 
 <file path=ppt/slideLayouts/slideLayout6.xml><?xml version="1.0" encoding="utf-8"?>
-<p:sldLayout xmlns:a="http://schemas.openxmlformats.org/drawingml/2006/main" xmlns:p="http://schemas.openxmlformats.org/presentationml/2006/main" xmlns:r="http://schemas.openxmlformats.org/officeDocument/2006/relationships" type="objOnly" preserve="1">
+<p:sldLayout xmlns:a="http://schemas.openxmlformats.org/drawingml/2006/main" xmlns:r="http://schemas.openxmlformats.org/officeDocument/2006/relationships" xmlns:p="http://schemas.openxmlformats.org/presentationml/2006/main" type="objOnly" preserve="1">
   <p:cSld name="Centered Text">
     <p:spTree>
       <p:nvGrpSpPr>
@@ -775,7 +913,8 @@
           </a:prstGeom>
         </p:spPr>
         <p:txBody>
-          <a:bodyPr lIns="0" rIns="0" tIns="0" bIns="0" anchor="ctr"/>
+          <a:bodyPr lIns="0" tIns="0" rIns="0" bIns="0" anchor="ctr"/>
+          <a:lstStyle/>
           <a:p>
             <a:pPr algn="ctr"/>
             <a:endParaRPr/>
@@ -784,11 +923,14 @@
       </p:sp>
     </p:spTree>
   </p:cSld>
+  <p:clrMapOvr>
+    <a:masterClrMapping/>
+  </p:clrMapOvr>
 </p:sldLayout>
 </file>
 
 <file path=ppt/slideLayouts/slideLayout7.xml><?xml version="1.0" encoding="utf-8"?>
-<p:sldLayout xmlns:a="http://schemas.openxmlformats.org/drawingml/2006/main" xmlns:p="http://schemas.openxmlformats.org/presentationml/2006/main" xmlns:r="http://schemas.openxmlformats.org/officeDocument/2006/relationships" type="twoObjAndObj" preserve="1">
+<p:sldLayout xmlns:a="http://schemas.openxmlformats.org/drawingml/2006/main" xmlns:r="http://schemas.openxmlformats.org/officeDocument/2006/relationships" xmlns:p="http://schemas.openxmlformats.org/presentationml/2006/main" type="twoObjAndObj" preserve="1">
   <p:cSld name="Title, 2 Content and Content">
     <p:spTree>
       <p:nvGrpSpPr>
@@ -824,7 +966,8 @@
           </a:prstGeom>
         </p:spPr>
         <p:txBody>
-          <a:bodyPr lIns="0" rIns="0" tIns="0" bIns="0" anchor="ctr"/>
+          <a:bodyPr lIns="0" tIns="0" rIns="0" bIns="0" anchor="ctr"/>
+          <a:lstStyle/>
           <a:p>
             <a:endParaRPr/>
           </a:p>
@@ -850,7 +993,8 @@
           </a:prstGeom>
         </p:spPr>
         <p:txBody>
-          <a:bodyPr lIns="0" rIns="0" tIns="0" bIns="0"/>
+          <a:bodyPr lIns="0" tIns="0" rIns="0" bIns="0"/>
+          <a:lstStyle/>
           <a:p>
             <a:endParaRPr/>
           </a:p>
@@ -876,7 +1020,8 @@
           </a:prstGeom>
         </p:spPr>
         <p:txBody>
-          <a:bodyPr lIns="0" rIns="0" tIns="0" bIns="0"/>
+          <a:bodyPr lIns="0" tIns="0" rIns="0" bIns="0"/>
+          <a:lstStyle/>
           <a:p>
             <a:endParaRPr/>
           </a:p>
@@ -902,7 +1047,8 @@
           </a:prstGeom>
         </p:spPr>
         <p:txBody>
-          <a:bodyPr lIns="0" rIns="0" tIns="0" bIns="0"/>
+          <a:bodyPr lIns="0" tIns="0" rIns="0" bIns="0"/>
+          <a:lstStyle/>
           <a:p>
             <a:endParaRPr/>
           </a:p>
@@ -910,11 +1056,14 @@
       </p:sp>
     </p:spTree>
   </p:cSld>
+  <p:clrMapOvr>
+    <a:masterClrMapping/>
+  </p:clrMapOvr>
 </p:sldLayout>
 </file>
 
 <file path=ppt/slideLayouts/slideLayout8.xml><?xml version="1.0" encoding="utf-8"?>
-<p:sldLayout xmlns:a="http://schemas.openxmlformats.org/drawingml/2006/main" xmlns:p="http://schemas.openxmlformats.org/presentationml/2006/main" xmlns:r="http://schemas.openxmlformats.org/officeDocument/2006/relationships" type="objAndTwoObj" preserve="1">
+<p:sldLayout xmlns:a="http://schemas.openxmlformats.org/drawingml/2006/main" xmlns:r="http://schemas.openxmlformats.org/officeDocument/2006/relationships" xmlns:p="http://schemas.openxmlformats.org/presentationml/2006/main" type="objAndTwoObj" preserve="1">
   <p:cSld name="Title Content and 2 Content">
     <p:spTree>
       <p:nvGrpSpPr>
@@ -950,7 +1099,8 @@
           </a:prstGeom>
         </p:spPr>
         <p:txBody>
-          <a:bodyPr lIns="0" rIns="0" tIns="0" bIns="0" anchor="ctr"/>
+          <a:bodyPr lIns="0" tIns="0" rIns="0" bIns="0" anchor="ctr"/>
+          <a:lstStyle/>
           <a:p>
             <a:endParaRPr/>
           </a:p>
@@ -976,7 +1126,8 @@
           </a:prstGeom>
         </p:spPr>
         <p:txBody>
-          <a:bodyPr lIns="0" rIns="0" tIns="0" bIns="0"/>
+          <a:bodyPr lIns="0" tIns="0" rIns="0" bIns="0"/>
+          <a:lstStyle/>
           <a:p>
             <a:endParaRPr/>
           </a:p>
@@ -1002,7 +1153,8 @@
           </a:prstGeom>
         </p:spPr>
         <p:txBody>
-          <a:bodyPr lIns="0" rIns="0" tIns="0" bIns="0"/>
+          <a:bodyPr lIns="0" tIns="0" rIns="0" bIns="0"/>
+          <a:lstStyle/>
           <a:p>
             <a:endParaRPr/>
           </a:p>
@@ -1028,7 +1180,8 @@
           </a:prstGeom>
         </p:spPr>
         <p:txBody>
-          <a:bodyPr lIns="0" rIns="0" tIns="0" bIns="0"/>
+          <a:bodyPr lIns="0" tIns="0" rIns="0" bIns="0"/>
+          <a:lstStyle/>
           <a:p>
             <a:endParaRPr/>
           </a:p>
@@ -1036,11 +1189,14 @@
       </p:sp>
     </p:spTree>
   </p:cSld>
+  <p:clrMapOvr>
+    <a:masterClrMapping/>
+  </p:clrMapOvr>
 </p:sldLayout>
 </file>
 
 <file path=ppt/slideLayouts/slideLayout9.xml><?xml version="1.0" encoding="utf-8"?>
-<p:sldLayout xmlns:a="http://schemas.openxmlformats.org/drawingml/2006/main" xmlns:p="http://schemas.openxmlformats.org/presentationml/2006/main" xmlns:r="http://schemas.openxmlformats.org/officeDocument/2006/relationships" type="twoObjOverTx" preserve="1">
+<p:sldLayout xmlns:a="http://schemas.openxmlformats.org/drawingml/2006/main" xmlns:r="http://schemas.openxmlformats.org/officeDocument/2006/relationships" xmlns:p="http://schemas.openxmlformats.org/presentationml/2006/main" type="twoObjOverTx" preserve="1">
   <p:cSld name="Title, 2 Content over Content">
     <p:spTree>
       <p:nvGrpSpPr>
@@ -1076,7 +1232,8 @@
           </a:prstGeom>
         </p:spPr>
         <p:txBody>
-          <a:bodyPr lIns="0" rIns="0" tIns="0" bIns="0" anchor="ctr"/>
+          <a:bodyPr lIns="0" tIns="0" rIns="0" bIns="0" anchor="ctr"/>
+          <a:lstStyle/>
           <a:p>
             <a:endParaRPr/>
           </a:p>
@@ -1102,7 +1259,8 @@
           </a:prstGeom>
         </p:spPr>
         <p:txBody>
-          <a:bodyPr lIns="0" rIns="0" tIns="0" bIns="0"/>
+          <a:bodyPr lIns="0" tIns="0" rIns="0" bIns="0"/>
+          <a:lstStyle/>
           <a:p>
             <a:endParaRPr/>
           </a:p>
@@ -1128,7 +1286,8 @@
           </a:prstGeom>
         </p:spPr>
         <p:txBody>
-          <a:bodyPr lIns="0" rIns="0" tIns="0" bIns="0"/>
+          <a:bodyPr lIns="0" tIns="0" rIns="0" bIns="0"/>
+          <a:lstStyle/>
           <a:p>
             <a:endParaRPr/>
           </a:p>
@@ -1154,7 +1313,8 @@
           </a:prstGeom>
         </p:spPr>
         <p:txBody>
-          <a:bodyPr lIns="0" rIns="0" tIns="0" bIns="0"/>
+          <a:bodyPr lIns="0" tIns="0" rIns="0" bIns="0"/>
+          <a:lstStyle/>
           <a:p>
             <a:endParaRPr/>
           </a:p>
@@ -1162,17 +1322,21 @@
       </p:sp>
     </p:spTree>
   </p:cSld>
+  <p:clrMapOvr>
+    <a:masterClrMapping/>
+  </p:clrMapOvr>
 </p:sldLayout>
 </file>
 
 <file path=ppt/slideMasters/slideMaster1.xml><?xml version="1.0" encoding="utf-8"?>
-<p:sldMaster xmlns:a="http://schemas.openxmlformats.org/drawingml/2006/main" xmlns:p="http://schemas.openxmlformats.org/presentationml/2006/main" xmlns:r="http://schemas.openxmlformats.org/officeDocument/2006/relationships">
+<p:sldMaster xmlns:a="http://schemas.openxmlformats.org/drawingml/2006/main" xmlns:r="http://schemas.openxmlformats.org/officeDocument/2006/relationships" xmlns:p="http://schemas.openxmlformats.org/presentationml/2006/main">
   <p:cSld>
     <p:bg>
       <p:bgPr>
         <a:solidFill>
-          <a:srgbClr val="ffffff"/>
+          <a:srgbClr val="FFFFFF"/>
         </a:solidFill>
+        <a:effectLst/>
       </p:bgPr>
     </p:bg>
     <p:spTree>
@@ -1191,7 +1355,7 @@
       </p:grpSpPr>
       <p:sp>
         <p:nvSpPr>
-          <p:cNvPr id="0" name="PlaceHolder 1"/>
+          <p:cNvPr id="5" name="PlaceHolder 1"/>
           <p:cNvSpPr>
             <a:spLocks noGrp="1"/>
           </p:cNvSpPr>
@@ -1210,6 +1374,7 @@
         </p:spPr>
         <p:txBody>
           <a:bodyPr anchor="ctr"/>
+          <a:lstStyle/>
           <a:p>
             <a:pPr>
               <a:lnSpc>
@@ -1219,7 +1384,7 @@
             <a:r>
               <a:rPr lang="de-DE" sz="1200">
                 <a:solidFill>
-                  <a:srgbClr val="8b8b8b"/>
+                  <a:srgbClr val="8B8B8B"/>
                 </a:solidFill>
                 <a:latin typeface="Calibri"/>
               </a:rPr>
@@ -1231,7 +1396,7 @@
       </p:sp>
       <p:sp>
         <p:nvSpPr>
-          <p:cNvPr id="1" name="PlaceHolder 2"/>
+          <p:cNvPr id="6" name="PlaceHolder 2"/>
           <p:cNvSpPr>
             <a:spLocks noGrp="1"/>
           </p:cNvSpPr>
@@ -1250,6 +1415,7 @@
         </p:spPr>
         <p:txBody>
           <a:bodyPr anchor="ctr"/>
+          <a:lstStyle/>
           <a:p>
             <a:endParaRPr/>
           </a:p>
@@ -1276,6 +1442,7 @@
         </p:spPr>
         <p:txBody>
           <a:bodyPr anchor="ctr"/>
+          <a:lstStyle/>
           <a:p>
             <a:pPr algn="r">
               <a:lnSpc>
@@ -1285,11 +1452,11 @@
             <a:fld id="{D7354D65-4115-4B85-86E9-BABB0FF20F17}" type="slidenum">
               <a:rPr lang="de-DE" sz="1200">
                 <a:solidFill>
-                  <a:srgbClr val="8b8b8b"/>
-                </a:solidFill>
-                <a:latin typeface="Calibri"/>
-              </a:rPr>
-              <a:t>&lt;Nummer&gt;</a:t>
+                  <a:srgbClr val="8B8B8B"/>
+                </a:solidFill>
+                <a:latin typeface="Calibri"/>
+              </a:rPr>
+              <a:t>‹Nr.›</a:t>
             </a:fld>
             <a:endParaRPr/>
           </a:p>
@@ -1315,7 +1482,8 @@
           </a:prstGeom>
         </p:spPr>
         <p:txBody>
-          <a:bodyPr lIns="0" rIns="0" tIns="0" bIns="0" anchor="ctr"/>
+          <a:bodyPr lIns="0" tIns="0" rIns="0" bIns="0" anchor="ctr"/>
+          <a:lstStyle/>
           <a:p>
             <a:r>
               <a:rPr lang="de-DE">
@@ -1347,7 +1515,8 @@
           </a:prstGeom>
         </p:spPr>
         <p:txBody>
-          <a:bodyPr lIns="0" rIns="0" tIns="0" bIns="0"/>
+          <a:bodyPr lIns="0" tIns="0" rIns="0" bIns="0"/>
+          <a:lstStyle/>
           <a:p>
             <a:pPr>
               <a:buSzPct val="45000"/>
@@ -1450,26 +1619,306 @@
       </p:sp>
     </p:spTree>
   </p:cSld>
-  <p:clrMap bg1="lt1" bg2="lt2" tx1="dk1" tx2="dk2" accent1="accent1" accent2="accent2" accent3="accent3" accent4="accent4" accent5="accent5" accent6="accent6" hlink="hlink" folHlink="folHlink"/>
+  <p:clrMap bg1="lt1" tx1="dk1" bg2="lt2" tx2="dk2" accent1="accent1" accent2="accent2" accent3="accent3" accent4="accent4" accent5="accent5" accent6="accent6" hlink="hlink" folHlink="folHlink"/>
   <p:sldLayoutIdLst>
-    <p:sldLayoutId id="2147483649" r:id="rId2"/>
-    <p:sldLayoutId id="2147483650" r:id="rId3"/>
-    <p:sldLayoutId id="2147483651" r:id="rId4"/>
-    <p:sldLayoutId id="2147483652" r:id="rId5"/>
-    <p:sldLayoutId id="2147483653" r:id="rId6"/>
-    <p:sldLayoutId id="2147483654" r:id="rId7"/>
-    <p:sldLayoutId id="2147483655" r:id="rId8"/>
-    <p:sldLayoutId id="2147483656" r:id="rId9"/>
-    <p:sldLayoutId id="2147483657" r:id="rId10"/>
-    <p:sldLayoutId id="2147483658" r:id="rId11"/>
-    <p:sldLayoutId id="2147483659" r:id="rId12"/>
-    <p:sldLayoutId id="2147483660" r:id="rId13"/>
+    <p:sldLayoutId id="2147483649" r:id="rId1"/>
+    <p:sldLayoutId id="2147483650" r:id="rId2"/>
+    <p:sldLayoutId id="2147483651" r:id="rId3"/>
+    <p:sldLayoutId id="2147483652" r:id="rId4"/>
+    <p:sldLayoutId id="2147483653" r:id="rId5"/>
+    <p:sldLayoutId id="2147483654" r:id="rId6"/>
+    <p:sldLayoutId id="2147483655" r:id="rId7"/>
+    <p:sldLayoutId id="2147483656" r:id="rId8"/>
+    <p:sldLayoutId id="2147483657" r:id="rId9"/>
+    <p:sldLayoutId id="2147483658" r:id="rId10"/>
+    <p:sldLayoutId id="2147483659" r:id="rId11"/>
+    <p:sldLayoutId id="2147483660" r:id="rId12"/>
   </p:sldLayoutIdLst>
+  <p:txStyles>
+    <p:titleStyle>
+      <a:lvl1pPr algn="l" defTabSz="914400" rtl="0" eaLnBrk="1" latinLnBrk="0" hangingPunct="1">
+        <a:lnSpc>
+          <a:spcPct val="90000"/>
+        </a:lnSpc>
+        <a:spcBef>
+          <a:spcPct val="0"/>
+        </a:spcBef>
+        <a:buNone/>
+        <a:defRPr sz="4400" kern="1200">
+          <a:solidFill>
+            <a:schemeClr val="tx1"/>
+          </a:solidFill>
+          <a:latin typeface="+mj-lt"/>
+          <a:ea typeface="+mj-ea"/>
+          <a:cs typeface="+mj-cs"/>
+        </a:defRPr>
+      </a:lvl1pPr>
+    </p:titleStyle>
+    <p:bodyStyle>
+      <a:lvl1pPr marL="228600" indent="-228600" algn="l" defTabSz="914400" rtl="0" eaLnBrk="1" latinLnBrk="0" hangingPunct="1">
+        <a:lnSpc>
+          <a:spcPct val="90000"/>
+        </a:lnSpc>
+        <a:spcBef>
+          <a:spcPts val="1000"/>
+        </a:spcBef>
+        <a:buFont typeface="Arial" panose="020B0604020202020204" pitchFamily="34" charset="0"/>
+        <a:buChar char="•"/>
+        <a:defRPr sz="2800" kern="1200">
+          <a:solidFill>
+            <a:schemeClr val="tx1"/>
+          </a:solidFill>
+          <a:latin typeface="+mn-lt"/>
+          <a:ea typeface="+mn-ea"/>
+          <a:cs typeface="+mn-cs"/>
+        </a:defRPr>
+      </a:lvl1pPr>
+      <a:lvl2pPr marL="685800" indent="-228600" algn="l" defTabSz="914400" rtl="0" eaLnBrk="1" latinLnBrk="0" hangingPunct="1">
+        <a:lnSpc>
+          <a:spcPct val="90000"/>
+        </a:lnSpc>
+        <a:spcBef>
+          <a:spcPts val="500"/>
+        </a:spcBef>
+        <a:buFont typeface="Arial" panose="020B0604020202020204" pitchFamily="34" charset="0"/>
+        <a:buChar char="•"/>
+        <a:defRPr sz="2400" kern="1200">
+          <a:solidFill>
+            <a:schemeClr val="tx1"/>
+          </a:solidFill>
+          <a:latin typeface="+mn-lt"/>
+          <a:ea typeface="+mn-ea"/>
+          <a:cs typeface="+mn-cs"/>
+        </a:defRPr>
+      </a:lvl2pPr>
+      <a:lvl3pPr marL="1143000" indent="-228600" algn="l" defTabSz="914400" rtl="0" eaLnBrk="1" latinLnBrk="0" hangingPunct="1">
+        <a:lnSpc>
+          <a:spcPct val="90000"/>
+        </a:lnSpc>
+        <a:spcBef>
+          <a:spcPts val="500"/>
+        </a:spcBef>
+        <a:buFont typeface="Arial" panose="020B0604020202020204" pitchFamily="34" charset="0"/>
+        <a:buChar char="•"/>
+        <a:defRPr sz="2000" kern="1200">
+          <a:solidFill>
+            <a:schemeClr val="tx1"/>
+          </a:solidFill>
+          <a:latin typeface="+mn-lt"/>
+          <a:ea typeface="+mn-ea"/>
+          <a:cs typeface="+mn-cs"/>
+        </a:defRPr>
+      </a:lvl3pPr>
+      <a:lvl4pPr marL="1600200" indent="-228600" algn="l" defTabSz="914400" rtl="0" eaLnBrk="1" latinLnBrk="0" hangingPunct="1">
+        <a:lnSpc>
+          <a:spcPct val="90000"/>
+        </a:lnSpc>
+        <a:spcBef>
+          <a:spcPts val="500"/>
+        </a:spcBef>
+        <a:buFont typeface="Arial" panose="020B0604020202020204" pitchFamily="34" charset="0"/>
+        <a:buChar char="•"/>
+        <a:defRPr sz="1800" kern="1200">
+          <a:solidFill>
+            <a:schemeClr val="tx1"/>
+          </a:solidFill>
+          <a:latin typeface="+mn-lt"/>
+          <a:ea typeface="+mn-ea"/>
+          <a:cs typeface="+mn-cs"/>
+        </a:defRPr>
+      </a:lvl4pPr>
+      <a:lvl5pPr marL="2057400" indent="-228600" algn="l" defTabSz="914400" rtl="0" eaLnBrk="1" latinLnBrk="0" hangingPunct="1">
+        <a:lnSpc>
+          <a:spcPct val="90000"/>
+        </a:lnSpc>
+        <a:spcBef>
+          <a:spcPts val="500"/>
+        </a:spcBef>
+        <a:buFont typeface="Arial" panose="020B0604020202020204" pitchFamily="34" charset="0"/>
+        <a:buChar char="•"/>
+        <a:defRPr sz="1800" kern="1200">
+          <a:solidFill>
+            <a:schemeClr val="tx1"/>
+          </a:solidFill>
+          <a:latin typeface="+mn-lt"/>
+          <a:ea typeface="+mn-ea"/>
+          <a:cs typeface="+mn-cs"/>
+        </a:defRPr>
+      </a:lvl5pPr>
+      <a:lvl6pPr marL="2514600" indent="-228600" algn="l" defTabSz="914400" rtl="0" eaLnBrk="1" latinLnBrk="0" hangingPunct="1">
+        <a:lnSpc>
+          <a:spcPct val="90000"/>
+        </a:lnSpc>
+        <a:spcBef>
+          <a:spcPts val="500"/>
+        </a:spcBef>
+        <a:buFont typeface="Arial" panose="020B0604020202020204" pitchFamily="34" charset="0"/>
+        <a:buChar char="•"/>
+        <a:defRPr sz="1800" kern="1200">
+          <a:solidFill>
+            <a:schemeClr val="tx1"/>
+          </a:solidFill>
+          <a:latin typeface="+mn-lt"/>
+          <a:ea typeface="+mn-ea"/>
+          <a:cs typeface="+mn-cs"/>
+        </a:defRPr>
+      </a:lvl6pPr>
+      <a:lvl7pPr marL="2971800" indent="-228600" algn="l" defTabSz="914400" rtl="0" eaLnBrk="1" latinLnBrk="0" hangingPunct="1">
+        <a:lnSpc>
+          <a:spcPct val="90000"/>
+        </a:lnSpc>
+        <a:spcBef>
+          <a:spcPts val="500"/>
+        </a:spcBef>
+        <a:buFont typeface="Arial" panose="020B0604020202020204" pitchFamily="34" charset="0"/>
+        <a:buChar char="•"/>
+        <a:defRPr sz="1800" kern="1200">
+          <a:solidFill>
+            <a:schemeClr val="tx1"/>
+          </a:solidFill>
+          <a:latin typeface="+mn-lt"/>
+          <a:ea typeface="+mn-ea"/>
+          <a:cs typeface="+mn-cs"/>
+        </a:defRPr>
+      </a:lvl7pPr>
+      <a:lvl8pPr marL="3429000" indent="-228600" algn="l" defTabSz="914400" rtl="0" eaLnBrk="1" latinLnBrk="0" hangingPunct="1">
+        <a:lnSpc>
+          <a:spcPct val="90000"/>
+        </a:lnSpc>
+        <a:spcBef>
+          <a:spcPts val="500"/>
+        </a:spcBef>
+        <a:buFont typeface="Arial" panose="020B0604020202020204" pitchFamily="34" charset="0"/>
+        <a:buChar char="•"/>
+        <a:defRPr sz="1800" kern="1200">
+          <a:solidFill>
+            <a:schemeClr val="tx1"/>
+          </a:solidFill>
+          <a:latin typeface="+mn-lt"/>
+          <a:ea typeface="+mn-ea"/>
+          <a:cs typeface="+mn-cs"/>
+        </a:defRPr>
+      </a:lvl8pPr>
+      <a:lvl9pPr marL="3886200" indent="-228600" algn="l" defTabSz="914400" rtl="0" eaLnBrk="1" latinLnBrk="0" hangingPunct="1">
+        <a:lnSpc>
+          <a:spcPct val="90000"/>
+        </a:lnSpc>
+        <a:spcBef>
+          <a:spcPts val="500"/>
+        </a:spcBef>
+        <a:buFont typeface="Arial" panose="020B0604020202020204" pitchFamily="34" charset="0"/>
+        <a:buChar char="•"/>
+        <a:defRPr sz="1800" kern="1200">
+          <a:solidFill>
+            <a:schemeClr val="tx1"/>
+          </a:solidFill>
+          <a:latin typeface="+mn-lt"/>
+          <a:ea typeface="+mn-ea"/>
+          <a:cs typeface="+mn-cs"/>
+        </a:defRPr>
+      </a:lvl9pPr>
+    </p:bodyStyle>
+    <p:otherStyle>
+      <a:defPPr>
+        <a:defRPr lang="de-DE"/>
+      </a:defPPr>
+      <a:lvl1pPr marL="0" algn="l" defTabSz="914400" rtl="0" eaLnBrk="1" latinLnBrk="0" hangingPunct="1">
+        <a:defRPr sz="1800" kern="1200">
+          <a:solidFill>
+            <a:schemeClr val="tx1"/>
+          </a:solidFill>
+          <a:latin typeface="+mn-lt"/>
+          <a:ea typeface="+mn-ea"/>
+          <a:cs typeface="+mn-cs"/>
+        </a:defRPr>
+      </a:lvl1pPr>
+      <a:lvl2pPr marL="457200" algn="l" defTabSz="914400" rtl="0" eaLnBrk="1" latinLnBrk="0" hangingPunct="1">
+        <a:defRPr sz="1800" kern="1200">
+          <a:solidFill>
+            <a:schemeClr val="tx1"/>
+          </a:solidFill>
+          <a:latin typeface="+mn-lt"/>
+          <a:ea typeface="+mn-ea"/>
+          <a:cs typeface="+mn-cs"/>
+        </a:defRPr>
+      </a:lvl2pPr>
+      <a:lvl3pPr marL="914400" algn="l" defTabSz="914400" rtl="0" eaLnBrk="1" latinLnBrk="0" hangingPunct="1">
+        <a:defRPr sz="1800" kern="1200">
+          <a:solidFill>
+            <a:schemeClr val="tx1"/>
+          </a:solidFill>
+          <a:latin typeface="+mn-lt"/>
+          <a:ea typeface="+mn-ea"/>
+          <a:cs typeface="+mn-cs"/>
+        </a:defRPr>
+      </a:lvl3pPr>
+      <a:lvl4pPr marL="1371600" algn="l" defTabSz="914400" rtl="0" eaLnBrk="1" latinLnBrk="0" hangingPunct="1">
+        <a:defRPr sz="1800" kern="1200">
+          <a:solidFill>
+            <a:schemeClr val="tx1"/>
+          </a:solidFill>
+          <a:latin typeface="+mn-lt"/>
+          <a:ea typeface="+mn-ea"/>
+          <a:cs typeface="+mn-cs"/>
+        </a:defRPr>
+      </a:lvl4pPr>
+      <a:lvl5pPr marL="1828800" algn="l" defTabSz="914400" rtl="0" eaLnBrk="1" latinLnBrk="0" hangingPunct="1">
+        <a:defRPr sz="1800" kern="1200">
+          <a:solidFill>
+            <a:schemeClr val="tx1"/>
+          </a:solidFill>
+          <a:latin typeface="+mn-lt"/>
+          <a:ea typeface="+mn-ea"/>
+          <a:cs typeface="+mn-cs"/>
+        </a:defRPr>
+      </a:lvl5pPr>
+      <a:lvl6pPr marL="2286000" algn="l" defTabSz="914400" rtl="0" eaLnBrk="1" latinLnBrk="0" hangingPunct="1">
+        <a:defRPr sz="1800" kern="1200">
+          <a:solidFill>
+            <a:schemeClr val="tx1"/>
+          </a:solidFill>
+          <a:latin typeface="+mn-lt"/>
+          <a:ea typeface="+mn-ea"/>
+          <a:cs typeface="+mn-cs"/>
+        </a:defRPr>
+      </a:lvl6pPr>
+      <a:lvl7pPr marL="2743200" algn="l" defTabSz="914400" rtl="0" eaLnBrk="1" latinLnBrk="0" hangingPunct="1">
+        <a:defRPr sz="1800" kern="1200">
+          <a:solidFill>
+            <a:schemeClr val="tx1"/>
+          </a:solidFill>
+          <a:latin typeface="+mn-lt"/>
+          <a:ea typeface="+mn-ea"/>
+          <a:cs typeface="+mn-cs"/>
+        </a:defRPr>
+      </a:lvl7pPr>
+      <a:lvl8pPr marL="3200400" algn="l" defTabSz="914400" rtl="0" eaLnBrk="1" latinLnBrk="0" hangingPunct="1">
+        <a:defRPr sz="1800" kern="1200">
+          <a:solidFill>
+            <a:schemeClr val="tx1"/>
+          </a:solidFill>
+          <a:latin typeface="+mn-lt"/>
+          <a:ea typeface="+mn-ea"/>
+          <a:cs typeface="+mn-cs"/>
+        </a:defRPr>
+      </a:lvl8pPr>
+      <a:lvl9pPr marL="3657600" algn="l" defTabSz="914400" rtl="0" eaLnBrk="1" latinLnBrk="0" hangingPunct="1">
+        <a:defRPr sz="1800" kern="1200">
+          <a:solidFill>
+            <a:schemeClr val="tx1"/>
+          </a:solidFill>
+          <a:latin typeface="+mn-lt"/>
+          <a:ea typeface="+mn-ea"/>
+          <a:cs typeface="+mn-cs"/>
+        </a:defRPr>
+      </a:lvl9pPr>
+    </p:otherStyle>
+  </p:txStyles>
 </p:sldMaster>
 </file>
 
 <file path=ppt/slides/slide1.xml><?xml version="1.0" encoding="utf-8"?>
-<p:sld xmlns:a="http://schemas.openxmlformats.org/drawingml/2006/main" xmlns:p="http://schemas.openxmlformats.org/presentationml/2006/main" xmlns:r="http://schemas.openxmlformats.org/officeDocument/2006/relationships">
+<p:sld xmlns:a="http://schemas.openxmlformats.org/drawingml/2006/main" xmlns:r="http://schemas.openxmlformats.org/officeDocument/2006/relationships" xmlns:p="http://schemas.openxmlformats.org/presentationml/2006/main">
   <p:cSld>
     <p:spTree>
       <p:nvGrpSpPr>
@@ -1487,12 +1936,12 @@
       </p:grpSpPr>
       <p:pic>
         <p:nvPicPr>
-          <p:cNvPr id="39" name="Grafik 1" descr=""/>
+          <p:cNvPr id="39" name="Grafik 1"/>
           <p:cNvPicPr/>
           <p:nvPr/>
         </p:nvPicPr>
         <p:blipFill>
-          <a:blip r:embed="rId1"/>
+          <a:blip r:embed="rId2"/>
           <a:stretch>
             <a:fillRect/>
           </a:stretch>
@@ -1525,17 +1974,18 @@
             <a:avLst/>
           </a:prstGeom>
           <a:solidFill>
-            <a:srgbClr val="5b9bd5"/>
-          </a:solidFill>
-          <a:ln w="12600">
-            <a:solidFill>
-              <a:srgbClr val="43729d"/>
-            </a:solidFill>
-            <a:miter/>
-          </a:ln>
-        </p:spPr>
-        <p:txBody>
-          <a:bodyPr lIns="90000" rIns="90000" tIns="45000" bIns="45000" anchor="ctr"/>
+            <a:srgbClr val="5B9BD5"/>
+          </a:solidFill>
+          <a:ln w="12600">
+            <a:solidFill>
+              <a:srgbClr val="43729D"/>
+            </a:solidFill>
+            <a:miter/>
+          </a:ln>
+        </p:spPr>
+        <p:txBody>
+          <a:bodyPr lIns="90000" tIns="45000" rIns="90000" bIns="45000" anchor="ctr"/>
+          <a:lstStyle/>
           <a:p>
             <a:pPr algn="ctr">
               <a:lnSpc>
@@ -1545,7 +1995,7 @@
             <a:r>
               <a:rPr lang="de-DE" sz="1100">
                 <a:solidFill>
-                  <a:srgbClr val="ffffff"/>
+                  <a:srgbClr val="FFFFFF"/>
                 </a:solidFill>
                 <a:latin typeface="Calibri"/>
               </a:rPr>
@@ -1562,7 +2012,7 @@
             <a:r>
               <a:rPr lang="de-DE" sz="1100">
                 <a:solidFill>
-                  <a:srgbClr val="ffffff"/>
+                  <a:srgbClr val="FFFFFF"/>
                 </a:solidFill>
                 <a:latin typeface="Calibri"/>
               </a:rPr>
@@ -1587,17 +2037,18 @@
             <a:avLst/>
           </a:prstGeom>
           <a:solidFill>
-            <a:srgbClr val="5b9bd5"/>
-          </a:solidFill>
-          <a:ln w="12600">
-            <a:solidFill>
-              <a:srgbClr val="43729d"/>
-            </a:solidFill>
-            <a:miter/>
-          </a:ln>
-        </p:spPr>
-        <p:txBody>
-          <a:bodyPr lIns="90000" rIns="90000" tIns="45000" bIns="45000" anchor="ctr"/>
+            <a:srgbClr val="5B9BD5"/>
+          </a:solidFill>
+          <a:ln w="12600">
+            <a:solidFill>
+              <a:srgbClr val="43729D"/>
+            </a:solidFill>
+            <a:miter/>
+          </a:ln>
+        </p:spPr>
+        <p:txBody>
+          <a:bodyPr lIns="90000" tIns="45000" rIns="90000" bIns="45000" anchor="ctr"/>
+          <a:lstStyle/>
           <a:p>
             <a:pPr algn="ctr">
               <a:lnSpc>
@@ -1607,7 +2058,7 @@
             <a:r>
               <a:rPr lang="de-DE" sz="1100">
                 <a:solidFill>
-                  <a:srgbClr val="ffffff"/>
+                  <a:srgbClr val="FFFFFF"/>
                 </a:solidFill>
                 <a:latin typeface="Calibri"/>
               </a:rPr>
@@ -1632,17 +2083,18 @@
             <a:avLst/>
           </a:prstGeom>
           <a:solidFill>
-            <a:srgbClr val="5b9bd5"/>
-          </a:solidFill>
-          <a:ln w="12600">
-            <a:solidFill>
-              <a:srgbClr val="43729d"/>
-            </a:solidFill>
-            <a:miter/>
-          </a:ln>
-        </p:spPr>
-        <p:txBody>
-          <a:bodyPr lIns="90000" rIns="90000" tIns="45000" bIns="45000" anchor="ctr"/>
+            <a:srgbClr val="5B9BD5"/>
+          </a:solidFill>
+          <a:ln w="12600">
+            <a:solidFill>
+              <a:srgbClr val="43729D"/>
+            </a:solidFill>
+            <a:miter/>
+          </a:ln>
+        </p:spPr>
+        <p:txBody>
+          <a:bodyPr lIns="90000" tIns="45000" rIns="90000" bIns="45000" anchor="ctr"/>
+          <a:lstStyle/>
           <a:p>
             <a:pPr algn="ctr">
               <a:lnSpc>
@@ -1652,7 +2104,7 @@
             <a:r>
               <a:rPr lang="de-DE" sz="1100">
                 <a:solidFill>
-                  <a:srgbClr val="ffffff"/>
+                  <a:srgbClr val="FFFFFF"/>
                 </a:solidFill>
                 <a:latin typeface="Calibri"/>
               </a:rPr>
@@ -1677,17 +2129,18 @@
             <a:avLst/>
           </a:prstGeom>
           <a:solidFill>
-            <a:srgbClr val="5b9bd5"/>
-          </a:solidFill>
-          <a:ln w="12600">
-            <a:solidFill>
-              <a:srgbClr val="43729d"/>
-            </a:solidFill>
-            <a:miter/>
-          </a:ln>
-        </p:spPr>
-        <p:txBody>
-          <a:bodyPr lIns="90000" rIns="90000" tIns="45000" bIns="45000" anchor="ctr"/>
+            <a:srgbClr val="5B9BD5"/>
+          </a:solidFill>
+          <a:ln w="12600">
+            <a:solidFill>
+              <a:srgbClr val="43729D"/>
+            </a:solidFill>
+            <a:miter/>
+          </a:ln>
+        </p:spPr>
+        <p:txBody>
+          <a:bodyPr lIns="90000" tIns="45000" rIns="90000" bIns="45000" anchor="ctr"/>
+          <a:lstStyle/>
           <a:p>
             <a:pPr algn="ctr">
               <a:lnSpc>
@@ -1697,7 +2150,7 @@
             <a:r>
               <a:rPr lang="de-DE" sz="1100">
                 <a:solidFill>
-                  <a:srgbClr val="ffffff"/>
+                  <a:srgbClr val="FFFFFF"/>
                 </a:solidFill>
                 <a:latin typeface="Calibri"/>
               </a:rPr>
@@ -1722,17 +2175,18 @@
             <a:avLst/>
           </a:prstGeom>
           <a:solidFill>
-            <a:srgbClr val="5b9bd5"/>
-          </a:solidFill>
-          <a:ln w="12600">
-            <a:solidFill>
-              <a:srgbClr val="43729d"/>
-            </a:solidFill>
-            <a:miter/>
-          </a:ln>
-        </p:spPr>
-        <p:txBody>
-          <a:bodyPr lIns="90000" rIns="90000" tIns="45000" bIns="45000" anchor="ctr"/>
+            <a:srgbClr val="5B9BD5"/>
+          </a:solidFill>
+          <a:ln w="12600">
+            <a:solidFill>
+              <a:srgbClr val="43729D"/>
+            </a:solidFill>
+            <a:miter/>
+          </a:ln>
+        </p:spPr>
+        <p:txBody>
+          <a:bodyPr lIns="90000" tIns="45000" rIns="90000" bIns="45000" anchor="ctr"/>
+          <a:lstStyle/>
           <a:p>
             <a:pPr algn="ctr">
               <a:lnSpc>
@@ -1742,7 +2196,7 @@
             <a:r>
               <a:rPr lang="de-DE" sz="1100">
                 <a:solidFill>
-                  <a:srgbClr val="ffffff"/>
+                  <a:srgbClr val="FFFFFF"/>
                 </a:solidFill>
                 <a:latin typeface="Calibri"/>
               </a:rPr>
@@ -1815,7 +2269,7 @@
               <a:srgbClr val="000000"/>
             </a:solidFill>
             <a:miter/>
-            <a:tailEnd len="med" type="arrow" w="med"/>
+            <a:tailEnd type="arrow" w="med" len="med"/>
           </a:ln>
         </p:spPr>
       </p:sp>
@@ -1838,7 +2292,7 @@
               <a:srgbClr val="000000"/>
             </a:solidFill>
             <a:miter/>
-            <a:tailEnd len="med" type="arrow" w="med"/>
+            <a:tailEnd type="arrow" w="med" len="med"/>
           </a:ln>
         </p:spPr>
       </p:sp>
@@ -1861,7 +2315,7 @@
               <a:srgbClr val="000000"/>
             </a:solidFill>
             <a:miter/>
-            <a:tailEnd len="med" type="arrow" w="med"/>
+            <a:tailEnd type="arrow" w="med" len="med"/>
           </a:ln>
         </p:spPr>
       </p:sp>
@@ -1884,12 +2338,15 @@
               <a:srgbClr val="000000"/>
             </a:solidFill>
             <a:miter/>
-            <a:tailEnd len="med" type="arrow" w="med"/>
+            <a:tailEnd type="arrow" w="med" len="med"/>
           </a:ln>
         </p:spPr>
       </p:sp>
     </p:spTree>
   </p:cSld>
+  <p:clrMapOvr>
+    <a:masterClrMapping/>
+  </p:clrMapOvr>
   <p:timing>
     <p:tnLst>
       <p:par>
@@ -1898,14 +2355,14 @@
             <p:seq>
               <p:cTn id="2" nodeType="mainSeq"/>
               <p:prevCondLst>
-                <p:cond delay="0" evt="onPrev">
+                <p:cond evt="onPrev" delay="0">
                   <p:tgtEl>
                     <p:sldTgt/>
                   </p:tgtEl>
                 </p:cond>
               </p:prevCondLst>
               <p:nextCondLst>
-                <p:cond delay="0" evt="onNext">
+                <p:cond evt="onNext" delay="0">
                   <p:tgtEl>
                     <p:sldTgt/>
                   </p:tgtEl>
@@ -1921,7 +2378,7 @@
 </file>
 
 <file path=ppt/slides/slide2.xml><?xml version="1.0" encoding="utf-8"?>
-<p:sld xmlns:a="http://schemas.openxmlformats.org/drawingml/2006/main" xmlns:p="http://schemas.openxmlformats.org/presentationml/2006/main" xmlns:r="http://schemas.openxmlformats.org/officeDocument/2006/relationships">
+<p:sld xmlns:a="http://schemas.openxmlformats.org/drawingml/2006/main" xmlns:r="http://schemas.openxmlformats.org/officeDocument/2006/relationships" xmlns:p="http://schemas.openxmlformats.org/presentationml/2006/main">
   <p:cSld>
     <p:spTree>
       <p:nvGrpSpPr>
@@ -1952,17 +2409,18 @@
             <a:avLst/>
           </a:prstGeom>
           <a:solidFill>
-            <a:srgbClr val="5b9bd5"/>
-          </a:solidFill>
-          <a:ln w="12600">
-            <a:solidFill>
-              <a:srgbClr val="43729d"/>
-            </a:solidFill>
-            <a:miter/>
-          </a:ln>
-        </p:spPr>
-        <p:txBody>
-          <a:bodyPr lIns="90000" rIns="90000" tIns="45000" bIns="45000" anchor="ctr"/>
+            <a:srgbClr val="5B9BD5"/>
+          </a:solidFill>
+          <a:ln w="12600">
+            <a:solidFill>
+              <a:srgbClr val="43729D"/>
+            </a:solidFill>
+            <a:miter/>
+          </a:ln>
+        </p:spPr>
+        <p:txBody>
+          <a:bodyPr lIns="90000" tIns="45000" rIns="90000" bIns="45000" anchor="ctr"/>
+          <a:lstStyle/>
           <a:p>
             <a:pPr algn="ctr">
               <a:lnSpc>
@@ -1972,7 +2430,7 @@
             <a:r>
               <a:rPr lang="de-DE" sz="1100">
                 <a:solidFill>
-                  <a:srgbClr val="ffffff"/>
+                  <a:srgbClr val="FFFFFF"/>
                 </a:solidFill>
                 <a:latin typeface="Calibri"/>
               </a:rPr>
@@ -1989,7 +2447,7 @@
             <a:r>
               <a:rPr lang="de-DE" sz="1100">
                 <a:solidFill>
-                  <a:srgbClr val="ffffff"/>
+                  <a:srgbClr val="FFFFFF"/>
                 </a:solidFill>
                 <a:latin typeface="Calibri"/>
               </a:rPr>
@@ -2014,17 +2472,18 @@
             <a:avLst/>
           </a:prstGeom>
           <a:solidFill>
-            <a:srgbClr val="5b9bd5"/>
-          </a:solidFill>
-          <a:ln w="12600">
-            <a:solidFill>
-              <a:srgbClr val="43729d"/>
-            </a:solidFill>
-            <a:miter/>
-          </a:ln>
-        </p:spPr>
-        <p:txBody>
-          <a:bodyPr lIns="90000" rIns="90000" tIns="45000" bIns="45000" anchor="ctr"/>
+            <a:srgbClr val="5B9BD5"/>
+          </a:solidFill>
+          <a:ln w="12600">
+            <a:solidFill>
+              <a:srgbClr val="43729D"/>
+            </a:solidFill>
+            <a:miter/>
+          </a:ln>
+        </p:spPr>
+        <p:txBody>
+          <a:bodyPr lIns="90000" tIns="45000" rIns="90000" bIns="45000" anchor="ctr"/>
+          <a:lstStyle/>
           <a:p>
             <a:pPr algn="ctr">
               <a:lnSpc>
@@ -2034,7 +2493,7 @@
             <a:r>
               <a:rPr lang="de-DE" sz="1100">
                 <a:solidFill>
-                  <a:srgbClr val="ffffff"/>
+                  <a:srgbClr val="FFFFFF"/>
                 </a:solidFill>
                 <a:latin typeface="Calibri"/>
               </a:rPr>
@@ -2059,17 +2518,18 @@
             <a:avLst/>
           </a:prstGeom>
           <a:solidFill>
-            <a:srgbClr val="5b9bd5"/>
-          </a:solidFill>
-          <a:ln w="12600">
-            <a:solidFill>
-              <a:srgbClr val="43729d"/>
-            </a:solidFill>
-            <a:miter/>
-          </a:ln>
-        </p:spPr>
-        <p:txBody>
-          <a:bodyPr lIns="90000" rIns="90000" tIns="45000" bIns="45000" anchor="ctr"/>
+            <a:srgbClr val="5B9BD5"/>
+          </a:solidFill>
+          <a:ln w="12600">
+            <a:solidFill>
+              <a:srgbClr val="43729D"/>
+            </a:solidFill>
+            <a:miter/>
+          </a:ln>
+        </p:spPr>
+        <p:txBody>
+          <a:bodyPr lIns="90000" tIns="45000" rIns="90000" bIns="45000" anchor="ctr"/>
+          <a:lstStyle/>
           <a:p>
             <a:pPr algn="ctr">
               <a:lnSpc>
@@ -2079,7 +2539,7 @@
             <a:r>
               <a:rPr lang="de-DE" sz="1100">
                 <a:solidFill>
-                  <a:srgbClr val="ffffff"/>
+                  <a:srgbClr val="FFFFFF"/>
                 </a:solidFill>
                 <a:latin typeface="Calibri"/>
               </a:rPr>
@@ -2104,17 +2564,18 @@
             <a:avLst/>
           </a:prstGeom>
           <a:solidFill>
-            <a:srgbClr val="5b9bd5"/>
-          </a:solidFill>
-          <a:ln w="12600">
-            <a:solidFill>
-              <a:srgbClr val="43729d"/>
-            </a:solidFill>
-            <a:miter/>
-          </a:ln>
-        </p:spPr>
-        <p:txBody>
-          <a:bodyPr lIns="90000" rIns="90000" tIns="45000" bIns="45000" anchor="ctr"/>
+            <a:srgbClr val="5B9BD5"/>
+          </a:solidFill>
+          <a:ln w="12600">
+            <a:solidFill>
+              <a:srgbClr val="43729D"/>
+            </a:solidFill>
+            <a:miter/>
+          </a:ln>
+        </p:spPr>
+        <p:txBody>
+          <a:bodyPr lIns="90000" tIns="45000" rIns="90000" bIns="45000" anchor="ctr"/>
+          <a:lstStyle/>
           <a:p>
             <a:pPr algn="ctr">
               <a:lnSpc>
@@ -2124,7 +2585,7 @@
             <a:r>
               <a:rPr lang="de-DE" sz="1100">
                 <a:solidFill>
-                  <a:srgbClr val="ffffff"/>
+                  <a:srgbClr val="FFFFFF"/>
                 </a:solidFill>
                 <a:latin typeface="Calibri"/>
               </a:rPr>
@@ -2149,17 +2610,18 @@
             <a:avLst/>
           </a:prstGeom>
           <a:solidFill>
-            <a:srgbClr val="5b9bd5"/>
-          </a:solidFill>
-          <a:ln w="12600">
-            <a:solidFill>
-              <a:srgbClr val="43729d"/>
-            </a:solidFill>
-            <a:miter/>
-          </a:ln>
-        </p:spPr>
-        <p:txBody>
-          <a:bodyPr lIns="90000" rIns="90000" tIns="45000" bIns="45000" anchor="ctr"/>
+            <a:srgbClr val="5B9BD5"/>
+          </a:solidFill>
+          <a:ln w="12600">
+            <a:solidFill>
+              <a:srgbClr val="43729D"/>
+            </a:solidFill>
+            <a:miter/>
+          </a:ln>
+        </p:spPr>
+        <p:txBody>
+          <a:bodyPr lIns="90000" tIns="45000" rIns="90000" bIns="45000" anchor="ctr"/>
+          <a:lstStyle/>
           <a:p>
             <a:pPr algn="ctr">
               <a:lnSpc>
@@ -2169,7 +2631,7 @@
             <a:r>
               <a:rPr lang="de-DE" sz="1100">
                 <a:solidFill>
-                  <a:srgbClr val="ffffff"/>
+                  <a:srgbClr val="FFFFFF"/>
                 </a:solidFill>
                 <a:latin typeface="Calibri"/>
               </a:rPr>
@@ -2198,7 +2660,7 @@
               <a:srgbClr val="000000"/>
             </a:solidFill>
             <a:miter/>
-            <a:tailEnd len="med" type="arrow" w="med"/>
+            <a:tailEnd type="arrow" w="med" len="med"/>
           </a:ln>
         </p:spPr>
       </p:sp>
@@ -2221,7 +2683,7 @@
               <a:srgbClr val="000000"/>
             </a:solidFill>
             <a:miter/>
-            <a:tailEnd len="med" type="arrow" w="med"/>
+            <a:tailEnd type="arrow" w="med" len="med"/>
           </a:ln>
         </p:spPr>
       </p:sp>
@@ -2244,7 +2706,7 @@
               <a:srgbClr val="000000"/>
             </a:solidFill>
             <a:miter/>
-            <a:tailEnd len="med" type="arrow" w="med"/>
+            <a:tailEnd type="arrow" w="med" len="med"/>
           </a:ln>
         </p:spPr>
       </p:sp>
@@ -2267,7 +2729,7 @@
               <a:srgbClr val="000000"/>
             </a:solidFill>
             <a:miter/>
-            <a:tailEnd len="med" type="arrow" w="med"/>
+            <a:tailEnd type="arrow" w="med" len="med"/>
           </a:ln>
         </p:spPr>
       </p:sp>
@@ -2286,7 +2748,7 @@
             <a:avLst/>
           </a:prstGeom>
           <a:solidFill>
-            <a:srgbClr val="afabab"/>
+            <a:srgbClr val="AFABAB"/>
           </a:solidFill>
           <a:ln w="12600">
             <a:solidFill>
@@ -2313,17 +2775,18 @@
             </a:avLst>
           </a:prstGeom>
           <a:solidFill>
-            <a:srgbClr val="ed7d31"/>
-          </a:solidFill>
-          <a:ln w="12600">
-            <a:solidFill>
-              <a:srgbClr val="af5c24"/>
-            </a:solidFill>
-            <a:miter/>
-          </a:ln>
-        </p:spPr>
-        <p:txBody>
-          <a:bodyPr lIns="90000" rIns="90000" tIns="45000" bIns="45000" anchor="ctr"/>
+            <a:srgbClr val="ED7D31"/>
+          </a:solidFill>
+          <a:ln w="12600">
+            <a:solidFill>
+              <a:srgbClr val="AF5C24"/>
+            </a:solidFill>
+            <a:miter/>
+          </a:ln>
+        </p:spPr>
+        <p:txBody>
+          <a:bodyPr lIns="90000" tIns="45000" rIns="90000" bIns="45000" anchor="ctr"/>
+          <a:lstStyle/>
           <a:p>
             <a:pPr>
               <a:lnSpc>
@@ -2333,7 +2796,7 @@
             <a:r>
               <a:rPr lang="de-DE" sz="1100">
                 <a:solidFill>
-                  <a:srgbClr val="ffffff"/>
+                  <a:srgbClr val="FFFFFF"/>
                 </a:solidFill>
                 <a:latin typeface="Calibri"/>
               </a:rPr>
@@ -2360,17 +2823,18 @@
             </a:avLst>
           </a:prstGeom>
           <a:solidFill>
-            <a:srgbClr val="ed7d31"/>
-          </a:solidFill>
-          <a:ln w="12600">
-            <a:solidFill>
-              <a:srgbClr val="af5c24"/>
-            </a:solidFill>
-            <a:miter/>
-          </a:ln>
-        </p:spPr>
-        <p:txBody>
-          <a:bodyPr lIns="90000" rIns="90000" tIns="45000" bIns="45000" anchor="ctr"/>
+            <a:srgbClr val="ED7D31"/>
+          </a:solidFill>
+          <a:ln w="12600">
+            <a:solidFill>
+              <a:srgbClr val="AF5C24"/>
+            </a:solidFill>
+            <a:miter/>
+          </a:ln>
+        </p:spPr>
+        <p:txBody>
+          <a:bodyPr lIns="90000" tIns="45000" rIns="90000" bIns="45000" anchor="ctr"/>
+          <a:lstStyle/>
           <a:p>
             <a:pPr>
               <a:lnSpc>
@@ -2380,7 +2844,7 @@
             <a:r>
               <a:rPr lang="de-DE" sz="1100">
                 <a:solidFill>
-                  <a:srgbClr val="ffffff"/>
+                  <a:srgbClr val="FFFFFF"/>
                 </a:solidFill>
                 <a:latin typeface="Calibri"/>
               </a:rPr>
@@ -2405,7 +2869,7 @@
             <a:avLst/>
           </a:prstGeom>
           <a:solidFill>
-            <a:srgbClr val="afabab"/>
+            <a:srgbClr val="AFABAB"/>
           </a:solidFill>
           <a:ln w="12600">
             <a:solidFill>
@@ -2432,17 +2896,18 @@
             </a:avLst>
           </a:prstGeom>
           <a:solidFill>
-            <a:srgbClr val="ed7d31"/>
-          </a:solidFill>
-          <a:ln w="12600">
-            <a:solidFill>
-              <a:srgbClr val="af5c24"/>
-            </a:solidFill>
-            <a:miter/>
-          </a:ln>
-        </p:spPr>
-        <p:txBody>
-          <a:bodyPr lIns="90000" rIns="90000" tIns="45000" bIns="45000" anchor="ctr"/>
+            <a:srgbClr val="ED7D31"/>
+          </a:solidFill>
+          <a:ln w="12600">
+            <a:solidFill>
+              <a:srgbClr val="AF5C24"/>
+            </a:solidFill>
+            <a:miter/>
+          </a:ln>
+        </p:spPr>
+        <p:txBody>
+          <a:bodyPr lIns="90000" tIns="45000" rIns="90000" bIns="45000" anchor="ctr"/>
+          <a:lstStyle/>
           <a:p>
             <a:pPr>
               <a:lnSpc>
@@ -2452,7 +2917,7 @@
             <a:r>
               <a:rPr lang="de-DE" sz="1100">
                 <a:solidFill>
-                  <a:srgbClr val="ffffff"/>
+                  <a:srgbClr val="FFFFFF"/>
                 </a:solidFill>
                 <a:latin typeface="Calibri"/>
               </a:rPr>
@@ -2479,17 +2944,18 @@
             </a:avLst>
           </a:prstGeom>
           <a:solidFill>
-            <a:srgbClr val="ed7d31"/>
-          </a:solidFill>
-          <a:ln w="12600">
-            <a:solidFill>
-              <a:srgbClr val="af5c24"/>
-            </a:solidFill>
-            <a:miter/>
-          </a:ln>
-        </p:spPr>
-        <p:txBody>
-          <a:bodyPr lIns="90000" rIns="90000" tIns="45000" bIns="45000" anchor="ctr"/>
+            <a:srgbClr val="ED7D31"/>
+          </a:solidFill>
+          <a:ln w="12600">
+            <a:solidFill>
+              <a:srgbClr val="AF5C24"/>
+            </a:solidFill>
+            <a:miter/>
+          </a:ln>
+        </p:spPr>
+        <p:txBody>
+          <a:bodyPr lIns="90000" tIns="45000" rIns="90000" bIns="45000" anchor="ctr"/>
+          <a:lstStyle/>
           <a:p>
             <a:pPr>
               <a:lnSpc>
@@ -2499,7 +2965,7 @@
             <a:r>
               <a:rPr lang="de-DE" sz="1100">
                 <a:solidFill>
-                  <a:srgbClr val="ffffff"/>
+                  <a:srgbClr val="FFFFFF"/>
                 </a:solidFill>
                 <a:latin typeface="Calibri"/>
               </a:rPr>
@@ -2568,7 +3034,7 @@
             <a:avLst/>
           </a:prstGeom>
           <a:solidFill>
-            <a:srgbClr val="afabab"/>
+            <a:srgbClr val="AFABAB"/>
           </a:solidFill>
           <a:ln w="12600">
             <a:solidFill>
@@ -2595,17 +3061,18 @@
             </a:avLst>
           </a:prstGeom>
           <a:solidFill>
-            <a:srgbClr val="ed7d31"/>
-          </a:solidFill>
-          <a:ln w="12600">
-            <a:solidFill>
-              <a:srgbClr val="af5c24"/>
-            </a:solidFill>
-            <a:miter/>
-          </a:ln>
-        </p:spPr>
-        <p:txBody>
-          <a:bodyPr lIns="90000" rIns="90000" tIns="45000" bIns="45000" anchor="ctr"/>
+            <a:srgbClr val="ED7D31"/>
+          </a:solidFill>
+          <a:ln w="12600">
+            <a:solidFill>
+              <a:srgbClr val="AF5C24"/>
+            </a:solidFill>
+            <a:miter/>
+          </a:ln>
+        </p:spPr>
+        <p:txBody>
+          <a:bodyPr lIns="90000" tIns="45000" rIns="90000" bIns="45000" anchor="ctr"/>
+          <a:lstStyle/>
           <a:p>
             <a:pPr>
               <a:lnSpc>
@@ -2615,7 +3082,7 @@
             <a:r>
               <a:rPr lang="de-DE" sz="1100">
                 <a:solidFill>
-                  <a:srgbClr val="ffffff"/>
+                  <a:srgbClr val="FFFFFF"/>
                 </a:solidFill>
                 <a:latin typeface="Calibri"/>
               </a:rPr>
@@ -2642,17 +3109,18 @@
             </a:avLst>
           </a:prstGeom>
           <a:solidFill>
-            <a:srgbClr val="ed7d31"/>
-          </a:solidFill>
-          <a:ln w="12600">
-            <a:solidFill>
-              <a:srgbClr val="af5c24"/>
-            </a:solidFill>
-            <a:miter/>
-          </a:ln>
-        </p:spPr>
-        <p:txBody>
-          <a:bodyPr lIns="90000" rIns="90000" tIns="45000" bIns="45000" anchor="ctr"/>
+            <a:srgbClr val="ED7D31"/>
+          </a:solidFill>
+          <a:ln w="12600">
+            <a:solidFill>
+              <a:srgbClr val="AF5C24"/>
+            </a:solidFill>
+            <a:miter/>
+          </a:ln>
+        </p:spPr>
+        <p:txBody>
+          <a:bodyPr lIns="90000" tIns="45000" rIns="90000" bIns="45000" anchor="ctr"/>
+          <a:lstStyle/>
           <a:p>
             <a:pPr>
               <a:lnSpc>
@@ -2662,7 +3130,7 @@
             <a:r>
               <a:rPr lang="de-DE" sz="1100">
                 <a:solidFill>
-                  <a:srgbClr val="ffffff"/>
+                  <a:srgbClr val="FFFFFF"/>
                 </a:solidFill>
                 <a:latin typeface="Calibri"/>
               </a:rPr>
@@ -2696,22 +3164,25 @@
       </p:sp>
     </p:spTree>
   </p:cSld>
+  <p:clrMapOvr>
+    <a:masterClrMapping/>
+  </p:clrMapOvr>
   <p:timing>
     <p:tnLst>
       <p:par>
-        <p:cTn id="3" dur="indefinite" restart="never" nodeType="tmRoot">
+        <p:cTn id="1" dur="indefinite" restart="never" nodeType="tmRoot">
           <p:childTnLst>
             <p:seq>
-              <p:cTn id="4" nodeType="mainSeq"/>
+              <p:cTn id="2" nodeType="mainSeq"/>
               <p:prevCondLst>
-                <p:cond delay="0" evt="onPrev">
+                <p:cond evt="onPrev" delay="0">
                   <p:tgtEl>
                     <p:sldTgt/>
                   </p:tgtEl>
                 </p:cond>
               </p:prevCondLst>
               <p:nextCondLst>
-                <p:cond delay="0" evt="onNext">
+                <p:cond evt="onNext" delay="0">
                   <p:tgtEl>
                     <p:sldTgt/>
                   </p:tgtEl>
@@ -2727,7 +3198,7 @@
 </file>
 
 <file path=ppt/slides/slide3.xml><?xml version="1.0" encoding="utf-8"?>
-<p:sld xmlns:a="http://schemas.openxmlformats.org/drawingml/2006/main" xmlns:p="http://schemas.openxmlformats.org/presentationml/2006/main" xmlns:r="http://schemas.openxmlformats.org/officeDocument/2006/relationships">
+<p:sld xmlns:a="http://schemas.openxmlformats.org/drawingml/2006/main" xmlns:r="http://schemas.openxmlformats.org/officeDocument/2006/relationships" xmlns:p="http://schemas.openxmlformats.org/presentationml/2006/main">
   <p:cSld>
     <p:spTree>
       <p:nvGrpSpPr>
@@ -2758,17 +3229,18 @@
             <a:avLst/>
           </a:prstGeom>
           <a:solidFill>
-            <a:srgbClr val="5b9bd5"/>
-          </a:solidFill>
-          <a:ln w="12600">
-            <a:solidFill>
-              <a:srgbClr val="43729d"/>
-            </a:solidFill>
-            <a:miter/>
-          </a:ln>
-        </p:spPr>
-        <p:txBody>
-          <a:bodyPr lIns="90000" rIns="90000" tIns="45000" bIns="45000" anchor="ctr"/>
+            <a:srgbClr val="5B9BD5"/>
+          </a:solidFill>
+          <a:ln w="12600">
+            <a:solidFill>
+              <a:srgbClr val="43729D"/>
+            </a:solidFill>
+            <a:miter/>
+          </a:ln>
+        </p:spPr>
+        <p:txBody>
+          <a:bodyPr lIns="90000" tIns="45000" rIns="90000" bIns="45000" anchor="ctr"/>
+          <a:lstStyle/>
           <a:p>
             <a:pPr algn="ctr">
               <a:lnSpc>
@@ -2778,7 +3250,7 @@
             <a:r>
               <a:rPr lang="de-DE" sz="1100">
                 <a:solidFill>
-                  <a:srgbClr val="ffffff"/>
+                  <a:srgbClr val="FFFFFF"/>
                 </a:solidFill>
                 <a:latin typeface="Calibri"/>
               </a:rPr>
@@ -2795,7 +3267,7 @@
             <a:r>
               <a:rPr lang="de-DE" sz="1100">
                 <a:solidFill>
-                  <a:srgbClr val="ffffff"/>
+                  <a:srgbClr val="FFFFFF"/>
                 </a:solidFill>
                 <a:latin typeface="Calibri"/>
               </a:rPr>
@@ -2820,17 +3292,18 @@
             <a:avLst/>
           </a:prstGeom>
           <a:solidFill>
-            <a:srgbClr val="5b9bd5"/>
-          </a:solidFill>
-          <a:ln w="12600">
-            <a:solidFill>
-              <a:srgbClr val="43729d"/>
-            </a:solidFill>
-            <a:miter/>
-          </a:ln>
-        </p:spPr>
-        <p:txBody>
-          <a:bodyPr lIns="90000" rIns="90000" tIns="45000" bIns="45000" anchor="ctr"/>
+            <a:srgbClr val="5B9BD5"/>
+          </a:solidFill>
+          <a:ln w="12600">
+            <a:solidFill>
+              <a:srgbClr val="43729D"/>
+            </a:solidFill>
+            <a:miter/>
+          </a:ln>
+        </p:spPr>
+        <p:txBody>
+          <a:bodyPr lIns="90000" tIns="45000" rIns="90000" bIns="45000" anchor="ctr"/>
+          <a:lstStyle/>
           <a:p>
             <a:pPr algn="ctr">
               <a:lnSpc>
@@ -2840,7 +3313,7 @@
             <a:r>
               <a:rPr lang="de-DE" sz="1100">
                 <a:solidFill>
-                  <a:srgbClr val="ffffff"/>
+                  <a:srgbClr val="FFFFFF"/>
                 </a:solidFill>
                 <a:latin typeface="Calibri"/>
               </a:rPr>
@@ -2865,17 +3338,18 @@
             <a:avLst/>
           </a:prstGeom>
           <a:solidFill>
-            <a:srgbClr val="5b9bd5"/>
-          </a:solidFill>
-          <a:ln w="12600">
-            <a:solidFill>
-              <a:srgbClr val="43729d"/>
-            </a:solidFill>
-            <a:miter/>
-          </a:ln>
-        </p:spPr>
-        <p:txBody>
-          <a:bodyPr lIns="90000" rIns="90000" tIns="45000" bIns="45000" anchor="ctr"/>
+            <a:srgbClr val="5B9BD5"/>
+          </a:solidFill>
+          <a:ln w="12600">
+            <a:solidFill>
+              <a:srgbClr val="43729D"/>
+            </a:solidFill>
+            <a:miter/>
+          </a:ln>
+        </p:spPr>
+        <p:txBody>
+          <a:bodyPr lIns="90000" tIns="45000" rIns="90000" bIns="45000" anchor="ctr"/>
+          <a:lstStyle/>
           <a:p>
             <a:pPr algn="ctr">
               <a:lnSpc>
@@ -2885,7 +3359,7 @@
             <a:r>
               <a:rPr lang="de-DE" sz="1100">
                 <a:solidFill>
-                  <a:srgbClr val="ffffff"/>
+                  <a:srgbClr val="FFFFFF"/>
                 </a:solidFill>
                 <a:latin typeface="Calibri"/>
               </a:rPr>
@@ -2910,17 +3384,18 @@
             <a:avLst/>
           </a:prstGeom>
           <a:solidFill>
-            <a:srgbClr val="5b9bd5"/>
-          </a:solidFill>
-          <a:ln w="12600">
-            <a:solidFill>
-              <a:srgbClr val="43729d"/>
-            </a:solidFill>
-            <a:miter/>
-          </a:ln>
-        </p:spPr>
-        <p:txBody>
-          <a:bodyPr lIns="90000" rIns="90000" tIns="45000" bIns="45000" anchor="ctr"/>
+            <a:srgbClr val="5B9BD5"/>
+          </a:solidFill>
+          <a:ln w="12600">
+            <a:solidFill>
+              <a:srgbClr val="43729D"/>
+            </a:solidFill>
+            <a:miter/>
+          </a:ln>
+        </p:spPr>
+        <p:txBody>
+          <a:bodyPr lIns="90000" tIns="45000" rIns="90000" bIns="45000" anchor="ctr"/>
+          <a:lstStyle/>
           <a:p>
             <a:pPr algn="ctr">
               <a:lnSpc>
@@ -2930,7 +3405,7 @@
             <a:r>
               <a:rPr lang="de-DE" sz="1100">
                 <a:solidFill>
-                  <a:srgbClr val="ffffff"/>
+                  <a:srgbClr val="FFFFFF"/>
                 </a:solidFill>
                 <a:latin typeface="Calibri"/>
               </a:rPr>
@@ -2955,17 +3430,18 @@
             <a:avLst/>
           </a:prstGeom>
           <a:solidFill>
-            <a:srgbClr val="5b9bd5"/>
-          </a:solidFill>
-          <a:ln w="12600">
-            <a:solidFill>
-              <a:srgbClr val="43729d"/>
-            </a:solidFill>
-            <a:miter/>
-          </a:ln>
-        </p:spPr>
-        <p:txBody>
-          <a:bodyPr lIns="90000" rIns="90000" tIns="45000" bIns="45000" anchor="ctr"/>
+            <a:srgbClr val="5B9BD5"/>
+          </a:solidFill>
+          <a:ln w="12600">
+            <a:solidFill>
+              <a:srgbClr val="43729D"/>
+            </a:solidFill>
+            <a:miter/>
+          </a:ln>
+        </p:spPr>
+        <p:txBody>
+          <a:bodyPr lIns="90000" tIns="45000" rIns="90000" bIns="45000" anchor="ctr"/>
+          <a:lstStyle/>
           <a:p>
             <a:pPr algn="ctr">
               <a:lnSpc>
@@ -2975,7 +3451,7 @@
             <a:r>
               <a:rPr lang="de-DE" sz="1100">
                 <a:solidFill>
-                  <a:srgbClr val="ffffff"/>
+                  <a:srgbClr val="FFFFFF"/>
                 </a:solidFill>
                 <a:latin typeface="Calibri"/>
               </a:rPr>
@@ -3004,7 +3480,7 @@
               <a:srgbClr val="000000"/>
             </a:solidFill>
             <a:miter/>
-            <a:tailEnd len="med" type="arrow" w="med"/>
+            <a:tailEnd type="arrow" w="med" len="med"/>
           </a:ln>
         </p:spPr>
       </p:sp>
@@ -3027,7 +3503,7 @@
               <a:srgbClr val="000000"/>
             </a:solidFill>
             <a:miter/>
-            <a:tailEnd len="med" type="arrow" w="med"/>
+            <a:tailEnd type="arrow" w="med" len="med"/>
           </a:ln>
         </p:spPr>
       </p:sp>
@@ -3050,7 +3526,7 @@
               <a:srgbClr val="000000"/>
             </a:solidFill>
             <a:miter/>
-            <a:tailEnd len="med" type="arrow" w="med"/>
+            <a:tailEnd type="arrow" w="med" len="med"/>
           </a:ln>
         </p:spPr>
       </p:sp>
@@ -3073,7 +3549,7 @@
               <a:srgbClr val="000000"/>
             </a:solidFill>
             <a:miter/>
-            <a:tailEnd len="med" type="arrow" w="med"/>
+            <a:tailEnd type="arrow" w="med" len="med"/>
           </a:ln>
         </p:spPr>
       </p:sp>
@@ -3092,7 +3568,7 @@
             <a:avLst/>
           </a:prstGeom>
           <a:solidFill>
-            <a:srgbClr val="afabab"/>
+            <a:srgbClr val="AFABAB"/>
           </a:solidFill>
           <a:ln w="12600">
             <a:solidFill>
@@ -3119,17 +3595,18 @@
             </a:avLst>
           </a:prstGeom>
           <a:solidFill>
-            <a:srgbClr val="ed7d31"/>
-          </a:solidFill>
-          <a:ln w="12600">
-            <a:solidFill>
-              <a:srgbClr val="af5c24"/>
-            </a:solidFill>
-            <a:miter/>
-          </a:ln>
-        </p:spPr>
-        <p:txBody>
-          <a:bodyPr lIns="90000" rIns="90000" tIns="45000" bIns="45000" anchor="ctr"/>
+            <a:srgbClr val="ED7D31"/>
+          </a:solidFill>
+          <a:ln w="12600">
+            <a:solidFill>
+              <a:srgbClr val="AF5C24"/>
+            </a:solidFill>
+            <a:miter/>
+          </a:ln>
+        </p:spPr>
+        <p:txBody>
+          <a:bodyPr lIns="90000" tIns="45000" rIns="90000" bIns="45000" anchor="ctr"/>
+          <a:lstStyle/>
           <a:p>
             <a:pPr>
               <a:lnSpc>
@@ -3139,7 +3616,7 @@
             <a:r>
               <a:rPr lang="de-DE" sz="1100">
                 <a:solidFill>
-                  <a:srgbClr val="ffffff"/>
+                  <a:srgbClr val="FFFFFF"/>
                 </a:solidFill>
                 <a:latin typeface="Calibri"/>
               </a:rPr>
@@ -3166,17 +3643,18 @@
             </a:avLst>
           </a:prstGeom>
           <a:solidFill>
-            <a:srgbClr val="ed7d31"/>
-          </a:solidFill>
-          <a:ln w="12600">
-            <a:solidFill>
-              <a:srgbClr val="af5c24"/>
-            </a:solidFill>
-            <a:miter/>
-          </a:ln>
-        </p:spPr>
-        <p:txBody>
-          <a:bodyPr lIns="90000" rIns="90000" tIns="45000" bIns="45000" anchor="ctr"/>
+            <a:srgbClr val="ED7D31"/>
+          </a:solidFill>
+          <a:ln w="12600">
+            <a:solidFill>
+              <a:srgbClr val="AF5C24"/>
+            </a:solidFill>
+            <a:miter/>
+          </a:ln>
+        </p:spPr>
+        <p:txBody>
+          <a:bodyPr lIns="90000" tIns="45000" rIns="90000" bIns="45000" anchor="ctr"/>
+          <a:lstStyle/>
           <a:p>
             <a:pPr>
               <a:lnSpc>
@@ -3186,7 +3664,7 @@
             <a:r>
               <a:rPr lang="de-DE" sz="1100">
                 <a:solidFill>
-                  <a:srgbClr val="ffffff"/>
+                  <a:srgbClr val="FFFFFF"/>
                 </a:solidFill>
                 <a:latin typeface="Calibri"/>
               </a:rPr>
@@ -3211,7 +3689,7 @@
             <a:avLst/>
           </a:prstGeom>
           <a:solidFill>
-            <a:srgbClr val="afabab"/>
+            <a:srgbClr val="AFABAB"/>
           </a:solidFill>
           <a:ln w="12600">
             <a:solidFill>
@@ -3238,17 +3716,18 @@
             </a:avLst>
           </a:prstGeom>
           <a:solidFill>
-            <a:srgbClr val="ed7d31"/>
-          </a:solidFill>
-          <a:ln w="12600">
-            <a:solidFill>
-              <a:srgbClr val="af5c24"/>
-            </a:solidFill>
-            <a:miter/>
-          </a:ln>
-        </p:spPr>
-        <p:txBody>
-          <a:bodyPr lIns="90000" rIns="90000" tIns="45000" bIns="45000" anchor="ctr"/>
+            <a:srgbClr val="ED7D31"/>
+          </a:solidFill>
+          <a:ln w="12600">
+            <a:solidFill>
+              <a:srgbClr val="AF5C24"/>
+            </a:solidFill>
+            <a:miter/>
+          </a:ln>
+        </p:spPr>
+        <p:txBody>
+          <a:bodyPr lIns="90000" tIns="45000" rIns="90000" bIns="45000" anchor="ctr"/>
+          <a:lstStyle/>
           <a:p>
             <a:pPr>
               <a:lnSpc>
@@ -3258,7 +3737,7 @@
             <a:r>
               <a:rPr lang="de-DE" sz="1100">
                 <a:solidFill>
-                  <a:srgbClr val="ffffff"/>
+                  <a:srgbClr val="FFFFFF"/>
                 </a:solidFill>
                 <a:latin typeface="Calibri"/>
               </a:rPr>
@@ -3285,17 +3764,18 @@
             </a:avLst>
           </a:prstGeom>
           <a:solidFill>
-            <a:srgbClr val="ed7d31"/>
-          </a:solidFill>
-          <a:ln w="12600">
-            <a:solidFill>
-              <a:srgbClr val="af5c24"/>
-            </a:solidFill>
-            <a:miter/>
-          </a:ln>
-        </p:spPr>
-        <p:txBody>
-          <a:bodyPr lIns="90000" rIns="90000" tIns="45000" bIns="45000" anchor="ctr"/>
+            <a:srgbClr val="ED7D31"/>
+          </a:solidFill>
+          <a:ln w="12600">
+            <a:solidFill>
+              <a:srgbClr val="AF5C24"/>
+            </a:solidFill>
+            <a:miter/>
+          </a:ln>
+        </p:spPr>
+        <p:txBody>
+          <a:bodyPr lIns="90000" tIns="45000" rIns="90000" bIns="45000" anchor="ctr"/>
+          <a:lstStyle/>
           <a:p>
             <a:pPr>
               <a:lnSpc>
@@ -3305,7 +3785,7 @@
             <a:r>
               <a:rPr lang="de-DE" sz="1100">
                 <a:solidFill>
-                  <a:srgbClr val="ffffff"/>
+                  <a:srgbClr val="FFFFFF"/>
                 </a:solidFill>
                 <a:latin typeface="Calibri"/>
               </a:rPr>
@@ -3374,7 +3854,7 @@
             <a:avLst/>
           </a:prstGeom>
           <a:solidFill>
-            <a:srgbClr val="afabab"/>
+            <a:srgbClr val="AFABAB"/>
           </a:solidFill>
           <a:ln w="12600">
             <a:solidFill>
@@ -3401,17 +3881,18 @@
             </a:avLst>
           </a:prstGeom>
           <a:solidFill>
-            <a:srgbClr val="ed7d31"/>
-          </a:solidFill>
-          <a:ln w="12600">
-            <a:solidFill>
-              <a:srgbClr val="af5c24"/>
-            </a:solidFill>
-            <a:miter/>
-          </a:ln>
-        </p:spPr>
-        <p:txBody>
-          <a:bodyPr lIns="90000" rIns="90000" tIns="45000" bIns="45000" anchor="ctr"/>
+            <a:srgbClr val="ED7D31"/>
+          </a:solidFill>
+          <a:ln w="12600">
+            <a:solidFill>
+              <a:srgbClr val="AF5C24"/>
+            </a:solidFill>
+            <a:miter/>
+          </a:ln>
+        </p:spPr>
+        <p:txBody>
+          <a:bodyPr lIns="90000" tIns="45000" rIns="90000" bIns="45000" anchor="ctr"/>
+          <a:lstStyle/>
           <a:p>
             <a:pPr>
               <a:lnSpc>
@@ -3421,7 +3902,7 @@
             <a:r>
               <a:rPr lang="de-DE" sz="1100">
                 <a:solidFill>
-                  <a:srgbClr val="ffffff"/>
+                  <a:srgbClr val="FFFFFF"/>
                 </a:solidFill>
                 <a:latin typeface="Calibri"/>
               </a:rPr>
@@ -3448,17 +3929,18 @@
             </a:avLst>
           </a:prstGeom>
           <a:solidFill>
-            <a:srgbClr val="ed7d31"/>
-          </a:solidFill>
-          <a:ln w="12600">
-            <a:solidFill>
-              <a:srgbClr val="af5c24"/>
-            </a:solidFill>
-            <a:miter/>
-          </a:ln>
-        </p:spPr>
-        <p:txBody>
-          <a:bodyPr lIns="90000" rIns="90000" tIns="45000" bIns="45000" anchor="ctr"/>
+            <a:srgbClr val="ED7D31"/>
+          </a:solidFill>
+          <a:ln w="12600">
+            <a:solidFill>
+              <a:srgbClr val="AF5C24"/>
+            </a:solidFill>
+            <a:miter/>
+          </a:ln>
+        </p:spPr>
+        <p:txBody>
+          <a:bodyPr lIns="90000" tIns="45000" rIns="90000" bIns="45000" anchor="ctr"/>
+          <a:lstStyle/>
           <a:p>
             <a:pPr>
               <a:lnSpc>
@@ -3468,7 +3950,7 @@
             <a:r>
               <a:rPr lang="de-DE" sz="1100">
                 <a:solidFill>
-                  <a:srgbClr val="ffffff"/>
+                  <a:srgbClr val="FFFFFF"/>
                 </a:solidFill>
                 <a:latin typeface="Calibri"/>
               </a:rPr>
@@ -3515,7 +3997,7 @@
             <a:avLst/>
           </a:prstGeom>
           <a:solidFill>
-            <a:srgbClr val="afabab"/>
+            <a:srgbClr val="AFABAB"/>
           </a:solidFill>
           <a:ln w="12600">
             <a:solidFill>
@@ -3542,17 +4024,18 @@
             </a:avLst>
           </a:prstGeom>
           <a:solidFill>
-            <a:srgbClr val="ed7d31"/>
-          </a:solidFill>
-          <a:ln w="12600">
-            <a:solidFill>
-              <a:srgbClr val="af5c24"/>
-            </a:solidFill>
-            <a:miter/>
-          </a:ln>
-        </p:spPr>
-        <p:txBody>
-          <a:bodyPr lIns="90000" rIns="90000" tIns="45000" bIns="45000" anchor="ctr"/>
+            <a:srgbClr val="ED7D31"/>
+          </a:solidFill>
+          <a:ln w="12600">
+            <a:solidFill>
+              <a:srgbClr val="AF5C24"/>
+            </a:solidFill>
+            <a:miter/>
+          </a:ln>
+        </p:spPr>
+        <p:txBody>
+          <a:bodyPr lIns="90000" tIns="45000" rIns="90000" bIns="45000" anchor="ctr"/>
+          <a:lstStyle/>
           <a:p>
             <a:pPr>
               <a:lnSpc>
@@ -3562,7 +4045,7 @@
             <a:r>
               <a:rPr lang="de-DE" sz="1100">
                 <a:solidFill>
-                  <a:srgbClr val="ffffff"/>
+                  <a:srgbClr val="FFFFFF"/>
                 </a:solidFill>
                 <a:latin typeface="Calibri"/>
               </a:rPr>
@@ -3589,17 +4072,18 @@
             </a:avLst>
           </a:prstGeom>
           <a:solidFill>
-            <a:srgbClr val="ed7d31"/>
-          </a:solidFill>
-          <a:ln w="12600">
-            <a:solidFill>
-              <a:srgbClr val="af5c24"/>
-            </a:solidFill>
-            <a:miter/>
-          </a:ln>
-        </p:spPr>
-        <p:txBody>
-          <a:bodyPr lIns="90000" rIns="90000" tIns="45000" bIns="45000" anchor="ctr"/>
+            <a:srgbClr val="ED7D31"/>
+          </a:solidFill>
+          <a:ln w="12600">
+            <a:solidFill>
+              <a:srgbClr val="AF5C24"/>
+            </a:solidFill>
+            <a:miter/>
+          </a:ln>
+        </p:spPr>
+        <p:txBody>
+          <a:bodyPr lIns="90000" tIns="45000" rIns="90000" bIns="45000" anchor="ctr"/>
+          <a:lstStyle/>
           <a:p>
             <a:pPr>
               <a:lnSpc>
@@ -3609,7 +4093,7 @@
             <a:r>
               <a:rPr lang="de-DE" sz="1100">
                 <a:solidFill>
-                  <a:srgbClr val="ffffff"/>
+                  <a:srgbClr val="FFFFFF"/>
                 </a:solidFill>
                 <a:latin typeface="Calibri"/>
               </a:rPr>
@@ -3643,22 +4127,25 @@
       </p:sp>
     </p:spTree>
   </p:cSld>
+  <p:clrMapOvr>
+    <a:masterClrMapping/>
+  </p:clrMapOvr>
   <p:timing>
     <p:tnLst>
       <p:par>
-        <p:cTn id="5" dur="indefinite" restart="never" nodeType="tmRoot">
+        <p:cTn id="1" dur="indefinite" restart="never" nodeType="tmRoot">
           <p:childTnLst>
             <p:seq>
-              <p:cTn id="6" nodeType="mainSeq"/>
+              <p:cTn id="2" nodeType="mainSeq"/>
               <p:prevCondLst>
-                <p:cond delay="0" evt="onPrev">
+                <p:cond evt="onPrev" delay="0">
                   <p:tgtEl>
                     <p:sldTgt/>
                   </p:tgtEl>
                 </p:cond>
               </p:prevCondLst>
               <p:nextCondLst>
-                <p:cond delay="0" evt="onNext">
+                <p:cond evt="onNext" delay="0">
                   <p:tgtEl>
                     <p:sldTgt/>
                   </p:tgtEl>
@@ -3674,7 +4161,7 @@
 </file>
 
 <file path=ppt/slides/slide4.xml><?xml version="1.0" encoding="utf-8"?>
-<p:sld xmlns:a="http://schemas.openxmlformats.org/drawingml/2006/main" xmlns:p="http://schemas.openxmlformats.org/presentationml/2006/main" xmlns:r="http://schemas.openxmlformats.org/officeDocument/2006/relationships">
+<p:sld xmlns:a="http://schemas.openxmlformats.org/drawingml/2006/main" xmlns:r="http://schemas.openxmlformats.org/officeDocument/2006/relationships" xmlns:p="http://schemas.openxmlformats.org/presentationml/2006/main">
   <p:cSld>
     <p:spTree>
       <p:nvGrpSpPr>
@@ -3710,7 +4197,8 @@
           </a:ln>
         </p:spPr>
         <p:txBody>
-          <a:bodyPr lIns="90000" rIns="90000" tIns="45000" bIns="45000"/>
+          <a:bodyPr lIns="90000" tIns="45000" rIns="90000" bIns="45000"/>
+          <a:lstStyle/>
           <a:p>
             <a:pPr>
               <a:lnSpc>
@@ -3750,7 +4238,8 @@
           </a:ln>
         </p:spPr>
         <p:txBody>
-          <a:bodyPr lIns="90000" rIns="90000" tIns="45000" bIns="45000"/>
+          <a:bodyPr lIns="90000" tIns="45000" rIns="90000" bIns="45000"/>
+          <a:lstStyle/>
           <a:p>
             <a:pPr>
               <a:lnSpc>
@@ -3829,7 +4318,7 @@
             <a:avLst/>
           </a:prstGeom>
           <a:solidFill>
-            <a:srgbClr val="afabab"/>
+            <a:srgbClr val="AFABAB"/>
           </a:solidFill>
           <a:ln w="12600">
             <a:solidFill>
@@ -3856,17 +4345,18 @@
             </a:avLst>
           </a:prstGeom>
           <a:solidFill>
-            <a:srgbClr val="ed7d31"/>
-          </a:solidFill>
-          <a:ln w="12600">
-            <a:solidFill>
-              <a:srgbClr val="af5c24"/>
-            </a:solidFill>
-            <a:miter/>
-          </a:ln>
-        </p:spPr>
-        <p:txBody>
-          <a:bodyPr lIns="90000" rIns="90000" tIns="45000" bIns="45000" anchor="ctr"/>
+            <a:srgbClr val="ED7D31"/>
+          </a:solidFill>
+          <a:ln w="12600">
+            <a:solidFill>
+              <a:srgbClr val="AF5C24"/>
+            </a:solidFill>
+            <a:miter/>
+          </a:ln>
+        </p:spPr>
+        <p:txBody>
+          <a:bodyPr lIns="90000" tIns="45000" rIns="90000" bIns="45000" anchor="ctr"/>
+          <a:lstStyle/>
           <a:p>
             <a:pPr>
               <a:lnSpc>
@@ -3876,7 +4366,7 @@
             <a:r>
               <a:rPr lang="de-DE" sz="1100">
                 <a:solidFill>
-                  <a:srgbClr val="ffffff"/>
+                  <a:srgbClr val="FFFFFF"/>
                 </a:solidFill>
                 <a:latin typeface="Calibri"/>
               </a:rPr>
@@ -3903,17 +4393,18 @@
             </a:avLst>
           </a:prstGeom>
           <a:solidFill>
-            <a:srgbClr val="ed7d31"/>
-          </a:solidFill>
-          <a:ln w="12600">
-            <a:solidFill>
-              <a:srgbClr val="af5c24"/>
-            </a:solidFill>
-            <a:miter/>
-          </a:ln>
-        </p:spPr>
-        <p:txBody>
-          <a:bodyPr lIns="90000" rIns="90000" tIns="45000" bIns="45000" anchor="ctr"/>
+            <a:srgbClr val="ED7D31"/>
+          </a:solidFill>
+          <a:ln w="12600">
+            <a:solidFill>
+              <a:srgbClr val="AF5C24"/>
+            </a:solidFill>
+            <a:miter/>
+          </a:ln>
+        </p:spPr>
+        <p:txBody>
+          <a:bodyPr lIns="90000" tIns="45000" rIns="90000" bIns="45000" anchor="ctr"/>
+          <a:lstStyle/>
           <a:p>
             <a:pPr>
               <a:lnSpc>
@@ -3923,7 +4414,7 @@
             <a:r>
               <a:rPr lang="de-DE" sz="1100">
                 <a:solidFill>
-                  <a:srgbClr val="ffffff"/>
+                  <a:srgbClr val="FFFFFF"/>
                 </a:solidFill>
                 <a:latin typeface="Calibri"/>
               </a:rPr>
@@ -3948,7 +4439,7 @@
             <a:avLst/>
           </a:prstGeom>
           <a:solidFill>
-            <a:srgbClr val="afabab"/>
+            <a:srgbClr val="AFABAB"/>
           </a:solidFill>
           <a:ln w="12600">
             <a:solidFill>
@@ -3975,17 +4466,18 @@
             </a:avLst>
           </a:prstGeom>
           <a:solidFill>
-            <a:srgbClr val="ed7d31"/>
-          </a:solidFill>
-          <a:ln w="12600">
-            <a:solidFill>
-              <a:srgbClr val="af5c24"/>
-            </a:solidFill>
-            <a:miter/>
-          </a:ln>
-        </p:spPr>
-        <p:txBody>
-          <a:bodyPr lIns="90000" rIns="90000" tIns="45000" bIns="45000" anchor="ctr"/>
+            <a:srgbClr val="ED7D31"/>
+          </a:solidFill>
+          <a:ln w="12600">
+            <a:solidFill>
+              <a:srgbClr val="AF5C24"/>
+            </a:solidFill>
+            <a:miter/>
+          </a:ln>
+        </p:spPr>
+        <p:txBody>
+          <a:bodyPr lIns="90000" tIns="45000" rIns="90000" bIns="45000" anchor="ctr"/>
+          <a:lstStyle/>
           <a:p>
             <a:pPr>
               <a:lnSpc>
@@ -3995,7 +4487,7 @@
             <a:r>
               <a:rPr lang="de-DE" sz="1100">
                 <a:solidFill>
-                  <a:srgbClr val="ffffff"/>
+                  <a:srgbClr val="FFFFFF"/>
                 </a:solidFill>
                 <a:latin typeface="Calibri"/>
               </a:rPr>
@@ -4022,17 +4514,18 @@
             </a:avLst>
           </a:prstGeom>
           <a:solidFill>
-            <a:srgbClr val="ed7d31"/>
-          </a:solidFill>
-          <a:ln w="12600">
-            <a:solidFill>
-              <a:srgbClr val="af5c24"/>
-            </a:solidFill>
-            <a:miter/>
-          </a:ln>
-        </p:spPr>
-        <p:txBody>
-          <a:bodyPr lIns="90000" rIns="90000" tIns="45000" bIns="45000" anchor="ctr"/>
+            <a:srgbClr val="ED7D31"/>
+          </a:solidFill>
+          <a:ln w="12600">
+            <a:solidFill>
+              <a:srgbClr val="AF5C24"/>
+            </a:solidFill>
+            <a:miter/>
+          </a:ln>
+        </p:spPr>
+        <p:txBody>
+          <a:bodyPr lIns="90000" tIns="45000" rIns="90000" bIns="45000" anchor="ctr"/>
+          <a:lstStyle/>
           <a:p>
             <a:pPr>
               <a:lnSpc>
@@ -4042,7 +4535,7 @@
             <a:r>
               <a:rPr lang="de-DE" sz="1100">
                 <a:solidFill>
-                  <a:srgbClr val="ffffff"/>
+                  <a:srgbClr val="FFFFFF"/>
                 </a:solidFill>
                 <a:latin typeface="Calibri"/>
               </a:rPr>
@@ -4067,7 +4560,7 @@
             <a:avLst/>
           </a:prstGeom>
           <a:solidFill>
-            <a:srgbClr val="afabab"/>
+            <a:srgbClr val="AFABAB"/>
           </a:solidFill>
           <a:ln w="12600">
             <a:solidFill>
@@ -4094,17 +4587,18 @@
             </a:avLst>
           </a:prstGeom>
           <a:solidFill>
-            <a:srgbClr val="ed7d31"/>
-          </a:solidFill>
-          <a:ln w="12600">
-            <a:solidFill>
-              <a:srgbClr val="af5c24"/>
-            </a:solidFill>
-            <a:miter/>
-          </a:ln>
-        </p:spPr>
-        <p:txBody>
-          <a:bodyPr lIns="90000" rIns="90000" tIns="45000" bIns="45000" anchor="ctr"/>
+            <a:srgbClr val="ED7D31"/>
+          </a:solidFill>
+          <a:ln w="12600">
+            <a:solidFill>
+              <a:srgbClr val="AF5C24"/>
+            </a:solidFill>
+            <a:miter/>
+          </a:ln>
+        </p:spPr>
+        <p:txBody>
+          <a:bodyPr lIns="90000" tIns="45000" rIns="90000" bIns="45000" anchor="ctr"/>
+          <a:lstStyle/>
           <a:p>
             <a:pPr>
               <a:lnSpc>
@@ -4114,7 +4608,7 @@
             <a:r>
               <a:rPr lang="de-DE" sz="1100">
                 <a:solidFill>
-                  <a:srgbClr val="ffffff"/>
+                  <a:srgbClr val="FFFFFF"/>
                 </a:solidFill>
                 <a:latin typeface="Calibri"/>
               </a:rPr>
@@ -4141,17 +4635,18 @@
             </a:avLst>
           </a:prstGeom>
           <a:solidFill>
-            <a:srgbClr val="ed7d31"/>
-          </a:solidFill>
-          <a:ln w="12600">
-            <a:solidFill>
-              <a:srgbClr val="af5c24"/>
-            </a:solidFill>
-            <a:miter/>
-          </a:ln>
-        </p:spPr>
-        <p:txBody>
-          <a:bodyPr lIns="90000" rIns="90000" tIns="45000" bIns="45000" anchor="ctr"/>
+            <a:srgbClr val="ED7D31"/>
+          </a:solidFill>
+          <a:ln w="12600">
+            <a:solidFill>
+              <a:srgbClr val="AF5C24"/>
+            </a:solidFill>
+            <a:miter/>
+          </a:ln>
+        </p:spPr>
+        <p:txBody>
+          <a:bodyPr lIns="90000" tIns="45000" rIns="90000" bIns="45000" anchor="ctr"/>
+          <a:lstStyle/>
           <a:p>
             <a:pPr>
               <a:lnSpc>
@@ -4161,7 +4656,7 @@
             <a:r>
               <a:rPr lang="de-DE" sz="1100">
                 <a:solidFill>
-                  <a:srgbClr val="ffffff"/>
+                  <a:srgbClr val="FFFFFF"/>
                 </a:solidFill>
                 <a:latin typeface="Calibri"/>
               </a:rPr>
@@ -4208,17 +4703,18 @@
             <a:avLst/>
           </a:prstGeom>
           <a:solidFill>
-            <a:srgbClr val="5b9bd5"/>
-          </a:solidFill>
-          <a:ln w="12600">
-            <a:solidFill>
-              <a:srgbClr val="43729d"/>
-            </a:solidFill>
-            <a:miter/>
-          </a:ln>
-        </p:spPr>
-        <p:txBody>
-          <a:bodyPr lIns="90000" rIns="90000" tIns="45000" bIns="45000" anchor="ctr"/>
+            <a:srgbClr val="5B9BD5"/>
+          </a:solidFill>
+          <a:ln w="12600">
+            <a:solidFill>
+              <a:srgbClr val="43729D"/>
+            </a:solidFill>
+            <a:miter/>
+          </a:ln>
+        </p:spPr>
+        <p:txBody>
+          <a:bodyPr lIns="90000" tIns="45000" rIns="90000" bIns="45000" anchor="ctr"/>
+          <a:lstStyle/>
           <a:p>
             <a:pPr algn="ctr">
               <a:lnSpc>
@@ -4228,7 +4724,7 @@
             <a:r>
               <a:rPr lang="de-DE" sz="1200">
                 <a:solidFill>
-                  <a:srgbClr val="ffffff"/>
+                  <a:srgbClr val="FFFFFF"/>
                 </a:solidFill>
                 <a:latin typeface="Calibri"/>
               </a:rPr>
@@ -4271,17 +4767,18 @@
             </a:avLst>
           </a:prstGeom>
           <a:solidFill>
-            <a:srgbClr val="ed7d31"/>
-          </a:solidFill>
-          <a:ln w="12600">
-            <a:solidFill>
-              <a:srgbClr val="af5c24"/>
-            </a:solidFill>
-            <a:miter/>
-          </a:ln>
-        </p:spPr>
-        <p:txBody>
-          <a:bodyPr lIns="90000" rIns="90000" tIns="45000" bIns="45000" anchor="ctr"/>
+            <a:srgbClr val="ED7D31"/>
+          </a:solidFill>
+          <a:ln w="12600">
+            <a:solidFill>
+              <a:srgbClr val="AF5C24"/>
+            </a:solidFill>
+            <a:miter/>
+          </a:ln>
+        </p:spPr>
+        <p:txBody>
+          <a:bodyPr lIns="90000" tIns="45000" rIns="90000" bIns="45000" anchor="ctr"/>
+          <a:lstStyle/>
           <a:p>
             <a:pPr>
               <a:lnSpc>
@@ -4291,7 +4788,7 @@
             <a:r>
               <a:rPr lang="de-DE" sz="1100">
                 <a:solidFill>
-                  <a:srgbClr val="ffffff"/>
+                  <a:srgbClr val="FFFFFF"/>
                 </a:solidFill>
                 <a:latin typeface="Calibri"/>
               </a:rPr>
@@ -4303,22 +4800,25 @@
       </p:sp>
     </p:spTree>
   </p:cSld>
+  <p:clrMapOvr>
+    <a:masterClrMapping/>
+  </p:clrMapOvr>
   <p:timing>
     <p:tnLst>
       <p:par>
-        <p:cTn id="7" dur="indefinite" restart="never" nodeType="tmRoot">
+        <p:cTn id="1" dur="indefinite" restart="never" nodeType="tmRoot">
           <p:childTnLst>
             <p:seq>
-              <p:cTn id="8" nodeType="mainSeq"/>
+              <p:cTn id="2" nodeType="mainSeq"/>
               <p:prevCondLst>
-                <p:cond delay="0" evt="onPrev">
+                <p:cond evt="onPrev" delay="0">
                   <p:tgtEl>
                     <p:sldTgt/>
                   </p:tgtEl>
                 </p:cond>
               </p:prevCondLst>
               <p:nextCondLst>
-                <p:cond delay="0" evt="onNext">
+                <p:cond evt="onNext" delay="0">
                   <p:tgtEl>
                     <p:sldTgt/>
                   </p:tgtEl>
@@ -4334,7 +4834,7 @@
 </file>
 
 <file path=ppt/slides/slide5.xml><?xml version="1.0" encoding="utf-8"?>
-<p:sld xmlns:a="http://schemas.openxmlformats.org/drawingml/2006/main" xmlns:p="http://schemas.openxmlformats.org/presentationml/2006/main" xmlns:r="http://schemas.openxmlformats.org/officeDocument/2006/relationships">
+<p:sld xmlns:a="http://schemas.openxmlformats.org/drawingml/2006/main" xmlns:r="http://schemas.openxmlformats.org/officeDocument/2006/relationships" xmlns:p="http://schemas.openxmlformats.org/presentationml/2006/main">
   <p:cSld>
     <p:spTree>
       <p:nvGrpSpPr>
@@ -4365,17 +4865,18 @@
             <a:avLst/>
           </a:prstGeom>
           <a:solidFill>
-            <a:srgbClr val="70ad47"/>
-          </a:solidFill>
-          <a:ln w="12600">
-            <a:solidFill>
-              <a:srgbClr val="527f34"/>
-            </a:solidFill>
-            <a:miter/>
-          </a:ln>
-        </p:spPr>
-        <p:txBody>
-          <a:bodyPr lIns="90000" rIns="90000" tIns="45000" bIns="45000" anchor="ctr"/>
+            <a:srgbClr val="70AD47"/>
+          </a:solidFill>
+          <a:ln w="12600">
+            <a:solidFill>
+              <a:srgbClr val="527F34"/>
+            </a:solidFill>
+            <a:miter/>
+          </a:ln>
+        </p:spPr>
+        <p:txBody>
+          <a:bodyPr lIns="90000" tIns="45000" rIns="90000" bIns="45000" anchor="ctr"/>
+          <a:lstStyle/>
           <a:p>
             <a:pPr algn="ctr">
               <a:lnSpc>
@@ -4385,7 +4886,7 @@
             <a:r>
               <a:rPr lang="de-DE" sz="1100">
                 <a:solidFill>
-                  <a:srgbClr val="ffffff"/>
+                  <a:srgbClr val="FFFFFF"/>
                 </a:solidFill>
                 <a:latin typeface="Calibri"/>
               </a:rPr>
@@ -4410,17 +4911,18 @@
             <a:avLst/>
           </a:prstGeom>
           <a:solidFill>
-            <a:srgbClr val="70ad47"/>
-          </a:solidFill>
-          <a:ln w="12600">
-            <a:solidFill>
-              <a:srgbClr val="527f34"/>
-            </a:solidFill>
-            <a:miter/>
-          </a:ln>
-        </p:spPr>
-        <p:txBody>
-          <a:bodyPr lIns="90000" rIns="90000" tIns="45000" bIns="45000" anchor="ctr"/>
+            <a:srgbClr val="70AD47"/>
+          </a:solidFill>
+          <a:ln w="12600">
+            <a:solidFill>
+              <a:srgbClr val="527F34"/>
+            </a:solidFill>
+            <a:miter/>
+          </a:ln>
+        </p:spPr>
+        <p:txBody>
+          <a:bodyPr lIns="90000" tIns="45000" rIns="90000" bIns="45000" anchor="ctr"/>
+          <a:lstStyle/>
           <a:p>
             <a:pPr algn="ctr">
               <a:lnSpc>
@@ -4430,7 +4932,7 @@
             <a:r>
               <a:rPr lang="de-DE" sz="1100">
                 <a:solidFill>
-                  <a:srgbClr val="ffffff"/>
+                  <a:srgbClr val="FFFFFF"/>
                 </a:solidFill>
                 <a:latin typeface="Calibri"/>
               </a:rPr>
@@ -4455,17 +4957,18 @@
             <a:avLst/>
           </a:prstGeom>
           <a:solidFill>
-            <a:srgbClr val="70ad47"/>
-          </a:solidFill>
-          <a:ln w="12600">
-            <a:solidFill>
-              <a:srgbClr val="527f34"/>
-            </a:solidFill>
-            <a:miter/>
-          </a:ln>
-        </p:spPr>
-        <p:txBody>
-          <a:bodyPr lIns="90000" rIns="90000" tIns="45000" bIns="45000" anchor="ctr"/>
+            <a:srgbClr val="70AD47"/>
+          </a:solidFill>
+          <a:ln w="12600">
+            <a:solidFill>
+              <a:srgbClr val="527F34"/>
+            </a:solidFill>
+            <a:miter/>
+          </a:ln>
+        </p:spPr>
+        <p:txBody>
+          <a:bodyPr lIns="90000" tIns="45000" rIns="90000" bIns="45000" anchor="ctr"/>
+          <a:lstStyle/>
           <a:p>
             <a:pPr algn="ctr">
               <a:lnSpc>
@@ -4475,7 +4978,7 @@
             <a:r>
               <a:rPr lang="de-DE" sz="1100">
                 <a:solidFill>
-                  <a:srgbClr val="ffffff"/>
+                  <a:srgbClr val="FFFFFF"/>
                 </a:solidFill>
                 <a:latin typeface="Calibri"/>
               </a:rPr>
@@ -4500,17 +5003,18 @@
             <a:avLst/>
           </a:prstGeom>
           <a:solidFill>
-            <a:srgbClr val="70ad47"/>
-          </a:solidFill>
-          <a:ln w="12600">
-            <a:solidFill>
-              <a:srgbClr val="527f34"/>
-            </a:solidFill>
-            <a:miter/>
-          </a:ln>
-        </p:spPr>
-        <p:txBody>
-          <a:bodyPr lIns="90000" rIns="90000" tIns="45000" bIns="45000" anchor="ctr"/>
+            <a:srgbClr val="70AD47"/>
+          </a:solidFill>
+          <a:ln w="12600">
+            <a:solidFill>
+              <a:srgbClr val="527F34"/>
+            </a:solidFill>
+            <a:miter/>
+          </a:ln>
+        </p:spPr>
+        <p:txBody>
+          <a:bodyPr lIns="90000" tIns="45000" rIns="90000" bIns="45000" anchor="ctr"/>
+          <a:lstStyle/>
           <a:p>
             <a:pPr algn="ctr">
               <a:lnSpc>
@@ -4520,7 +5024,7 @@
             <a:r>
               <a:rPr lang="de-DE" sz="1100">
                 <a:solidFill>
-                  <a:srgbClr val="ffffff"/>
+                  <a:srgbClr val="FFFFFF"/>
                 </a:solidFill>
                 <a:latin typeface="Calibri"/>
               </a:rPr>
@@ -4545,17 +5049,18 @@
             <a:avLst/>
           </a:prstGeom>
           <a:solidFill>
-            <a:srgbClr val="70ad47"/>
-          </a:solidFill>
-          <a:ln w="12600">
-            <a:solidFill>
-              <a:srgbClr val="527f34"/>
-            </a:solidFill>
-            <a:miter/>
-          </a:ln>
-        </p:spPr>
-        <p:txBody>
-          <a:bodyPr lIns="90000" rIns="90000" tIns="45000" bIns="45000" anchor="ctr"/>
+            <a:srgbClr val="70AD47"/>
+          </a:solidFill>
+          <a:ln w="12600">
+            <a:solidFill>
+              <a:srgbClr val="527F34"/>
+            </a:solidFill>
+            <a:miter/>
+          </a:ln>
+        </p:spPr>
+        <p:txBody>
+          <a:bodyPr lIns="90000" tIns="45000" rIns="90000" bIns="45000" anchor="ctr"/>
+          <a:lstStyle/>
           <a:p>
             <a:pPr algn="ctr">
               <a:lnSpc>
@@ -4565,7 +5070,7 @@
             <a:r>
               <a:rPr lang="de-DE" sz="1100">
                 <a:solidFill>
-                  <a:srgbClr val="ffffff"/>
+                  <a:srgbClr val="FFFFFF"/>
                 </a:solidFill>
                 <a:latin typeface="Calibri"/>
               </a:rPr>
@@ -4590,17 +5095,18 @@
             <a:avLst/>
           </a:prstGeom>
           <a:solidFill>
-            <a:srgbClr val="70ad47"/>
-          </a:solidFill>
-          <a:ln w="12600">
-            <a:solidFill>
-              <a:srgbClr val="527f34"/>
-            </a:solidFill>
-            <a:miter/>
-          </a:ln>
-        </p:spPr>
-        <p:txBody>
-          <a:bodyPr lIns="90000" rIns="90000" tIns="45000" bIns="45000" anchor="ctr"/>
+            <a:srgbClr val="70AD47"/>
+          </a:solidFill>
+          <a:ln w="12600">
+            <a:solidFill>
+              <a:srgbClr val="527F34"/>
+            </a:solidFill>
+            <a:miter/>
+          </a:ln>
+        </p:spPr>
+        <p:txBody>
+          <a:bodyPr lIns="90000" tIns="45000" rIns="90000" bIns="45000" anchor="ctr"/>
+          <a:lstStyle/>
           <a:p>
             <a:pPr algn="ctr">
               <a:lnSpc>
@@ -4610,7 +5116,7 @@
             <a:r>
               <a:rPr lang="de-DE" sz="1100">
                 <a:solidFill>
-                  <a:srgbClr val="ffffff"/>
+                  <a:srgbClr val="FFFFFF"/>
                 </a:solidFill>
                 <a:latin typeface="Calibri"/>
               </a:rPr>
@@ -4635,17 +5141,18 @@
             <a:avLst/>
           </a:prstGeom>
           <a:solidFill>
-            <a:srgbClr val="70ad47"/>
-          </a:solidFill>
-          <a:ln w="12600">
-            <a:solidFill>
-              <a:srgbClr val="527f34"/>
-            </a:solidFill>
-            <a:miter/>
-          </a:ln>
-        </p:spPr>
-        <p:txBody>
-          <a:bodyPr lIns="90000" rIns="90000" tIns="45000" bIns="45000" anchor="ctr"/>
+            <a:srgbClr val="70AD47"/>
+          </a:solidFill>
+          <a:ln w="12600">
+            <a:solidFill>
+              <a:srgbClr val="527F34"/>
+            </a:solidFill>
+            <a:miter/>
+          </a:ln>
+        </p:spPr>
+        <p:txBody>
+          <a:bodyPr lIns="90000" tIns="45000" rIns="90000" bIns="45000" anchor="ctr"/>
+          <a:lstStyle/>
           <a:p>
             <a:pPr algn="ctr">
               <a:lnSpc>
@@ -4655,7 +5162,7 @@
             <a:r>
               <a:rPr lang="de-DE" sz="1100">
                 <a:solidFill>
-                  <a:srgbClr val="ffffff"/>
+                  <a:srgbClr val="FFFFFF"/>
                 </a:solidFill>
                 <a:latin typeface="Calibri"/>
               </a:rPr>
@@ -4680,17 +5187,18 @@
             <a:avLst/>
           </a:prstGeom>
           <a:solidFill>
-            <a:srgbClr val="70ad47"/>
-          </a:solidFill>
-          <a:ln w="12600">
-            <a:solidFill>
-              <a:srgbClr val="527f34"/>
-            </a:solidFill>
-            <a:miter/>
-          </a:ln>
-        </p:spPr>
-        <p:txBody>
-          <a:bodyPr lIns="90000" rIns="90000" tIns="45000" bIns="45000" anchor="ctr"/>
+            <a:srgbClr val="70AD47"/>
+          </a:solidFill>
+          <a:ln w="12600">
+            <a:solidFill>
+              <a:srgbClr val="527F34"/>
+            </a:solidFill>
+            <a:miter/>
+          </a:ln>
+        </p:spPr>
+        <p:txBody>
+          <a:bodyPr lIns="90000" tIns="45000" rIns="90000" bIns="45000" anchor="ctr"/>
+          <a:lstStyle/>
           <a:p>
             <a:pPr algn="ctr">
               <a:lnSpc>
@@ -4700,7 +5208,7 @@
             <a:r>
               <a:rPr lang="de-DE" sz="1100">
                 <a:solidFill>
-                  <a:srgbClr val="ffffff"/>
+                  <a:srgbClr val="FFFFFF"/>
                 </a:solidFill>
                 <a:latin typeface="Calibri"/>
               </a:rPr>
@@ -4725,17 +5233,18 @@
             <a:avLst/>
           </a:prstGeom>
           <a:solidFill>
-            <a:srgbClr val="70ad47"/>
-          </a:solidFill>
-          <a:ln w="12600">
-            <a:solidFill>
-              <a:srgbClr val="527f34"/>
-            </a:solidFill>
-            <a:miter/>
-          </a:ln>
-        </p:spPr>
-        <p:txBody>
-          <a:bodyPr lIns="90000" rIns="90000" tIns="45000" bIns="45000" anchor="ctr"/>
+            <a:srgbClr val="70AD47"/>
+          </a:solidFill>
+          <a:ln w="12600">
+            <a:solidFill>
+              <a:srgbClr val="527F34"/>
+            </a:solidFill>
+            <a:miter/>
+          </a:ln>
+        </p:spPr>
+        <p:txBody>
+          <a:bodyPr lIns="90000" tIns="45000" rIns="90000" bIns="45000" anchor="ctr"/>
+          <a:lstStyle/>
           <a:p>
             <a:pPr algn="ctr">
               <a:lnSpc>
@@ -4745,7 +5254,7 @@
             <a:r>
               <a:rPr lang="de-DE" sz="1100">
                 <a:solidFill>
-                  <a:srgbClr val="ffffff"/>
+                  <a:srgbClr val="FFFFFF"/>
                 </a:solidFill>
                 <a:latin typeface="Calibri"/>
               </a:rPr>
@@ -4763,14 +5272,14 @@
         </p:nvSpPr>
         <p:spPr>
           <a:xfrm>
-            <a:off x="4964040" y="4666680"/>
+            <a:off x="4944960" y="4741920"/>
             <a:ext cx="1206360" cy="269640"/>
           </a:xfrm>
           <a:prstGeom prst="rect">
             <a:avLst/>
           </a:prstGeom>
           <a:solidFill>
-            <a:srgbClr val="bf9000"/>
+            <a:srgbClr val="BF9000"/>
           </a:solidFill>
           <a:ln w="12600">
             <a:solidFill>
@@ -4780,7 +5289,8 @@
           </a:ln>
         </p:spPr>
         <p:txBody>
-          <a:bodyPr lIns="90000" rIns="90000" tIns="45000" bIns="45000" anchor="ctr"/>
+          <a:bodyPr lIns="90000" tIns="45000" rIns="90000" bIns="45000" anchor="ctr"/>
+          <a:lstStyle/>
           <a:p>
             <a:pPr algn="ctr">
               <a:lnSpc>
@@ -4790,7 +5300,7 @@
             <a:r>
               <a:rPr lang="de-DE" sz="1100">
                 <a:solidFill>
-                  <a:srgbClr val="ffffff"/>
+                  <a:srgbClr val="FFFFFF"/>
                 </a:solidFill>
                 <a:latin typeface="Calibri"/>
               </a:rPr>
@@ -4820,7 +5330,8 @@
           </a:ln>
         </p:spPr>
         <p:txBody>
-          <a:bodyPr lIns="90000" rIns="90000" tIns="45000" bIns="45000"/>
+          <a:bodyPr lIns="90000" tIns="45000" rIns="90000" bIns="45000"/>
+          <a:lstStyle/>
           <a:p>
             <a:pPr>
               <a:lnSpc>
@@ -4849,7 +5360,7 @@
         <p:spPr>
           <a:xfrm>
             <a:off x="6357240" y="653040"/>
-            <a:ext cx="350280" cy="3666960"/>
+            <a:ext cx="350280" cy="3318120"/>
           </a:xfrm>
           <a:prstGeom prst="rightBrace">
             <a:avLst>
@@ -4874,7 +5385,7 @@
         </p:nvSpPr>
         <p:spPr>
           <a:xfrm>
-            <a:off x="6376320" y="4666680"/>
+            <a:off x="6376320" y="4741920"/>
             <a:ext cx="350280" cy="269640"/>
           </a:xfrm>
           <a:prstGeom prst="rightBrace">
@@ -4912,7 +5423,8 @@
           </a:ln>
         </p:spPr>
         <p:txBody>
-          <a:bodyPr lIns="90000" rIns="90000" tIns="45000" bIns="45000"/>
+          <a:bodyPr lIns="90000" tIns="45000" rIns="90000" bIns="45000"/>
+          <a:lstStyle/>
           <a:p>
             <a:pPr>
               <a:lnSpc>
@@ -4952,7 +5464,8 @@
           </a:ln>
         </p:spPr>
         <p:txBody>
-          <a:bodyPr lIns="90000" rIns="90000" tIns="45000" bIns="45000"/>
+          <a:bodyPr lIns="90000" tIns="45000" rIns="90000" bIns="45000"/>
+          <a:lstStyle/>
           <a:p>
             <a:pPr>
               <a:lnSpc>
@@ -4980,24 +5493,25 @@
         </p:nvSpPr>
         <p:spPr>
           <a:xfrm>
-            <a:off x="4964040" y="5634360"/>
+            <a:off x="4944960" y="5646960"/>
             <a:ext cx="1206360" cy="269640"/>
           </a:xfrm>
           <a:prstGeom prst="rect">
             <a:avLst/>
           </a:prstGeom>
           <a:solidFill>
-            <a:srgbClr val="5b9bd5"/>
-          </a:solidFill>
-          <a:ln w="12600">
-            <a:solidFill>
-              <a:srgbClr val="1f4e79"/>
-            </a:solidFill>
-            <a:miter/>
-          </a:ln>
-        </p:spPr>
-        <p:txBody>
-          <a:bodyPr lIns="90000" rIns="90000" tIns="45000" bIns="45000" anchor="ctr"/>
+            <a:srgbClr val="5B9BD5"/>
+          </a:solidFill>
+          <a:ln w="12600">
+            <a:solidFill>
+              <a:srgbClr val="1F4E79"/>
+            </a:solidFill>
+            <a:miter/>
+          </a:ln>
+        </p:spPr>
+        <p:txBody>
+          <a:bodyPr lIns="90000" tIns="45000" rIns="90000" bIns="45000" anchor="ctr"/>
+          <a:lstStyle/>
           <a:p>
             <a:pPr algn="ctr">
               <a:lnSpc>
@@ -5007,7 +5521,7 @@
             <a:r>
               <a:rPr lang="de-DE" sz="1100">
                 <a:solidFill>
-                  <a:srgbClr val="ffffff"/>
+                  <a:srgbClr val="FFFFFF"/>
                 </a:solidFill>
                 <a:latin typeface="Calibri"/>
               </a:rPr>
@@ -5025,24 +5539,25 @@
         </p:nvSpPr>
         <p:spPr>
           <a:xfrm>
-            <a:off x="4964040" y="5249520"/>
+            <a:off x="4944960" y="5262120"/>
             <a:ext cx="1206360" cy="269640"/>
           </a:xfrm>
           <a:prstGeom prst="rect">
             <a:avLst/>
           </a:prstGeom>
           <a:solidFill>
-            <a:srgbClr val="5b9bd5"/>
-          </a:solidFill>
-          <a:ln w="12600">
-            <a:solidFill>
-              <a:srgbClr val="1f4e79"/>
-            </a:solidFill>
-            <a:miter/>
-          </a:ln>
-        </p:spPr>
-        <p:txBody>
-          <a:bodyPr lIns="90000" rIns="90000" tIns="45000" bIns="45000" anchor="ctr"/>
+            <a:srgbClr val="5B9BD5"/>
+          </a:solidFill>
+          <a:ln w="12600">
+            <a:solidFill>
+              <a:srgbClr val="1F4E79"/>
+            </a:solidFill>
+            <a:miter/>
+          </a:ln>
+        </p:spPr>
+        <p:txBody>
+          <a:bodyPr lIns="90000" tIns="45000" rIns="90000" bIns="45000" anchor="ctr"/>
+          <a:lstStyle/>
           <a:p>
             <a:pPr algn="ctr">
               <a:lnSpc>
@@ -5052,7 +5567,7 @@
             <a:r>
               <a:rPr lang="de-DE" sz="1100">
                 <a:solidFill>
-                  <a:srgbClr val="ffffff"/>
+                  <a:srgbClr val="FFFFFF"/>
                 </a:solidFill>
                 <a:latin typeface="Calibri"/>
               </a:rPr>
@@ -5070,24 +5585,27 @@
         </p:nvSpPr>
         <p:spPr>
           <a:xfrm>
-            <a:off x="4968000" y="4082400"/>
+            <a:off x="4944960" y="4221720"/>
             <a:ext cx="1206360" cy="269640"/>
           </a:xfrm>
           <a:prstGeom prst="rect">
             <a:avLst/>
           </a:prstGeom>
           <a:solidFill>
-            <a:srgbClr val="70ad47"/>
-          </a:solidFill>
-          <a:ln w="12600">
-            <a:solidFill>
-              <a:srgbClr val="527f34"/>
-            </a:solidFill>
-            <a:miter/>
-          </a:ln>
-        </p:spPr>
-        <p:txBody>
-          <a:bodyPr lIns="90000" rIns="90000" tIns="45000" bIns="45000" anchor="ctr"/>
+            <a:schemeClr val="accent2"/>
+          </a:solidFill>
+          <a:ln w="12600">
+            <a:solidFill>
+              <a:schemeClr val="accent2">
+                <a:lumMod val="75000"/>
+              </a:schemeClr>
+            </a:solidFill>
+            <a:miter/>
+          </a:ln>
+        </p:spPr>
+        <p:txBody>
+          <a:bodyPr lIns="90000" tIns="45000" rIns="90000" bIns="45000" anchor="ctr"/>
+          <a:lstStyle/>
           <a:p>
             <a:pPr algn="ctr">
               <a:lnSpc>
@@ -5097,7 +5615,7 @@
             <a:r>
               <a:rPr lang="de-DE" sz="1100">
                 <a:solidFill>
-                  <a:srgbClr val="ffffff"/>
+                  <a:srgbClr val="FFFFFF"/>
                 </a:solidFill>
                 <a:latin typeface="Calibri"/>
               </a:rPr>
@@ -5109,22 +5627,25 @@
       </p:sp>
     </p:spTree>
   </p:cSld>
+  <p:clrMapOvr>
+    <a:masterClrMapping/>
+  </p:clrMapOvr>
   <p:timing>
     <p:tnLst>
       <p:par>
-        <p:cTn id="9" dur="indefinite" restart="never" nodeType="tmRoot">
+        <p:cTn id="1" dur="indefinite" restart="never" nodeType="tmRoot">
           <p:childTnLst>
             <p:seq>
-              <p:cTn id="10" nodeType="mainSeq"/>
+              <p:cTn id="2" nodeType="mainSeq"/>
               <p:prevCondLst>
-                <p:cond delay="0" evt="onPrev">
+                <p:cond evt="onPrev" delay="0">
                   <p:tgtEl>
                     <p:sldTgt/>
                   </p:tgtEl>
                 </p:cond>
               </p:prevCondLst>
               <p:nextCondLst>
-                <p:cond delay="0" evt="onNext">
+                <p:cond evt="onNext" delay="0">
                   <p:tgtEl>
                     <p:sldTgt/>
                   </p:tgtEl>
@@ -5140,7 +5661,7 @@
 </file>
 
 <file path=ppt/slides/slide6.xml><?xml version="1.0" encoding="utf-8"?>
-<p:sld xmlns:a="http://schemas.openxmlformats.org/drawingml/2006/main" xmlns:p="http://schemas.openxmlformats.org/presentationml/2006/main" xmlns:r="http://schemas.openxmlformats.org/officeDocument/2006/relationships">
+<p:sld xmlns:a="http://schemas.openxmlformats.org/drawingml/2006/main" xmlns:r="http://schemas.openxmlformats.org/officeDocument/2006/relationships" xmlns:p="http://schemas.openxmlformats.org/presentationml/2006/main">
   <p:cSld>
     <p:spTree>
       <p:nvGrpSpPr>
@@ -5171,17 +5692,18 @@
             <a:avLst/>
           </a:prstGeom>
           <a:solidFill>
-            <a:srgbClr val="70ad47"/>
-          </a:solidFill>
-          <a:ln w="12600">
-            <a:solidFill>
-              <a:srgbClr val="527f34"/>
-            </a:solidFill>
-            <a:miter/>
-          </a:ln>
-        </p:spPr>
-        <p:txBody>
-          <a:bodyPr lIns="90000" rIns="90000" tIns="45000" bIns="45000" anchor="ctr"/>
+            <a:srgbClr val="70AD47"/>
+          </a:solidFill>
+          <a:ln w="12600">
+            <a:solidFill>
+              <a:srgbClr val="527F34"/>
+            </a:solidFill>
+            <a:miter/>
+          </a:ln>
+        </p:spPr>
+        <p:txBody>
+          <a:bodyPr lIns="90000" tIns="45000" rIns="90000" bIns="45000" anchor="ctr"/>
+          <a:lstStyle/>
           <a:p>
             <a:pPr algn="ctr">
               <a:lnSpc>
@@ -5191,7 +5713,7 @@
             <a:r>
               <a:rPr lang="de-DE" sz="1100">
                 <a:solidFill>
-                  <a:srgbClr val="ffffff"/>
+                  <a:srgbClr val="FFFFFF"/>
                 </a:solidFill>
                 <a:latin typeface="Calibri"/>
               </a:rPr>
@@ -5216,17 +5738,18 @@
             <a:avLst/>
           </a:prstGeom>
           <a:solidFill>
-            <a:srgbClr val="70ad47"/>
-          </a:solidFill>
-          <a:ln w="12600">
-            <a:solidFill>
-              <a:srgbClr val="527f34"/>
-            </a:solidFill>
-            <a:miter/>
-          </a:ln>
-        </p:spPr>
-        <p:txBody>
-          <a:bodyPr lIns="90000" rIns="90000" tIns="45000" bIns="45000" anchor="ctr"/>
+            <a:srgbClr val="70AD47"/>
+          </a:solidFill>
+          <a:ln w="12600">
+            <a:solidFill>
+              <a:srgbClr val="527F34"/>
+            </a:solidFill>
+            <a:miter/>
+          </a:ln>
+        </p:spPr>
+        <p:txBody>
+          <a:bodyPr lIns="90000" tIns="45000" rIns="90000" bIns="45000" anchor="ctr"/>
+          <a:lstStyle/>
           <a:p>
             <a:pPr algn="ctr">
               <a:lnSpc>
@@ -5236,7 +5759,7 @@
             <a:r>
               <a:rPr lang="de-DE" sz="1100">
                 <a:solidFill>
-                  <a:srgbClr val="ffffff"/>
+                  <a:srgbClr val="FFFFFF"/>
                 </a:solidFill>
                 <a:latin typeface="Calibri"/>
               </a:rPr>
@@ -5261,17 +5784,18 @@
             <a:avLst/>
           </a:prstGeom>
           <a:solidFill>
-            <a:srgbClr val="70ad47"/>
-          </a:solidFill>
-          <a:ln w="12600">
-            <a:solidFill>
-              <a:srgbClr val="527f34"/>
-            </a:solidFill>
-            <a:miter/>
-          </a:ln>
-        </p:spPr>
-        <p:txBody>
-          <a:bodyPr lIns="90000" rIns="90000" tIns="45000" bIns="45000" anchor="ctr"/>
+            <a:srgbClr val="70AD47"/>
+          </a:solidFill>
+          <a:ln w="12600">
+            <a:solidFill>
+              <a:srgbClr val="527F34"/>
+            </a:solidFill>
+            <a:miter/>
+          </a:ln>
+        </p:spPr>
+        <p:txBody>
+          <a:bodyPr lIns="90000" tIns="45000" rIns="90000" bIns="45000" anchor="ctr"/>
+          <a:lstStyle/>
           <a:p>
             <a:pPr algn="ctr">
               <a:lnSpc>
@@ -5281,7 +5805,7 @@
             <a:r>
               <a:rPr lang="de-DE" sz="1100">
                 <a:solidFill>
-                  <a:srgbClr val="ffffff"/>
+                  <a:srgbClr val="FFFFFF"/>
                 </a:solidFill>
                 <a:latin typeface="Calibri"/>
               </a:rPr>
@@ -5306,17 +5830,18 @@
             <a:avLst/>
           </a:prstGeom>
           <a:solidFill>
-            <a:srgbClr val="70ad47"/>
-          </a:solidFill>
-          <a:ln w="12600">
-            <a:solidFill>
-              <a:srgbClr val="527f34"/>
-            </a:solidFill>
-            <a:miter/>
-          </a:ln>
-        </p:spPr>
-        <p:txBody>
-          <a:bodyPr lIns="90000" rIns="90000" tIns="45000" bIns="45000" anchor="ctr"/>
+            <a:srgbClr val="70AD47"/>
+          </a:solidFill>
+          <a:ln w="12600">
+            <a:solidFill>
+              <a:srgbClr val="527F34"/>
+            </a:solidFill>
+            <a:miter/>
+          </a:ln>
+        </p:spPr>
+        <p:txBody>
+          <a:bodyPr lIns="90000" tIns="45000" rIns="90000" bIns="45000" anchor="ctr"/>
+          <a:lstStyle/>
           <a:p>
             <a:pPr algn="ctr">
               <a:lnSpc>
@@ -5326,7 +5851,7 @@
             <a:r>
               <a:rPr lang="de-DE" sz="1100">
                 <a:solidFill>
-                  <a:srgbClr val="ffffff"/>
+                  <a:srgbClr val="FFFFFF"/>
                 </a:solidFill>
                 <a:latin typeface="Calibri"/>
               </a:rPr>
@@ -5351,17 +5876,18 @@
             <a:avLst/>
           </a:prstGeom>
           <a:solidFill>
-            <a:srgbClr val="70ad47"/>
-          </a:solidFill>
-          <a:ln w="12600">
-            <a:solidFill>
-              <a:srgbClr val="527f34"/>
-            </a:solidFill>
-            <a:miter/>
-          </a:ln>
-        </p:spPr>
-        <p:txBody>
-          <a:bodyPr lIns="90000" rIns="90000" tIns="45000" bIns="45000" anchor="ctr"/>
+            <a:srgbClr val="70AD47"/>
+          </a:solidFill>
+          <a:ln w="12600">
+            <a:solidFill>
+              <a:srgbClr val="527F34"/>
+            </a:solidFill>
+            <a:miter/>
+          </a:ln>
+        </p:spPr>
+        <p:txBody>
+          <a:bodyPr lIns="90000" tIns="45000" rIns="90000" bIns="45000" anchor="ctr"/>
+          <a:lstStyle/>
           <a:p>
             <a:pPr algn="ctr">
               <a:lnSpc>
@@ -5371,7 +5897,7 @@
             <a:r>
               <a:rPr lang="de-DE" sz="1100">
                 <a:solidFill>
-                  <a:srgbClr val="ffffff"/>
+                  <a:srgbClr val="FFFFFF"/>
                 </a:solidFill>
                 <a:latin typeface="Calibri"/>
               </a:rPr>
@@ -5396,17 +5922,18 @@
             <a:avLst/>
           </a:prstGeom>
           <a:solidFill>
-            <a:srgbClr val="70ad47"/>
-          </a:solidFill>
-          <a:ln w="12600">
-            <a:solidFill>
-              <a:srgbClr val="527f34"/>
-            </a:solidFill>
-            <a:miter/>
-          </a:ln>
-        </p:spPr>
-        <p:txBody>
-          <a:bodyPr lIns="90000" rIns="90000" tIns="45000" bIns="45000" anchor="ctr"/>
+            <a:srgbClr val="70AD47"/>
+          </a:solidFill>
+          <a:ln w="12600">
+            <a:solidFill>
+              <a:srgbClr val="527F34"/>
+            </a:solidFill>
+            <a:miter/>
+          </a:ln>
+        </p:spPr>
+        <p:txBody>
+          <a:bodyPr lIns="90000" tIns="45000" rIns="90000" bIns="45000" anchor="ctr"/>
+          <a:lstStyle/>
           <a:p>
             <a:pPr algn="ctr">
               <a:lnSpc>
@@ -5416,7 +5943,7 @@
             <a:r>
               <a:rPr lang="de-DE" sz="1100">
                 <a:solidFill>
-                  <a:srgbClr val="ffffff"/>
+                  <a:srgbClr val="FFFFFF"/>
                 </a:solidFill>
                 <a:latin typeface="Calibri"/>
               </a:rPr>
@@ -5441,17 +5968,18 @@
             <a:avLst/>
           </a:prstGeom>
           <a:solidFill>
-            <a:srgbClr val="70ad47"/>
-          </a:solidFill>
-          <a:ln w="12600">
-            <a:solidFill>
-              <a:srgbClr val="527f34"/>
-            </a:solidFill>
-            <a:miter/>
-          </a:ln>
-        </p:spPr>
-        <p:txBody>
-          <a:bodyPr lIns="90000" rIns="90000" tIns="45000" bIns="45000" anchor="ctr"/>
+            <a:srgbClr val="70AD47"/>
+          </a:solidFill>
+          <a:ln w="12600">
+            <a:solidFill>
+              <a:srgbClr val="527F34"/>
+            </a:solidFill>
+            <a:miter/>
+          </a:ln>
+        </p:spPr>
+        <p:txBody>
+          <a:bodyPr lIns="90000" tIns="45000" rIns="90000" bIns="45000" anchor="ctr"/>
+          <a:lstStyle/>
           <a:p>
             <a:pPr algn="ctr">
               <a:lnSpc>
@@ -5461,7 +5989,7 @@
             <a:r>
               <a:rPr lang="de-DE" sz="1100">
                 <a:solidFill>
-                  <a:srgbClr val="ffffff"/>
+                  <a:srgbClr val="FFFFFF"/>
                 </a:solidFill>
                 <a:latin typeface="Calibri"/>
               </a:rPr>
@@ -5486,17 +6014,18 @@
             <a:avLst/>
           </a:prstGeom>
           <a:solidFill>
-            <a:srgbClr val="70ad47"/>
-          </a:solidFill>
-          <a:ln w="12600">
-            <a:solidFill>
-              <a:srgbClr val="527f34"/>
-            </a:solidFill>
-            <a:miter/>
-          </a:ln>
-        </p:spPr>
-        <p:txBody>
-          <a:bodyPr lIns="90000" rIns="90000" tIns="45000" bIns="45000" anchor="ctr"/>
+            <a:srgbClr val="70AD47"/>
+          </a:solidFill>
+          <a:ln w="12600">
+            <a:solidFill>
+              <a:srgbClr val="527F34"/>
+            </a:solidFill>
+            <a:miter/>
+          </a:ln>
+        </p:spPr>
+        <p:txBody>
+          <a:bodyPr lIns="90000" tIns="45000" rIns="90000" bIns="45000" anchor="ctr"/>
+          <a:lstStyle/>
           <a:p>
             <a:pPr algn="ctr">
               <a:lnSpc>
@@ -5506,7 +6035,7 @@
             <a:r>
               <a:rPr lang="de-DE" sz="1100">
                 <a:solidFill>
-                  <a:srgbClr val="ffffff"/>
+                  <a:srgbClr val="FFFFFF"/>
                 </a:solidFill>
                 <a:latin typeface="Calibri"/>
               </a:rPr>
@@ -5531,17 +6060,18 @@
             <a:avLst/>
           </a:prstGeom>
           <a:solidFill>
-            <a:srgbClr val="70ad47"/>
-          </a:solidFill>
-          <a:ln w="12600">
-            <a:solidFill>
-              <a:srgbClr val="527f34"/>
-            </a:solidFill>
-            <a:miter/>
-          </a:ln>
-        </p:spPr>
-        <p:txBody>
-          <a:bodyPr lIns="90000" rIns="90000" tIns="45000" bIns="45000" anchor="ctr"/>
+            <a:srgbClr val="70AD47"/>
+          </a:solidFill>
+          <a:ln w="12600">
+            <a:solidFill>
+              <a:srgbClr val="527F34"/>
+            </a:solidFill>
+            <a:miter/>
+          </a:ln>
+        </p:spPr>
+        <p:txBody>
+          <a:bodyPr lIns="90000" tIns="45000" rIns="90000" bIns="45000" anchor="ctr"/>
+          <a:lstStyle/>
           <a:p>
             <a:pPr algn="ctr">
               <a:lnSpc>
@@ -5551,7 +6081,7 @@
             <a:r>
               <a:rPr lang="de-DE" sz="1100">
                 <a:solidFill>
-                  <a:srgbClr val="ffffff"/>
+                  <a:srgbClr val="FFFFFF"/>
                 </a:solidFill>
                 <a:latin typeface="Calibri"/>
               </a:rPr>
@@ -5576,7 +6106,7 @@
             <a:avLst/>
           </a:prstGeom>
           <a:solidFill>
-            <a:srgbClr val="bf9000"/>
+            <a:srgbClr val="BF9000"/>
           </a:solidFill>
           <a:ln w="12600">
             <a:solidFill>
@@ -5586,7 +6116,8 @@
           </a:ln>
         </p:spPr>
         <p:txBody>
-          <a:bodyPr lIns="90000" rIns="90000" tIns="45000" bIns="45000" anchor="ctr"/>
+          <a:bodyPr lIns="90000" tIns="45000" rIns="90000" bIns="45000" anchor="ctr"/>
+          <a:lstStyle/>
           <a:p>
             <a:pPr algn="ctr">
               <a:lnSpc>
@@ -5596,7 +6127,7 @@
             <a:r>
               <a:rPr lang="de-DE" sz="1100">
                 <a:solidFill>
-                  <a:srgbClr val="ffffff"/>
+                  <a:srgbClr val="FFFFFF"/>
                 </a:solidFill>
                 <a:latin typeface="Calibri"/>
               </a:rPr>
@@ -5621,7 +6152,7 @@
             <a:avLst/>
           </a:prstGeom>
           <a:solidFill>
-            <a:srgbClr val="bf9000"/>
+            <a:srgbClr val="BF9000"/>
           </a:solidFill>
           <a:ln w="12600">
             <a:solidFill>
@@ -5631,7 +6162,8 @@
           </a:ln>
         </p:spPr>
         <p:txBody>
-          <a:bodyPr lIns="90000" rIns="90000" tIns="45000" bIns="45000" anchor="ctr"/>
+          <a:bodyPr lIns="90000" tIns="45000" rIns="90000" bIns="45000" anchor="ctr"/>
+          <a:lstStyle/>
           <a:p>
             <a:pPr algn="ctr">
               <a:lnSpc>
@@ -5641,7 +6173,7 @@
             <a:r>
               <a:rPr lang="de-DE" sz="1100">
                 <a:solidFill>
-                  <a:srgbClr val="ffffff"/>
+                  <a:srgbClr val="FFFFFF"/>
                 </a:solidFill>
                 <a:latin typeface="Calibri"/>
               </a:rPr>
@@ -5671,7 +6203,8 @@
           </a:ln>
         </p:spPr>
         <p:txBody>
-          <a:bodyPr lIns="90000" rIns="90000" tIns="45000" bIns="45000"/>
+          <a:bodyPr lIns="90000" tIns="45000" rIns="90000" bIns="45000"/>
+          <a:lstStyle/>
           <a:p>
             <a:pPr>
               <a:lnSpc>
@@ -5777,7 +6310,8 @@
           </a:ln>
         </p:spPr>
         <p:txBody>
-          <a:bodyPr lIns="90000" rIns="90000" tIns="45000" bIns="45000"/>
+          <a:bodyPr lIns="90000" tIns="45000" rIns="90000" bIns="45000"/>
+          <a:lstStyle/>
           <a:p>
             <a:pPr>
               <a:lnSpc>
@@ -5812,7 +6346,7 @@
             <a:avLst/>
           </a:prstGeom>
           <a:solidFill>
-            <a:srgbClr val="afabab"/>
+            <a:srgbClr val="AFABAB"/>
           </a:solidFill>
           <a:ln w="12600">
             <a:solidFill>
@@ -5839,17 +6373,18 @@
             </a:avLst>
           </a:prstGeom>
           <a:solidFill>
-            <a:srgbClr val="ed7d31"/>
-          </a:solidFill>
-          <a:ln w="12600">
-            <a:solidFill>
-              <a:srgbClr val="af5c24"/>
-            </a:solidFill>
-            <a:miter/>
-          </a:ln>
-        </p:spPr>
-        <p:txBody>
-          <a:bodyPr lIns="90000" rIns="90000" tIns="45000" bIns="45000" anchor="ctr"/>
+            <a:srgbClr val="ED7D31"/>
+          </a:solidFill>
+          <a:ln w="12600">
+            <a:solidFill>
+              <a:srgbClr val="AF5C24"/>
+            </a:solidFill>
+            <a:miter/>
+          </a:ln>
+        </p:spPr>
+        <p:txBody>
+          <a:bodyPr lIns="90000" tIns="45000" rIns="90000" bIns="45000" anchor="ctr"/>
+          <a:lstStyle/>
           <a:p>
             <a:pPr>
               <a:lnSpc>
@@ -5859,7 +6394,7 @@
             <a:r>
               <a:rPr lang="de-DE" sz="1100">
                 <a:solidFill>
-                  <a:srgbClr val="ffffff"/>
+                  <a:srgbClr val="FFFFFF"/>
                 </a:solidFill>
                 <a:latin typeface="Calibri"/>
               </a:rPr>
@@ -5886,17 +6421,18 @@
             </a:avLst>
           </a:prstGeom>
           <a:solidFill>
-            <a:srgbClr val="ed7d31"/>
-          </a:solidFill>
-          <a:ln w="12600">
-            <a:solidFill>
-              <a:srgbClr val="af5c24"/>
-            </a:solidFill>
-            <a:miter/>
-          </a:ln>
-        </p:spPr>
-        <p:txBody>
-          <a:bodyPr lIns="90000" rIns="90000" tIns="45000" bIns="45000" anchor="ctr"/>
+            <a:srgbClr val="ED7D31"/>
+          </a:solidFill>
+          <a:ln w="12600">
+            <a:solidFill>
+              <a:srgbClr val="AF5C24"/>
+            </a:solidFill>
+            <a:miter/>
+          </a:ln>
+        </p:spPr>
+        <p:txBody>
+          <a:bodyPr lIns="90000" tIns="45000" rIns="90000" bIns="45000" anchor="ctr"/>
+          <a:lstStyle/>
           <a:p>
             <a:pPr>
               <a:lnSpc>
@@ -5906,7 +6442,7 @@
             <a:r>
               <a:rPr lang="de-DE" sz="1100">
                 <a:solidFill>
-                  <a:srgbClr val="ffffff"/>
+                  <a:srgbClr val="FFFFFF"/>
                 </a:solidFill>
                 <a:latin typeface="Calibri"/>
               </a:rPr>
@@ -5931,7 +6467,7 @@
             <a:avLst/>
           </a:prstGeom>
           <a:solidFill>
-            <a:srgbClr val="afabab"/>
+            <a:srgbClr val="AFABAB"/>
           </a:solidFill>
           <a:ln w="12600">
             <a:solidFill>
@@ -5958,17 +6494,18 @@
             </a:avLst>
           </a:prstGeom>
           <a:solidFill>
-            <a:srgbClr val="ed7d31"/>
-          </a:solidFill>
-          <a:ln w="12600">
-            <a:solidFill>
-              <a:srgbClr val="af5c24"/>
-            </a:solidFill>
-            <a:miter/>
-          </a:ln>
-        </p:spPr>
-        <p:txBody>
-          <a:bodyPr lIns="90000" rIns="90000" tIns="45000" bIns="45000" anchor="ctr"/>
+            <a:srgbClr val="ED7D31"/>
+          </a:solidFill>
+          <a:ln w="12600">
+            <a:solidFill>
+              <a:srgbClr val="AF5C24"/>
+            </a:solidFill>
+            <a:miter/>
+          </a:ln>
+        </p:spPr>
+        <p:txBody>
+          <a:bodyPr lIns="90000" tIns="45000" rIns="90000" bIns="45000" anchor="ctr"/>
+          <a:lstStyle/>
           <a:p>
             <a:pPr>
               <a:lnSpc>
@@ -5978,7 +6515,7 @@
             <a:r>
               <a:rPr lang="de-DE" sz="1100">
                 <a:solidFill>
-                  <a:srgbClr val="ffffff"/>
+                  <a:srgbClr val="FFFFFF"/>
                 </a:solidFill>
                 <a:latin typeface="Calibri"/>
               </a:rPr>
@@ -6005,17 +6542,18 @@
             </a:avLst>
           </a:prstGeom>
           <a:solidFill>
-            <a:srgbClr val="ed7d31"/>
-          </a:solidFill>
-          <a:ln w="12600">
-            <a:solidFill>
-              <a:srgbClr val="af5c24"/>
-            </a:solidFill>
-            <a:miter/>
-          </a:ln>
-        </p:spPr>
-        <p:txBody>
-          <a:bodyPr lIns="90000" rIns="90000" tIns="45000" bIns="45000" anchor="ctr"/>
+            <a:srgbClr val="ED7D31"/>
+          </a:solidFill>
+          <a:ln w="12600">
+            <a:solidFill>
+              <a:srgbClr val="AF5C24"/>
+            </a:solidFill>
+            <a:miter/>
+          </a:ln>
+        </p:spPr>
+        <p:txBody>
+          <a:bodyPr lIns="90000" tIns="45000" rIns="90000" bIns="45000" anchor="ctr"/>
+          <a:lstStyle/>
           <a:p>
             <a:pPr>
               <a:lnSpc>
@@ -6025,7 +6563,7 @@
             <a:r>
               <a:rPr lang="de-DE" sz="1100">
                 <a:solidFill>
-                  <a:srgbClr val="ffffff"/>
+                  <a:srgbClr val="FFFFFF"/>
                 </a:solidFill>
                 <a:latin typeface="Calibri"/>
               </a:rPr>
@@ -6050,7 +6588,7 @@
             <a:avLst/>
           </a:prstGeom>
           <a:solidFill>
-            <a:srgbClr val="afabab"/>
+            <a:srgbClr val="AFABAB"/>
           </a:solidFill>
           <a:ln w="12600">
             <a:solidFill>
@@ -6077,17 +6615,18 @@
             </a:avLst>
           </a:prstGeom>
           <a:solidFill>
-            <a:srgbClr val="ed7d31"/>
-          </a:solidFill>
-          <a:ln w="12600">
-            <a:solidFill>
-              <a:srgbClr val="af5c24"/>
-            </a:solidFill>
-            <a:miter/>
-          </a:ln>
-        </p:spPr>
-        <p:txBody>
-          <a:bodyPr lIns="90000" rIns="90000" tIns="45000" bIns="45000" anchor="ctr"/>
+            <a:srgbClr val="ED7D31"/>
+          </a:solidFill>
+          <a:ln w="12600">
+            <a:solidFill>
+              <a:srgbClr val="AF5C24"/>
+            </a:solidFill>
+            <a:miter/>
+          </a:ln>
+        </p:spPr>
+        <p:txBody>
+          <a:bodyPr lIns="90000" tIns="45000" rIns="90000" bIns="45000" anchor="ctr"/>
+          <a:lstStyle/>
           <a:p>
             <a:pPr>
               <a:lnSpc>
@@ -6097,7 +6636,7 @@
             <a:r>
               <a:rPr lang="de-DE" sz="1100">
                 <a:solidFill>
-                  <a:srgbClr val="ffffff"/>
+                  <a:srgbClr val="FFFFFF"/>
                 </a:solidFill>
                 <a:latin typeface="Calibri"/>
               </a:rPr>
@@ -6124,17 +6663,18 @@
             </a:avLst>
           </a:prstGeom>
           <a:solidFill>
-            <a:srgbClr val="ed7d31"/>
-          </a:solidFill>
-          <a:ln w="12600">
-            <a:solidFill>
-              <a:srgbClr val="af5c24"/>
-            </a:solidFill>
-            <a:miter/>
-          </a:ln>
-        </p:spPr>
-        <p:txBody>
-          <a:bodyPr lIns="90000" rIns="90000" tIns="45000" bIns="45000" anchor="ctr"/>
+            <a:srgbClr val="ED7D31"/>
+          </a:solidFill>
+          <a:ln w="12600">
+            <a:solidFill>
+              <a:srgbClr val="AF5C24"/>
+            </a:solidFill>
+            <a:miter/>
+          </a:ln>
+        </p:spPr>
+        <p:txBody>
+          <a:bodyPr lIns="90000" tIns="45000" rIns="90000" bIns="45000" anchor="ctr"/>
+          <a:lstStyle/>
           <a:p>
             <a:pPr>
               <a:lnSpc>
@@ -6144,7 +6684,7 @@
             <a:r>
               <a:rPr lang="de-DE" sz="1100">
                 <a:solidFill>
-                  <a:srgbClr val="ffffff"/>
+                  <a:srgbClr val="FFFFFF"/>
                 </a:solidFill>
                 <a:latin typeface="Calibri"/>
               </a:rPr>
@@ -6171,17 +6711,18 @@
             </a:avLst>
           </a:prstGeom>
           <a:solidFill>
-            <a:srgbClr val="5b9bd5"/>
-          </a:solidFill>
-          <a:ln w="12600">
-            <a:solidFill>
-              <a:srgbClr val="43729d"/>
-            </a:solidFill>
-            <a:miter/>
-          </a:ln>
-        </p:spPr>
-        <p:txBody>
-          <a:bodyPr lIns="90000" rIns="90000" tIns="45000" bIns="45000" anchor="ctr"/>
+            <a:srgbClr val="5B9BD5"/>
+          </a:solidFill>
+          <a:ln w="12600">
+            <a:solidFill>
+              <a:srgbClr val="43729D"/>
+            </a:solidFill>
+            <a:miter/>
+          </a:ln>
+        </p:spPr>
+        <p:txBody>
+          <a:bodyPr lIns="90000" tIns="45000" rIns="90000" bIns="45000" anchor="ctr"/>
+          <a:lstStyle/>
           <a:p>
             <a:pPr algn="ctr">
               <a:lnSpc>
@@ -6191,7 +6732,7 @@
             <a:r>
               <a:rPr lang="de-DE" sz="1100">
                 <a:solidFill>
-                  <a:srgbClr val="ffffff"/>
+                  <a:srgbClr val="FFFFFF"/>
                 </a:solidFill>
                 <a:latin typeface="Calibri"/>
               </a:rPr>
@@ -6218,17 +6759,18 @@
             </a:avLst>
           </a:prstGeom>
           <a:solidFill>
-            <a:srgbClr val="5b9bd5"/>
-          </a:solidFill>
-          <a:ln w="12600">
-            <a:solidFill>
-              <a:srgbClr val="43729d"/>
-            </a:solidFill>
-            <a:miter/>
-          </a:ln>
-        </p:spPr>
-        <p:txBody>
-          <a:bodyPr lIns="90000" rIns="90000" tIns="45000" bIns="45000" anchor="ctr"/>
+            <a:srgbClr val="5B9BD5"/>
+          </a:solidFill>
+          <a:ln w="12600">
+            <a:solidFill>
+              <a:srgbClr val="43729D"/>
+            </a:solidFill>
+            <a:miter/>
+          </a:ln>
+        </p:spPr>
+        <p:txBody>
+          <a:bodyPr lIns="90000" tIns="45000" rIns="90000" bIns="45000" anchor="ctr"/>
+          <a:lstStyle/>
           <a:p>
             <a:pPr algn="ctr">
               <a:lnSpc>
@@ -6238,7 +6780,7 @@
             <a:r>
               <a:rPr lang="de-DE" sz="1100">
                 <a:solidFill>
-                  <a:srgbClr val="ffffff"/>
+                  <a:srgbClr val="FFFFFF"/>
                 </a:solidFill>
                 <a:latin typeface="Calibri"/>
               </a:rPr>
@@ -6265,17 +6807,18 @@
             </a:avLst>
           </a:prstGeom>
           <a:solidFill>
-            <a:srgbClr val="5b9bd5"/>
-          </a:solidFill>
-          <a:ln w="12600">
-            <a:solidFill>
-              <a:srgbClr val="43729d"/>
-            </a:solidFill>
-            <a:miter/>
-          </a:ln>
-        </p:spPr>
-        <p:txBody>
-          <a:bodyPr lIns="90000" rIns="90000" tIns="45000" bIns="45000" anchor="ctr"/>
+            <a:srgbClr val="5B9BD5"/>
+          </a:solidFill>
+          <a:ln w="12600">
+            <a:solidFill>
+              <a:srgbClr val="43729D"/>
+            </a:solidFill>
+            <a:miter/>
+          </a:ln>
+        </p:spPr>
+        <p:txBody>
+          <a:bodyPr lIns="90000" tIns="45000" rIns="90000" bIns="45000" anchor="ctr"/>
+          <a:lstStyle/>
           <a:p>
             <a:pPr algn="ctr">
               <a:lnSpc>
@@ -6285,7 +6828,7 @@
             <a:r>
               <a:rPr lang="de-DE" sz="1100">
                 <a:solidFill>
-                  <a:srgbClr val="ffffff"/>
+                  <a:srgbClr val="FFFFFF"/>
                 </a:solidFill>
                 <a:latin typeface="Calibri"/>
               </a:rPr>
@@ -6297,22 +6840,25 @@
       </p:sp>
     </p:spTree>
   </p:cSld>
+  <p:clrMapOvr>
+    <a:masterClrMapping/>
+  </p:clrMapOvr>
   <p:timing>
     <p:tnLst>
       <p:par>
-        <p:cTn id="11" dur="indefinite" restart="never" nodeType="tmRoot">
+        <p:cTn id="1" dur="indefinite" restart="never" nodeType="tmRoot">
           <p:childTnLst>
             <p:seq>
-              <p:cTn id="12" nodeType="mainSeq"/>
+              <p:cTn id="2" nodeType="mainSeq"/>
               <p:prevCondLst>
-                <p:cond delay="0" evt="onPrev">
+                <p:cond evt="onPrev" delay="0">
                   <p:tgtEl>
                     <p:sldTgt/>
                   </p:tgtEl>
                 </p:cond>
               </p:prevCondLst>
               <p:nextCondLst>
-                <p:cond delay="0" evt="onNext">
+                <p:cond evt="onNext" delay="0">
                   <p:tgtEl>
                     <p:sldTgt/>
                   </p:tgtEl>
@@ -6547,5 +7093,7 @@
       </a:bgFillStyleLst>
     </a:fmtScheme>
   </a:themeElements>
+  <a:objectDefaults/>
+  <a:extraClrSchemeLst/>
 </a:theme>
 </file>
</xml_diff>